<commit_message>
extended UI moved to gestures.cs
</commit_message>
<xml_diff>
--- a/keyboard guide for sailing.pptx
+++ b/keyboard guide for sailing.pptx
@@ -262,7 +262,7 @@
           <a:p>
             <a:fld id="{19A57770-1AB4-44E2-B380-CDAE3CF4CB38}" type="datetimeFigureOut">
               <a:rPr lang="he-IL" smtClean="0"/>
-              <a:t>ד'/כסלו/תשפ"ד</a:t>
+              <a:t>ו'/כסלו/תשפ"ד</a:t>
             </a:fld>
             <a:endParaRPr lang="he-IL"/>
           </a:p>
@@ -462,7 +462,7 @@
           <a:p>
             <a:fld id="{19A57770-1AB4-44E2-B380-CDAE3CF4CB38}" type="datetimeFigureOut">
               <a:rPr lang="he-IL" smtClean="0"/>
-              <a:t>ד'/כסלו/תשפ"ד</a:t>
+              <a:t>ו'/כסלו/תשפ"ד</a:t>
             </a:fld>
             <a:endParaRPr lang="he-IL"/>
           </a:p>
@@ -672,7 +672,7 @@
           <a:p>
             <a:fld id="{19A57770-1AB4-44E2-B380-CDAE3CF4CB38}" type="datetimeFigureOut">
               <a:rPr lang="he-IL" smtClean="0"/>
-              <a:t>ד'/כסלו/תשפ"ד</a:t>
+              <a:t>ו'/כסלו/תשפ"ד</a:t>
             </a:fld>
             <a:endParaRPr lang="he-IL"/>
           </a:p>
@@ -872,7 +872,7 @@
           <a:p>
             <a:fld id="{19A57770-1AB4-44E2-B380-CDAE3CF4CB38}" type="datetimeFigureOut">
               <a:rPr lang="he-IL" smtClean="0"/>
-              <a:t>ד'/כסלו/תשפ"ד</a:t>
+              <a:t>ו'/כסלו/תשפ"ד</a:t>
             </a:fld>
             <a:endParaRPr lang="he-IL"/>
           </a:p>
@@ -1148,7 +1148,7 @@
           <a:p>
             <a:fld id="{19A57770-1AB4-44E2-B380-CDAE3CF4CB38}" type="datetimeFigureOut">
               <a:rPr lang="he-IL" smtClean="0"/>
-              <a:t>ד'/כסלו/תשפ"ד</a:t>
+              <a:t>ו'/כסלו/תשפ"ד</a:t>
             </a:fld>
             <a:endParaRPr lang="he-IL"/>
           </a:p>
@@ -1416,7 +1416,7 @@
           <a:p>
             <a:fld id="{19A57770-1AB4-44E2-B380-CDAE3CF4CB38}" type="datetimeFigureOut">
               <a:rPr lang="he-IL" smtClean="0"/>
-              <a:t>ד'/כסלו/תשפ"ד</a:t>
+              <a:t>ו'/כסלו/תשפ"ד</a:t>
             </a:fld>
             <a:endParaRPr lang="he-IL"/>
           </a:p>
@@ -1831,7 +1831,7 @@
           <a:p>
             <a:fld id="{19A57770-1AB4-44E2-B380-CDAE3CF4CB38}" type="datetimeFigureOut">
               <a:rPr lang="he-IL" smtClean="0"/>
-              <a:t>ד'/כסלו/תשפ"ד</a:t>
+              <a:t>ו'/כסלו/תשפ"ד</a:t>
             </a:fld>
             <a:endParaRPr lang="he-IL"/>
           </a:p>
@@ -1973,7 +1973,7 @@
           <a:p>
             <a:fld id="{19A57770-1AB4-44E2-B380-CDAE3CF4CB38}" type="datetimeFigureOut">
               <a:rPr lang="he-IL" smtClean="0"/>
-              <a:t>ד'/כסלו/תשפ"ד</a:t>
+              <a:t>ו'/כסלו/תשפ"ד</a:t>
             </a:fld>
             <a:endParaRPr lang="he-IL"/>
           </a:p>
@@ -2086,7 +2086,7 @@
           <a:p>
             <a:fld id="{19A57770-1AB4-44E2-B380-CDAE3CF4CB38}" type="datetimeFigureOut">
               <a:rPr lang="he-IL" smtClean="0"/>
-              <a:t>ד'/כסלו/תשפ"ד</a:t>
+              <a:t>ו'/כסלו/תשפ"ד</a:t>
             </a:fld>
             <a:endParaRPr lang="he-IL"/>
           </a:p>
@@ -2399,7 +2399,7 @@
           <a:p>
             <a:fld id="{19A57770-1AB4-44E2-B380-CDAE3CF4CB38}" type="datetimeFigureOut">
               <a:rPr lang="he-IL" smtClean="0"/>
-              <a:t>ד'/כסלו/תשפ"ד</a:t>
+              <a:t>ו'/כסלו/תשפ"ד</a:t>
             </a:fld>
             <a:endParaRPr lang="he-IL"/>
           </a:p>
@@ -2688,7 +2688,7 @@
           <a:p>
             <a:fld id="{19A57770-1AB4-44E2-B380-CDAE3CF4CB38}" type="datetimeFigureOut">
               <a:rPr lang="he-IL" smtClean="0"/>
-              <a:t>ד'/כסלו/תשפ"ד</a:t>
+              <a:t>ו'/כסלו/תשפ"ד</a:t>
             </a:fld>
             <a:endParaRPr lang="he-IL"/>
           </a:p>
@@ -2936,7 +2936,7 @@
           <a:p>
             <a:fld id="{19A57770-1AB4-44E2-B380-CDAE3CF4CB38}" type="datetimeFigureOut">
               <a:rPr lang="he-IL" smtClean="0"/>
-              <a:t>ד'/כסלו/תשפ"ד</a:t>
+              <a:t>ו'/כסלו/תשפ"ד</a:t>
             </a:fld>
             <a:endParaRPr lang="he-IL"/>
           </a:p>
@@ -3402,7 +3402,7 @@
         </p:nvSpPr>
         <p:spPr>
           <a:xfrm>
-            <a:off x="159026" y="516831"/>
+            <a:off x="2156786" y="414427"/>
             <a:ext cx="1331844" cy="646331"/>
           </a:xfrm>
           <a:prstGeom prst="rect">
@@ -3549,7 +3549,7 @@
             <a:avLst/>
           </a:prstGeom>
           <a:solidFill>
-            <a:srgbClr val="92D050"/>
+            <a:srgbClr val="FFFF00"/>
           </a:solidFill>
           <a:ln>
             <a:solidFill>
@@ -3561,46 +3561,33 @@
           <a:bodyPr wrap="square" rtlCol="1">
             <a:spAutoFit/>
           </a:bodyPr>
-          <a:lstStyle/>
-          <a:p>
-            <a:r>
-              <a:rPr lang="en-US" dirty="0">
+          <a:lstStyle>
+            <a:defPPr>
+              <a:defRPr lang="he-IL"/>
+            </a:defPPr>
+            <a:lvl1pPr>
+              <a:defRPr>
                 <a:solidFill>
                   <a:srgbClr val="FF0000"/>
                 </a:solidFill>
-              </a:rPr>
-              <a:t>Left Shift – hit </a:t>
-            </a:r>
-            <a:r>
-              <a:rPr lang="en-US" b="1" dirty="0">
-                <a:solidFill>
-                  <a:srgbClr val="FF0000"/>
-                </a:solidFill>
-              </a:rPr>
-              <a:t>rudder</a:t>
-            </a:r>
-            <a:r>
-              <a:rPr lang="en-US" dirty="0">
-                <a:solidFill>
-                  <a:srgbClr val="FF0000"/>
-                </a:solidFill>
-              </a:rPr>
-              <a:t> to the left</a:t>
-            </a:r>
-            <a:endParaRPr lang="he-IL" dirty="0">
-              <a:solidFill>
-                <a:srgbClr val="FF0000"/>
-              </a:solidFill>
-            </a:endParaRPr>
-          </a:p>
-        </p:txBody>
-      </p:sp>
-      <p:sp>
-        <p:nvSpPr>
-          <p:cNvPr id="14" name="TextBox 13">
-            <a:extLst>
-              <a:ext uri="{FF2B5EF4-FFF2-40B4-BE49-F238E27FC236}">
-                <a16:creationId xmlns:a16="http://schemas.microsoft.com/office/drawing/2014/main" id="{035A2C12-6724-99CD-FA06-4D5B0CBFE75E}"/>
+              </a:defRPr>
+            </a:lvl1pPr>
+          </a:lstStyle>
+          <a:p>
+            <a:r>
+              <a:rPr lang="en-US" dirty="0"/>
+              <a:t>Left Shift – hit rudder to the left</a:t>
+            </a:r>
+            <a:endParaRPr lang="he-IL" dirty="0"/>
+          </a:p>
+        </p:txBody>
+      </p:sp>
+      <p:sp>
+        <p:nvSpPr>
+          <p:cNvPr id="16" name="TextBox 15">
+            <a:extLst>
+              <a:ext uri="{FF2B5EF4-FFF2-40B4-BE49-F238E27FC236}">
+                <a16:creationId xmlns:a16="http://schemas.microsoft.com/office/drawing/2014/main" id="{0BE56393-9654-A338-324A-E54841DB1F27}"/>
               </a:ext>
             </a:extLst>
           </p:cNvPr>
@@ -3609,14 +3596,14 @@
         </p:nvSpPr>
         <p:spPr>
           <a:xfrm>
-            <a:off x="10641468" y="3207027"/>
+            <a:off x="6443851" y="4555434"/>
             <a:ext cx="1331844" cy="923330"/>
           </a:xfrm>
           <a:prstGeom prst="rect">
             <a:avLst/>
           </a:prstGeom>
           <a:solidFill>
-            <a:srgbClr val="92D050"/>
+            <a:srgbClr val="FFFF00"/>
           </a:solidFill>
           <a:ln>
             <a:solidFill>
@@ -3628,46 +3615,33 @@
           <a:bodyPr wrap="square" rtlCol="1">
             <a:spAutoFit/>
           </a:bodyPr>
-          <a:lstStyle/>
-          <a:p>
-            <a:r>
-              <a:rPr lang="en-US" dirty="0">
+          <a:lstStyle>
+            <a:defPPr>
+              <a:defRPr lang="he-IL"/>
+            </a:defPPr>
+            <a:lvl1pPr>
+              <a:defRPr>
                 <a:solidFill>
                   <a:srgbClr val="FF0000"/>
                 </a:solidFill>
-              </a:rPr>
-              <a:t>Right Shift – hit </a:t>
-            </a:r>
-            <a:r>
-              <a:rPr lang="en-US" b="1" dirty="0">
-                <a:solidFill>
-                  <a:srgbClr val="FF0000"/>
-                </a:solidFill>
-              </a:rPr>
-              <a:t>rudder</a:t>
-            </a:r>
-            <a:r>
-              <a:rPr lang="en-US" dirty="0">
-                <a:solidFill>
-                  <a:srgbClr val="FF0000"/>
-                </a:solidFill>
-              </a:rPr>
-              <a:t> to the right</a:t>
-            </a:r>
-            <a:endParaRPr lang="he-IL" dirty="0">
-              <a:solidFill>
-                <a:srgbClr val="FF0000"/>
-              </a:solidFill>
-            </a:endParaRPr>
-          </a:p>
-        </p:txBody>
-      </p:sp>
-      <p:sp>
-        <p:nvSpPr>
-          <p:cNvPr id="15" name="TextBox 14">
-            <a:extLst>
-              <a:ext uri="{FF2B5EF4-FFF2-40B4-BE49-F238E27FC236}">
-                <a16:creationId xmlns:a16="http://schemas.microsoft.com/office/drawing/2014/main" id="{81746C54-C21C-60E7-DFC2-B409E9145F56}"/>
+              </a:defRPr>
+            </a:lvl1pPr>
+          </a:lstStyle>
+          <a:p>
+            <a:r>
+              <a:rPr lang="en-US" dirty="0"/>
+              <a:t>Page Up – raise the keel</a:t>
+            </a:r>
+            <a:endParaRPr lang="he-IL" dirty="0"/>
+          </a:p>
+        </p:txBody>
+      </p:sp>
+      <p:sp>
+        <p:nvSpPr>
+          <p:cNvPr id="17" name="TextBox 16">
+            <a:extLst>
+              <a:ext uri="{FF2B5EF4-FFF2-40B4-BE49-F238E27FC236}">
+                <a16:creationId xmlns:a16="http://schemas.microsoft.com/office/drawing/2014/main" id="{3F122964-1B75-8D26-A94C-DACDDF2098B1}"/>
               </a:ext>
             </a:extLst>
           </p:cNvPr>
@@ -3676,125 +3650,7 @@
         </p:nvSpPr>
         <p:spPr>
           <a:xfrm>
-            <a:off x="10674600" y="4552119"/>
-            <a:ext cx="1331844" cy="923330"/>
-          </a:xfrm>
-          <a:prstGeom prst="rect">
-            <a:avLst/>
-          </a:prstGeom>
-          <a:solidFill>
-            <a:srgbClr val="00B050"/>
-          </a:solidFill>
-          <a:ln>
-            <a:solidFill>
-              <a:srgbClr val="FF0000"/>
-            </a:solidFill>
-          </a:ln>
-        </p:spPr>
-        <p:txBody>
-          <a:bodyPr wrap="square" rtlCol="1">
-            <a:spAutoFit/>
-          </a:bodyPr>
-          <a:lstStyle/>
-          <a:p>
-            <a:r>
-              <a:rPr lang="en-US" dirty="0">
-                <a:solidFill>
-                  <a:srgbClr val="FF0000"/>
-                </a:solidFill>
-              </a:rPr>
-              <a:t>Page Down – lower the </a:t>
-            </a:r>
-            <a:r>
-              <a:rPr lang="en-US" b="1" dirty="0">
-                <a:solidFill>
-                  <a:srgbClr val="FF0000"/>
-                </a:solidFill>
-              </a:rPr>
-              <a:t>keel</a:t>
-            </a:r>
-            <a:endParaRPr lang="he-IL" b="1" dirty="0">
-              <a:solidFill>
-                <a:srgbClr val="FF0000"/>
-              </a:solidFill>
-            </a:endParaRPr>
-          </a:p>
-        </p:txBody>
-      </p:sp>
-      <p:sp>
-        <p:nvSpPr>
-          <p:cNvPr id="16" name="TextBox 15">
-            <a:extLst>
-              <a:ext uri="{FF2B5EF4-FFF2-40B4-BE49-F238E27FC236}">
-                <a16:creationId xmlns:a16="http://schemas.microsoft.com/office/drawing/2014/main" id="{0BE56393-9654-A338-324A-E54841DB1F27}"/>
-              </a:ext>
-            </a:extLst>
-          </p:cNvPr>
-          <p:cNvSpPr txBox="1"/>
-          <p:nvPr/>
-        </p:nvSpPr>
-        <p:spPr>
-          <a:xfrm>
-            <a:off x="6443851" y="4555434"/>
-            <a:ext cx="1331844" cy="923330"/>
-          </a:xfrm>
-          <a:prstGeom prst="rect">
-            <a:avLst/>
-          </a:prstGeom>
-          <a:solidFill>
-            <a:srgbClr val="00B050"/>
-          </a:solidFill>
-          <a:ln>
-            <a:solidFill>
-              <a:srgbClr val="FF0000"/>
-            </a:solidFill>
-          </a:ln>
-        </p:spPr>
-        <p:txBody>
-          <a:bodyPr wrap="square" rtlCol="1">
-            <a:spAutoFit/>
-          </a:bodyPr>
-          <a:lstStyle/>
-          <a:p>
-            <a:r>
-              <a:rPr lang="en-US" dirty="0">
-                <a:solidFill>
-                  <a:srgbClr val="FF0000"/>
-                </a:solidFill>
-              </a:rPr>
-              <a:t>Page Up – raise the </a:t>
-            </a:r>
-            <a:r>
-              <a:rPr lang="en-US" b="1" dirty="0">
-                <a:solidFill>
-                  <a:srgbClr val="FF0000"/>
-                </a:solidFill>
-              </a:rPr>
-              <a:t>keel</a:t>
-            </a:r>
-            <a:endParaRPr lang="he-IL" b="1" dirty="0">
-              <a:solidFill>
-                <a:srgbClr val="FF0000"/>
-              </a:solidFill>
-            </a:endParaRPr>
-          </a:p>
-        </p:txBody>
-      </p:sp>
-      <p:sp>
-        <p:nvSpPr>
-          <p:cNvPr id="17" name="TextBox 16">
-            <a:extLst>
-              <a:ext uri="{FF2B5EF4-FFF2-40B4-BE49-F238E27FC236}">
-                <a16:creationId xmlns:a16="http://schemas.microsoft.com/office/drawing/2014/main" id="{3F122964-1B75-8D26-A94C-DACDDF2098B1}"/>
-              </a:ext>
-            </a:extLst>
-          </p:cNvPr>
-          <p:cNvSpPr txBox="1"/>
-          <p:nvPr/>
-        </p:nvSpPr>
-        <p:spPr>
-          <a:xfrm>
-            <a:off x="8584077" y="2451654"/>
+            <a:off x="8412202" y="2275487"/>
             <a:ext cx="1331844" cy="646331"/>
           </a:xfrm>
           <a:prstGeom prst="rect">
@@ -4154,7 +4010,7 @@
         </p:nvSpPr>
         <p:spPr>
           <a:xfrm>
-            <a:off x="7023653" y="462032"/>
+            <a:off x="5568587" y="414427"/>
             <a:ext cx="1474303" cy="646331"/>
           </a:xfrm>
           <a:prstGeom prst="rect">
@@ -4246,7 +4102,7 @@
                   <a:srgbClr val="FF0000"/>
                 </a:solidFill>
               </a:rPr>
-              <a:t> – C – </a:t>
+              <a:t> + C – </a:t>
             </a:r>
             <a:r>
               <a:rPr lang="en-US" b="1" dirty="0">
@@ -4288,8 +4144,8 @@
         </p:nvCxnSpPr>
         <p:spPr>
           <a:xfrm>
-            <a:off x="1484246" y="1095720"/>
-            <a:ext cx="2133597" cy="1372789"/>
+            <a:off x="3281569" y="993591"/>
+            <a:ext cx="336274" cy="1474918"/>
           </a:xfrm>
           <a:prstGeom prst="straightConnector1">
             <a:avLst/>
@@ -4409,51 +4265,6 @@
       </p:cxnSp>
       <p:cxnSp>
         <p:nvCxnSpPr>
-          <p:cNvPr id="36" name="Straight Arrow Connector 35">
-            <a:extLst>
-              <a:ext uri="{FF2B5EF4-FFF2-40B4-BE49-F238E27FC236}">
-                <a16:creationId xmlns:a16="http://schemas.microsoft.com/office/drawing/2014/main" id="{DAD7D898-711A-E16D-7C5E-EE741BC370EF}"/>
-              </a:ext>
-            </a:extLst>
-          </p:cNvPr>
-          <p:cNvCxnSpPr>
-            <a:cxnSpLocks/>
-          </p:cNvCxnSpPr>
-          <p:nvPr/>
-        </p:nvCxnSpPr>
-        <p:spPr>
-          <a:xfrm flipH="1" flipV="1">
-            <a:off x="9647583" y="3658183"/>
-            <a:ext cx="1242392" cy="227730"/>
-          </a:xfrm>
-          <a:prstGeom prst="straightConnector1">
-            <a:avLst/>
-          </a:prstGeom>
-          <a:ln w="38100">
-            <a:solidFill>
-              <a:srgbClr val="FF0000"/>
-            </a:solidFill>
-            <a:headEnd type="none" w="med" len="med"/>
-            <a:tailEnd type="triangle" w="med" len="med"/>
-          </a:ln>
-        </p:spPr>
-        <p:style>
-          <a:lnRef idx="1">
-            <a:schemeClr val="accent1"/>
-          </a:lnRef>
-          <a:fillRef idx="0">
-            <a:schemeClr val="accent1"/>
-          </a:fillRef>
-          <a:effectRef idx="0">
-            <a:schemeClr val="accent1"/>
-          </a:effectRef>
-          <a:fontRef idx="minor">
-            <a:schemeClr val="tx1"/>
-          </a:fontRef>
-        </p:style>
-      </p:cxnSp>
-      <p:cxnSp>
-        <p:nvCxnSpPr>
           <p:cNvPr id="39" name="Straight Arrow Connector 38">
             <a:extLst>
               <a:ext uri="{FF2B5EF4-FFF2-40B4-BE49-F238E27FC236}">
@@ -4679,51 +4490,6 @@
       </p:cxnSp>
       <p:cxnSp>
         <p:nvCxnSpPr>
-          <p:cNvPr id="54" name="Straight Arrow Connector 53">
-            <a:extLst>
-              <a:ext uri="{FF2B5EF4-FFF2-40B4-BE49-F238E27FC236}">
-                <a16:creationId xmlns:a16="http://schemas.microsoft.com/office/drawing/2014/main" id="{54BC26C7-7F1C-53E0-9098-C923B6105505}"/>
-              </a:ext>
-            </a:extLst>
-          </p:cNvPr>
-          <p:cNvCxnSpPr>
-            <a:cxnSpLocks/>
-          </p:cNvCxnSpPr>
-          <p:nvPr/>
-        </p:nvCxnSpPr>
-        <p:spPr>
-          <a:xfrm flipH="1" flipV="1">
-            <a:off x="9799996" y="4194313"/>
-            <a:ext cx="990586" cy="655983"/>
-          </a:xfrm>
-          <a:prstGeom prst="straightConnector1">
-            <a:avLst/>
-          </a:prstGeom>
-          <a:ln w="38100">
-            <a:solidFill>
-              <a:srgbClr val="FF0000"/>
-            </a:solidFill>
-            <a:headEnd type="none" w="med" len="med"/>
-            <a:tailEnd type="triangle" w="med" len="med"/>
-          </a:ln>
-        </p:spPr>
-        <p:style>
-          <a:lnRef idx="1">
-            <a:schemeClr val="accent1"/>
-          </a:lnRef>
-          <a:fillRef idx="0">
-            <a:schemeClr val="accent1"/>
-          </a:fillRef>
-          <a:effectRef idx="0">
-            <a:schemeClr val="accent1"/>
-          </a:effectRef>
-          <a:fontRef idx="minor">
-            <a:schemeClr val="tx1"/>
-          </a:fontRef>
-        </p:style>
-      </p:cxnSp>
-      <p:cxnSp>
-        <p:nvCxnSpPr>
           <p:cNvPr id="57" name="Straight Arrow Connector 56">
             <a:extLst>
               <a:ext uri="{FF2B5EF4-FFF2-40B4-BE49-F238E27FC236}">
@@ -4873,9 +4639,9 @@
           <p:nvPr/>
         </p:nvCxnSpPr>
         <p:spPr>
-          <a:xfrm flipH="1">
-            <a:off x="9137403" y="3097985"/>
-            <a:ext cx="112596" cy="940328"/>
+          <a:xfrm>
+            <a:off x="9078124" y="2921818"/>
+            <a:ext cx="84088" cy="1116495"/>
           </a:xfrm>
           <a:prstGeom prst="straightConnector1">
             <a:avLst/>
@@ -4918,9 +4684,9 @@
           <p:nvPr/>
         </p:nvCxnSpPr>
         <p:spPr>
-          <a:xfrm flipH="1">
-            <a:off x="7384774" y="1059599"/>
-            <a:ext cx="376030" cy="565885"/>
+          <a:xfrm>
+            <a:off x="7057143" y="993591"/>
+            <a:ext cx="327631" cy="631893"/>
           </a:xfrm>
           <a:prstGeom prst="straightConnector1">
             <a:avLst/>
@@ -4962,8 +4728,8 @@
         </p:nvSpPr>
         <p:spPr>
           <a:xfrm>
-            <a:off x="8716615" y="465347"/>
-            <a:ext cx="1474303" cy="646331"/>
+            <a:off x="7143800" y="412980"/>
+            <a:ext cx="1343431" cy="646331"/>
           </a:xfrm>
           <a:prstGeom prst="rect">
             <a:avLst/>
@@ -5049,9 +4815,9 @@
           <p:nvPr/>
         </p:nvCxnSpPr>
         <p:spPr>
-          <a:xfrm flipH="1">
-            <a:off x="7914860" y="1062914"/>
-            <a:ext cx="1538906" cy="1605890"/>
+          <a:xfrm>
+            <a:off x="7775695" y="1024604"/>
+            <a:ext cx="65011" cy="1492697"/>
           </a:xfrm>
           <a:prstGeom prst="straightConnector1">
             <a:avLst/>
@@ -5093,7 +4859,7 @@
         </p:nvSpPr>
         <p:spPr>
           <a:xfrm>
-            <a:off x="2882353" y="465347"/>
+            <a:off x="3892826" y="414427"/>
             <a:ext cx="1474303" cy="646331"/>
           </a:xfrm>
           <a:prstGeom prst="rect">
@@ -5164,9 +4930,9 @@
           <p:nvPr/>
         </p:nvCxnSpPr>
         <p:spPr>
-          <a:xfrm>
-            <a:off x="3619504" y="1062914"/>
-            <a:ext cx="1187723" cy="1521260"/>
+          <a:xfrm flipH="1">
+            <a:off x="4807227" y="919357"/>
+            <a:ext cx="157587" cy="1664817"/>
           </a:xfrm>
           <a:prstGeom prst="straightConnector1">
             <a:avLst/>
@@ -5309,6 +5075,895 @@
           </a:fontRef>
         </p:style>
       </p:cxnSp>
+      <p:sp>
+        <p:nvSpPr>
+          <p:cNvPr id="4" name="TextBox 3">
+            <a:extLst>
+              <a:ext uri="{FF2B5EF4-FFF2-40B4-BE49-F238E27FC236}">
+                <a16:creationId xmlns:a16="http://schemas.microsoft.com/office/drawing/2014/main" id="{F51D74B0-FBDA-B294-EF7A-84AF0399BFF2}"/>
+              </a:ext>
+            </a:extLst>
+          </p:cNvPr>
+          <p:cNvSpPr txBox="1"/>
+          <p:nvPr/>
+        </p:nvSpPr>
+        <p:spPr>
+          <a:xfrm>
+            <a:off x="167303" y="498789"/>
+            <a:ext cx="1331844" cy="646331"/>
+          </a:xfrm>
+          <a:prstGeom prst="rect">
+            <a:avLst/>
+          </a:prstGeom>
+          <a:solidFill>
+            <a:schemeClr val="bg2"/>
+          </a:solidFill>
+          <a:ln>
+            <a:solidFill>
+              <a:srgbClr val="FF0000"/>
+            </a:solidFill>
+          </a:ln>
+        </p:spPr>
+        <p:txBody>
+          <a:bodyPr wrap="square" rtlCol="1">
+            <a:spAutoFit/>
+          </a:bodyPr>
+          <a:lstStyle/>
+          <a:p>
+            <a:r>
+              <a:rPr lang="en-US" dirty="0">
+                <a:solidFill>
+                  <a:srgbClr val="FF0000"/>
+                </a:solidFill>
+              </a:rPr>
+              <a:t>Esc – close or cancel</a:t>
+            </a:r>
+            <a:endParaRPr lang="he-IL" dirty="0">
+              <a:solidFill>
+                <a:srgbClr val="FF0000"/>
+              </a:solidFill>
+            </a:endParaRPr>
+          </a:p>
+        </p:txBody>
+      </p:sp>
+      <p:cxnSp>
+        <p:nvCxnSpPr>
+          <p:cNvPr id="9" name="Straight Arrow Connector 8">
+            <a:extLst>
+              <a:ext uri="{FF2B5EF4-FFF2-40B4-BE49-F238E27FC236}">
+                <a16:creationId xmlns:a16="http://schemas.microsoft.com/office/drawing/2014/main" id="{1C03BA06-A82A-84C7-8FD4-6C616B45FD74}"/>
+              </a:ext>
+            </a:extLst>
+          </p:cNvPr>
+          <p:cNvCxnSpPr>
+            <a:cxnSpLocks/>
+          </p:cNvCxnSpPr>
+          <p:nvPr/>
+        </p:nvCxnSpPr>
+        <p:spPr>
+          <a:xfrm>
+            <a:off x="1335174" y="1059599"/>
+            <a:ext cx="1288756" cy="639992"/>
+          </a:xfrm>
+          <a:prstGeom prst="straightConnector1">
+            <a:avLst/>
+          </a:prstGeom>
+          <a:ln w="38100">
+            <a:solidFill>
+              <a:srgbClr val="FF0000"/>
+            </a:solidFill>
+            <a:headEnd type="none" w="med" len="med"/>
+            <a:tailEnd type="triangle" w="med" len="med"/>
+          </a:ln>
+        </p:spPr>
+        <p:style>
+          <a:lnRef idx="1">
+            <a:schemeClr val="accent1"/>
+          </a:lnRef>
+          <a:fillRef idx="0">
+            <a:schemeClr val="accent1"/>
+          </a:fillRef>
+          <a:effectRef idx="0">
+            <a:schemeClr val="accent1"/>
+          </a:effectRef>
+          <a:fontRef idx="minor">
+            <a:schemeClr val="tx1"/>
+          </a:fontRef>
+        </p:style>
+      </p:cxnSp>
+      <p:sp>
+        <p:nvSpPr>
+          <p:cNvPr id="34" name="TextBox 33">
+            <a:extLst>
+              <a:ext uri="{FF2B5EF4-FFF2-40B4-BE49-F238E27FC236}">
+                <a16:creationId xmlns:a16="http://schemas.microsoft.com/office/drawing/2014/main" id="{FFA4DE85-443A-AFF3-7FE4-F010E6FE420C}"/>
+              </a:ext>
+            </a:extLst>
+          </p:cNvPr>
+          <p:cNvSpPr txBox="1"/>
+          <p:nvPr/>
+        </p:nvSpPr>
+        <p:spPr>
+          <a:xfrm>
+            <a:off x="10637728" y="2239334"/>
+            <a:ext cx="1331844" cy="646331"/>
+          </a:xfrm>
+          <a:prstGeom prst="rect">
+            <a:avLst/>
+          </a:prstGeom>
+          <a:solidFill>
+            <a:schemeClr val="bg2"/>
+          </a:solidFill>
+          <a:ln>
+            <a:solidFill>
+              <a:srgbClr val="FF0000"/>
+            </a:solidFill>
+          </a:ln>
+        </p:spPr>
+        <p:txBody>
+          <a:bodyPr wrap="square" rtlCol="1">
+            <a:spAutoFit/>
+          </a:bodyPr>
+          <a:lstStyle/>
+          <a:p>
+            <a:r>
+              <a:rPr lang="en-US" dirty="0">
+                <a:solidFill>
+                  <a:srgbClr val="FF0000"/>
+                </a:solidFill>
+              </a:rPr>
+              <a:t>Enter – OK or close</a:t>
+            </a:r>
+            <a:endParaRPr lang="he-IL" dirty="0">
+              <a:solidFill>
+                <a:srgbClr val="FF0000"/>
+              </a:solidFill>
+            </a:endParaRPr>
+          </a:p>
+        </p:txBody>
+      </p:sp>
+      <p:cxnSp>
+        <p:nvCxnSpPr>
+          <p:cNvPr id="35" name="Straight Arrow Connector 34">
+            <a:extLst>
+              <a:ext uri="{FF2B5EF4-FFF2-40B4-BE49-F238E27FC236}">
+                <a16:creationId xmlns:a16="http://schemas.microsoft.com/office/drawing/2014/main" id="{27A10725-9BAF-4112-5F99-81EFD7781E61}"/>
+              </a:ext>
+            </a:extLst>
+          </p:cNvPr>
+          <p:cNvCxnSpPr>
+            <a:cxnSpLocks/>
+          </p:cNvCxnSpPr>
+          <p:nvPr/>
+        </p:nvCxnSpPr>
+        <p:spPr>
+          <a:xfrm flipH="1">
+            <a:off x="9453766" y="2841906"/>
+            <a:ext cx="1192689" cy="191124"/>
+          </a:xfrm>
+          <a:prstGeom prst="straightConnector1">
+            <a:avLst/>
+          </a:prstGeom>
+          <a:ln w="38100">
+            <a:solidFill>
+              <a:srgbClr val="FF0000"/>
+            </a:solidFill>
+            <a:headEnd type="none" w="med" len="med"/>
+            <a:tailEnd type="triangle" w="med" len="med"/>
+          </a:ln>
+        </p:spPr>
+        <p:style>
+          <a:lnRef idx="1">
+            <a:schemeClr val="accent1"/>
+          </a:lnRef>
+          <a:fillRef idx="0">
+            <a:schemeClr val="accent1"/>
+          </a:fillRef>
+          <a:effectRef idx="0">
+            <a:schemeClr val="accent1"/>
+          </a:effectRef>
+          <a:fontRef idx="minor">
+            <a:schemeClr val="tx1"/>
+          </a:fontRef>
+        </p:style>
+      </p:cxnSp>
+      <p:sp>
+        <p:nvSpPr>
+          <p:cNvPr id="44" name="TextBox 43">
+            <a:extLst>
+              <a:ext uri="{FF2B5EF4-FFF2-40B4-BE49-F238E27FC236}">
+                <a16:creationId xmlns:a16="http://schemas.microsoft.com/office/drawing/2014/main" id="{E28114D9-F165-1C18-7E8A-C8F24E552EFD}"/>
+              </a:ext>
+            </a:extLst>
+          </p:cNvPr>
+          <p:cNvSpPr txBox="1"/>
+          <p:nvPr/>
+        </p:nvSpPr>
+        <p:spPr>
+          <a:xfrm>
+            <a:off x="10434435" y="414427"/>
+            <a:ext cx="1558806" cy="646331"/>
+          </a:xfrm>
+          <a:prstGeom prst="rect">
+            <a:avLst/>
+          </a:prstGeom>
+          <a:solidFill>
+            <a:schemeClr val="accent5">
+              <a:lumMod val="60000"/>
+              <a:lumOff val="40000"/>
+            </a:schemeClr>
+          </a:solidFill>
+          <a:ln>
+            <a:solidFill>
+              <a:srgbClr val="FF0000"/>
+            </a:solidFill>
+          </a:ln>
+        </p:spPr>
+        <p:txBody>
+          <a:bodyPr wrap="square" rtlCol="1">
+            <a:spAutoFit/>
+          </a:bodyPr>
+          <a:lstStyle/>
+          <a:p>
+            <a:r>
+              <a:rPr lang="en-US" dirty="0">
+                <a:solidFill>
+                  <a:srgbClr val="FF0000"/>
+                </a:solidFill>
+              </a:rPr>
+              <a:t>+ (plus) for </a:t>
+            </a:r>
+            <a:r>
+              <a:rPr lang="en-US" b="1" dirty="0">
+                <a:solidFill>
+                  <a:srgbClr val="FF0000"/>
+                </a:solidFill>
+              </a:rPr>
+              <a:t>larger</a:t>
+            </a:r>
+            <a:r>
+              <a:rPr lang="en-US" dirty="0">
+                <a:solidFill>
+                  <a:srgbClr val="FF0000"/>
+                </a:solidFill>
+              </a:rPr>
+              <a:t> buttons</a:t>
+            </a:r>
+            <a:endParaRPr lang="he-IL" dirty="0">
+              <a:solidFill>
+                <a:srgbClr val="FF0000"/>
+              </a:solidFill>
+            </a:endParaRPr>
+          </a:p>
+        </p:txBody>
+      </p:sp>
+      <p:sp>
+        <p:nvSpPr>
+          <p:cNvPr id="46" name="TextBox 45">
+            <a:extLst>
+              <a:ext uri="{FF2B5EF4-FFF2-40B4-BE49-F238E27FC236}">
+                <a16:creationId xmlns:a16="http://schemas.microsoft.com/office/drawing/2014/main" id="{1C012FE4-3506-5119-179F-553A51A7CCD0}"/>
+              </a:ext>
+            </a:extLst>
+          </p:cNvPr>
+          <p:cNvSpPr txBox="1"/>
+          <p:nvPr/>
+        </p:nvSpPr>
+        <p:spPr>
+          <a:xfrm>
+            <a:off x="8567914" y="414427"/>
+            <a:ext cx="1695987" cy="646331"/>
+          </a:xfrm>
+          <a:prstGeom prst="rect">
+            <a:avLst/>
+          </a:prstGeom>
+          <a:solidFill>
+            <a:schemeClr val="accent5">
+              <a:lumMod val="60000"/>
+              <a:lumOff val="40000"/>
+            </a:schemeClr>
+          </a:solidFill>
+          <a:ln>
+            <a:solidFill>
+              <a:srgbClr val="FF0000"/>
+            </a:solidFill>
+          </a:ln>
+        </p:spPr>
+        <p:txBody>
+          <a:bodyPr wrap="square" rtlCol="1">
+            <a:spAutoFit/>
+          </a:bodyPr>
+          <a:lstStyle/>
+          <a:p>
+            <a:r>
+              <a:rPr lang="en-US" dirty="0">
+                <a:solidFill>
+                  <a:srgbClr val="FF0000"/>
+                </a:solidFill>
+              </a:rPr>
+              <a:t>- (minus) for </a:t>
+            </a:r>
+            <a:r>
+              <a:rPr lang="en-US" b="1" dirty="0">
+                <a:solidFill>
+                  <a:srgbClr val="FF0000"/>
+                </a:solidFill>
+              </a:rPr>
+              <a:t>smaller</a:t>
+            </a:r>
+            <a:r>
+              <a:rPr lang="en-US" dirty="0">
+                <a:solidFill>
+                  <a:srgbClr val="FF0000"/>
+                </a:solidFill>
+              </a:rPr>
+              <a:t> buttons</a:t>
+            </a:r>
+            <a:endParaRPr lang="he-IL" dirty="0">
+              <a:solidFill>
+                <a:srgbClr val="FF0000"/>
+              </a:solidFill>
+            </a:endParaRPr>
+          </a:p>
+        </p:txBody>
+      </p:sp>
+      <p:cxnSp>
+        <p:nvCxnSpPr>
+          <p:cNvPr id="52" name="Straight Arrow Connector 51">
+            <a:extLst>
+              <a:ext uri="{FF2B5EF4-FFF2-40B4-BE49-F238E27FC236}">
+                <a16:creationId xmlns:a16="http://schemas.microsoft.com/office/drawing/2014/main" id="{325A7A7A-2152-D326-0E73-6B05D484DD14}"/>
+              </a:ext>
+            </a:extLst>
+          </p:cNvPr>
+          <p:cNvCxnSpPr>
+            <a:cxnSpLocks/>
+          </p:cNvCxnSpPr>
+          <p:nvPr/>
+        </p:nvCxnSpPr>
+        <p:spPr>
+          <a:xfrm flipH="1">
+            <a:off x="7991259" y="989744"/>
+            <a:ext cx="762803" cy="1043889"/>
+          </a:xfrm>
+          <a:prstGeom prst="straightConnector1">
+            <a:avLst/>
+          </a:prstGeom>
+          <a:ln w="38100">
+            <a:solidFill>
+              <a:srgbClr val="FF0000"/>
+            </a:solidFill>
+            <a:headEnd type="none" w="med" len="med"/>
+            <a:tailEnd type="triangle" w="med" len="med"/>
+          </a:ln>
+        </p:spPr>
+        <p:style>
+          <a:lnRef idx="1">
+            <a:schemeClr val="accent1"/>
+          </a:lnRef>
+          <a:fillRef idx="0">
+            <a:schemeClr val="accent1"/>
+          </a:fillRef>
+          <a:effectRef idx="0">
+            <a:schemeClr val="accent1"/>
+          </a:effectRef>
+          <a:fontRef idx="minor">
+            <a:schemeClr val="tx1"/>
+          </a:fontRef>
+        </p:style>
+      </p:cxnSp>
+      <p:cxnSp>
+        <p:nvCxnSpPr>
+          <p:cNvPr id="56" name="Straight Arrow Connector 55">
+            <a:extLst>
+              <a:ext uri="{FF2B5EF4-FFF2-40B4-BE49-F238E27FC236}">
+                <a16:creationId xmlns:a16="http://schemas.microsoft.com/office/drawing/2014/main" id="{10308F7C-E012-8921-1021-F746D79D0BAE}"/>
+              </a:ext>
+            </a:extLst>
+          </p:cNvPr>
+          <p:cNvCxnSpPr>
+            <a:cxnSpLocks/>
+          </p:cNvCxnSpPr>
+          <p:nvPr/>
+        </p:nvCxnSpPr>
+        <p:spPr>
+          <a:xfrm flipH="1">
+            <a:off x="8676861" y="1017257"/>
+            <a:ext cx="1955913" cy="1058861"/>
+          </a:xfrm>
+          <a:prstGeom prst="straightConnector1">
+            <a:avLst/>
+          </a:prstGeom>
+          <a:ln w="38100">
+            <a:solidFill>
+              <a:srgbClr val="FF0000"/>
+            </a:solidFill>
+            <a:headEnd type="none" w="med" len="med"/>
+            <a:tailEnd type="triangle" w="med" len="med"/>
+          </a:ln>
+        </p:spPr>
+        <p:style>
+          <a:lnRef idx="1">
+            <a:schemeClr val="accent1"/>
+          </a:lnRef>
+          <a:fillRef idx="0">
+            <a:schemeClr val="accent1"/>
+          </a:fillRef>
+          <a:effectRef idx="0">
+            <a:schemeClr val="accent1"/>
+          </a:effectRef>
+          <a:fontRef idx="minor">
+            <a:schemeClr val="tx1"/>
+          </a:fontRef>
+        </p:style>
+      </p:cxnSp>
+      <p:cxnSp>
+        <p:nvCxnSpPr>
+          <p:cNvPr id="66" name="Straight Arrow Connector 65">
+            <a:extLst>
+              <a:ext uri="{FF2B5EF4-FFF2-40B4-BE49-F238E27FC236}">
+                <a16:creationId xmlns:a16="http://schemas.microsoft.com/office/drawing/2014/main" id="{4BE0823D-3C13-E11E-F72D-7E1DA5822162}"/>
+              </a:ext>
+            </a:extLst>
+          </p:cNvPr>
+          <p:cNvCxnSpPr>
+            <a:cxnSpLocks/>
+          </p:cNvCxnSpPr>
+          <p:nvPr/>
+        </p:nvCxnSpPr>
+        <p:spPr>
+          <a:xfrm>
+            <a:off x="7775695" y="1059599"/>
+            <a:ext cx="215564" cy="974034"/>
+          </a:xfrm>
+          <a:prstGeom prst="straightConnector1">
+            <a:avLst/>
+          </a:prstGeom>
+          <a:ln w="38100">
+            <a:solidFill>
+              <a:srgbClr val="FF0000"/>
+            </a:solidFill>
+            <a:headEnd type="none" w="med" len="med"/>
+            <a:tailEnd type="triangle" w="med" len="med"/>
+          </a:ln>
+        </p:spPr>
+        <p:style>
+          <a:lnRef idx="1">
+            <a:schemeClr val="accent1"/>
+          </a:lnRef>
+          <a:fillRef idx="0">
+            <a:schemeClr val="accent1"/>
+          </a:fillRef>
+          <a:effectRef idx="0">
+            <a:schemeClr val="accent1"/>
+          </a:effectRef>
+          <a:fontRef idx="minor">
+            <a:schemeClr val="tx1"/>
+          </a:fontRef>
+        </p:style>
+      </p:cxnSp>
+      <p:sp>
+        <p:nvSpPr>
+          <p:cNvPr id="68" name="TextBox 67">
+            <a:extLst>
+              <a:ext uri="{FF2B5EF4-FFF2-40B4-BE49-F238E27FC236}">
+                <a16:creationId xmlns:a16="http://schemas.microsoft.com/office/drawing/2014/main" id="{4E80783D-1823-BFCA-9C36-CFC98EA71D16}"/>
+              </a:ext>
+            </a:extLst>
+          </p:cNvPr>
+          <p:cNvSpPr txBox="1"/>
+          <p:nvPr/>
+        </p:nvSpPr>
+        <p:spPr>
+          <a:xfrm>
+            <a:off x="10627102" y="3193189"/>
+            <a:ext cx="1331844" cy="923330"/>
+          </a:xfrm>
+          <a:prstGeom prst="rect">
+            <a:avLst/>
+          </a:prstGeom>
+          <a:solidFill>
+            <a:srgbClr val="FFFF00"/>
+          </a:solidFill>
+          <a:ln>
+            <a:solidFill>
+              <a:srgbClr val="FF0000"/>
+            </a:solidFill>
+          </a:ln>
+        </p:spPr>
+        <p:txBody>
+          <a:bodyPr wrap="square" rtlCol="1">
+            <a:spAutoFit/>
+          </a:bodyPr>
+          <a:lstStyle/>
+          <a:p>
+            <a:r>
+              <a:rPr lang="en-US" dirty="0">
+                <a:solidFill>
+                  <a:srgbClr val="FF0000"/>
+                </a:solidFill>
+              </a:rPr>
+              <a:t>Right Shift – hit </a:t>
+            </a:r>
+            <a:r>
+              <a:rPr lang="en-US" b="1" dirty="0">
+                <a:solidFill>
+                  <a:srgbClr val="FF0000"/>
+                </a:solidFill>
+              </a:rPr>
+              <a:t>rudder</a:t>
+            </a:r>
+            <a:r>
+              <a:rPr lang="en-US" dirty="0">
+                <a:solidFill>
+                  <a:srgbClr val="FF0000"/>
+                </a:solidFill>
+              </a:rPr>
+              <a:t> to the right</a:t>
+            </a:r>
+            <a:endParaRPr lang="he-IL" dirty="0">
+              <a:solidFill>
+                <a:srgbClr val="FF0000"/>
+              </a:solidFill>
+            </a:endParaRPr>
+          </a:p>
+        </p:txBody>
+      </p:sp>
+      <p:cxnSp>
+        <p:nvCxnSpPr>
+          <p:cNvPr id="36" name="Straight Arrow Connector 35">
+            <a:extLst>
+              <a:ext uri="{FF2B5EF4-FFF2-40B4-BE49-F238E27FC236}">
+                <a16:creationId xmlns:a16="http://schemas.microsoft.com/office/drawing/2014/main" id="{DAD7D898-711A-E16D-7C5E-EE741BC370EF}"/>
+              </a:ext>
+            </a:extLst>
+          </p:cNvPr>
+          <p:cNvCxnSpPr>
+            <a:cxnSpLocks/>
+          </p:cNvCxnSpPr>
+          <p:nvPr/>
+        </p:nvCxnSpPr>
+        <p:spPr>
+          <a:xfrm flipH="1" flipV="1">
+            <a:off x="9647583" y="3658183"/>
+            <a:ext cx="1060170" cy="166788"/>
+          </a:xfrm>
+          <a:prstGeom prst="straightConnector1">
+            <a:avLst/>
+          </a:prstGeom>
+          <a:ln w="38100">
+            <a:solidFill>
+              <a:srgbClr val="FF0000"/>
+            </a:solidFill>
+            <a:headEnd type="none" w="med" len="med"/>
+            <a:tailEnd type="triangle" w="med" len="med"/>
+          </a:ln>
+        </p:spPr>
+        <p:style>
+          <a:lnRef idx="1">
+            <a:schemeClr val="accent1"/>
+          </a:lnRef>
+          <a:fillRef idx="0">
+            <a:schemeClr val="accent1"/>
+          </a:fillRef>
+          <a:effectRef idx="0">
+            <a:schemeClr val="accent1"/>
+          </a:effectRef>
+          <a:fontRef idx="minor">
+            <a:schemeClr val="tx1"/>
+          </a:fontRef>
+        </p:style>
+      </p:cxnSp>
+      <p:sp>
+        <p:nvSpPr>
+          <p:cNvPr id="71" name="TextBox 70">
+            <a:extLst>
+              <a:ext uri="{FF2B5EF4-FFF2-40B4-BE49-F238E27FC236}">
+                <a16:creationId xmlns:a16="http://schemas.microsoft.com/office/drawing/2014/main" id="{7326055C-9722-C25E-9430-D4B21DD31389}"/>
+              </a:ext>
+            </a:extLst>
+          </p:cNvPr>
+          <p:cNvSpPr txBox="1"/>
+          <p:nvPr/>
+        </p:nvSpPr>
+        <p:spPr>
+          <a:xfrm>
+            <a:off x="10623152" y="4405924"/>
+            <a:ext cx="1331844" cy="923330"/>
+          </a:xfrm>
+          <a:prstGeom prst="rect">
+            <a:avLst/>
+          </a:prstGeom>
+          <a:solidFill>
+            <a:srgbClr val="FFFF00"/>
+          </a:solidFill>
+          <a:ln>
+            <a:solidFill>
+              <a:srgbClr val="FF0000"/>
+            </a:solidFill>
+          </a:ln>
+        </p:spPr>
+        <p:txBody>
+          <a:bodyPr wrap="square" rtlCol="1">
+            <a:spAutoFit/>
+          </a:bodyPr>
+          <a:lstStyle>
+            <a:defPPr>
+              <a:defRPr lang="he-IL"/>
+            </a:defPPr>
+            <a:lvl1pPr>
+              <a:defRPr>
+                <a:solidFill>
+                  <a:srgbClr val="FF0000"/>
+                </a:solidFill>
+              </a:defRPr>
+            </a:lvl1pPr>
+          </a:lstStyle>
+          <a:p>
+            <a:r>
+              <a:rPr lang="en-US" dirty="0">
+                <a:solidFill>
+                  <a:srgbClr val="FF0000"/>
+                </a:solidFill>
+              </a:rPr>
+              <a:t>Page Down – lower the </a:t>
+            </a:r>
+            <a:r>
+              <a:rPr lang="en-US" b="1" dirty="0">
+                <a:solidFill>
+                  <a:srgbClr val="FF0000"/>
+                </a:solidFill>
+              </a:rPr>
+              <a:t>keel</a:t>
+            </a:r>
+            <a:endParaRPr lang="he-IL" b="1" dirty="0">
+              <a:solidFill>
+                <a:srgbClr val="FF0000"/>
+              </a:solidFill>
+            </a:endParaRPr>
+          </a:p>
+        </p:txBody>
+      </p:sp>
+      <p:cxnSp>
+        <p:nvCxnSpPr>
+          <p:cNvPr id="54" name="Straight Arrow Connector 53">
+            <a:extLst>
+              <a:ext uri="{FF2B5EF4-FFF2-40B4-BE49-F238E27FC236}">
+                <a16:creationId xmlns:a16="http://schemas.microsoft.com/office/drawing/2014/main" id="{54BC26C7-7F1C-53E0-9098-C923B6105505}"/>
+              </a:ext>
+            </a:extLst>
+          </p:cNvPr>
+          <p:cNvCxnSpPr>
+            <a:cxnSpLocks/>
+          </p:cNvCxnSpPr>
+          <p:nvPr/>
+        </p:nvCxnSpPr>
+        <p:spPr>
+          <a:xfrm flipH="1" flipV="1">
+            <a:off x="9799996" y="4194313"/>
+            <a:ext cx="990586" cy="655983"/>
+          </a:xfrm>
+          <a:prstGeom prst="straightConnector1">
+            <a:avLst/>
+          </a:prstGeom>
+          <a:ln w="38100">
+            <a:solidFill>
+              <a:srgbClr val="FF0000"/>
+            </a:solidFill>
+            <a:headEnd type="none" w="med" len="med"/>
+            <a:tailEnd type="triangle" w="med" len="med"/>
+          </a:ln>
+        </p:spPr>
+        <p:style>
+          <a:lnRef idx="1">
+            <a:schemeClr val="accent1"/>
+          </a:lnRef>
+          <a:fillRef idx="0">
+            <a:schemeClr val="accent1"/>
+          </a:fillRef>
+          <a:effectRef idx="0">
+            <a:schemeClr val="accent1"/>
+          </a:effectRef>
+          <a:fontRef idx="minor">
+            <a:schemeClr val="tx1"/>
+          </a:fontRef>
+        </p:style>
+      </p:cxnSp>
+      <p:sp>
+        <p:nvSpPr>
+          <p:cNvPr id="72" name="TextBox 71">
+            <a:extLst>
+              <a:ext uri="{FF2B5EF4-FFF2-40B4-BE49-F238E27FC236}">
+                <a16:creationId xmlns:a16="http://schemas.microsoft.com/office/drawing/2014/main" id="{3CAAD990-E1CE-D529-3711-89C2A73DD54D}"/>
+              </a:ext>
+            </a:extLst>
+          </p:cNvPr>
+          <p:cNvSpPr txBox="1"/>
+          <p:nvPr/>
+        </p:nvSpPr>
+        <p:spPr>
+          <a:xfrm>
+            <a:off x="70875" y="5218331"/>
+            <a:ext cx="1051047" cy="369332"/>
+          </a:xfrm>
+          <a:prstGeom prst="rect">
+            <a:avLst/>
+          </a:prstGeom>
+          <a:noFill/>
+        </p:spPr>
+        <p:txBody>
+          <a:bodyPr wrap="square" rtlCol="1">
+            <a:spAutoFit/>
+          </a:bodyPr>
+          <a:lstStyle/>
+          <a:p>
+            <a:r>
+              <a:rPr lang="en-US" dirty="0"/>
+              <a:t>Legend:</a:t>
+            </a:r>
+            <a:endParaRPr lang="he-IL" dirty="0"/>
+          </a:p>
+        </p:txBody>
+      </p:sp>
+      <p:sp>
+        <p:nvSpPr>
+          <p:cNvPr id="73" name="TextBox 72">
+            <a:extLst>
+              <a:ext uri="{FF2B5EF4-FFF2-40B4-BE49-F238E27FC236}">
+                <a16:creationId xmlns:a16="http://schemas.microsoft.com/office/drawing/2014/main" id="{9DDF3613-7975-98AB-9599-99561CB43CAA}"/>
+              </a:ext>
+            </a:extLst>
+          </p:cNvPr>
+          <p:cNvSpPr txBox="1"/>
+          <p:nvPr/>
+        </p:nvSpPr>
+        <p:spPr>
+          <a:xfrm>
+            <a:off x="195481" y="5534656"/>
+            <a:ext cx="1331844" cy="369332"/>
+          </a:xfrm>
+          <a:prstGeom prst="rect">
+            <a:avLst/>
+          </a:prstGeom>
+          <a:solidFill>
+            <a:srgbClr val="FFFF00"/>
+          </a:solidFill>
+          <a:ln>
+            <a:solidFill>
+              <a:srgbClr val="FF0000"/>
+            </a:solidFill>
+          </a:ln>
+        </p:spPr>
+        <p:txBody>
+          <a:bodyPr wrap="square" rtlCol="1">
+            <a:spAutoFit/>
+          </a:bodyPr>
+          <a:lstStyle>
+            <a:defPPr>
+              <a:defRPr lang="he-IL"/>
+            </a:defPPr>
+            <a:lvl1pPr>
+              <a:defRPr>
+                <a:solidFill>
+                  <a:srgbClr val="FF0000"/>
+                </a:solidFill>
+              </a:defRPr>
+            </a:lvl1pPr>
+          </a:lstStyle>
+          <a:p>
+            <a:r>
+              <a:rPr lang="en-US" dirty="0"/>
+              <a:t>Navigations</a:t>
+            </a:r>
+            <a:endParaRPr lang="he-IL" dirty="0"/>
+          </a:p>
+        </p:txBody>
+      </p:sp>
+      <p:sp>
+        <p:nvSpPr>
+          <p:cNvPr id="74" name="TextBox 73">
+            <a:extLst>
+              <a:ext uri="{FF2B5EF4-FFF2-40B4-BE49-F238E27FC236}">
+                <a16:creationId xmlns:a16="http://schemas.microsoft.com/office/drawing/2014/main" id="{DC6A9CC8-3CC1-DBE2-CE90-E7E91554B456}"/>
+              </a:ext>
+            </a:extLst>
+          </p:cNvPr>
+          <p:cNvSpPr txBox="1"/>
+          <p:nvPr/>
+        </p:nvSpPr>
+        <p:spPr>
+          <a:xfrm>
+            <a:off x="205420" y="5958301"/>
+            <a:ext cx="1643260" cy="369332"/>
+          </a:xfrm>
+          <a:prstGeom prst="rect">
+            <a:avLst/>
+          </a:prstGeom>
+          <a:solidFill>
+            <a:schemeClr val="accent5">
+              <a:lumMod val="60000"/>
+              <a:lumOff val="40000"/>
+            </a:schemeClr>
+          </a:solidFill>
+          <a:ln>
+            <a:solidFill>
+              <a:srgbClr val="FF0000"/>
+            </a:solidFill>
+          </a:ln>
+        </p:spPr>
+        <p:txBody>
+          <a:bodyPr wrap="square" rtlCol="1">
+            <a:spAutoFit/>
+          </a:bodyPr>
+          <a:lstStyle/>
+          <a:p>
+            <a:r>
+              <a:rPr lang="en-US" dirty="0">
+                <a:solidFill>
+                  <a:srgbClr val="FF0000"/>
+                </a:solidFill>
+              </a:rPr>
+              <a:t>Game controls</a:t>
+            </a:r>
+            <a:endParaRPr lang="he-IL" dirty="0">
+              <a:solidFill>
+                <a:srgbClr val="FF0000"/>
+              </a:solidFill>
+            </a:endParaRPr>
+          </a:p>
+        </p:txBody>
+      </p:sp>
+      <p:sp>
+        <p:nvSpPr>
+          <p:cNvPr id="75" name="TextBox 74">
+            <a:extLst>
+              <a:ext uri="{FF2B5EF4-FFF2-40B4-BE49-F238E27FC236}">
+                <a16:creationId xmlns:a16="http://schemas.microsoft.com/office/drawing/2014/main" id="{D359E823-E307-63CC-A74E-D1BA515E2419}"/>
+              </a:ext>
+            </a:extLst>
+          </p:cNvPr>
+          <p:cNvSpPr txBox="1"/>
+          <p:nvPr/>
+        </p:nvSpPr>
+        <p:spPr>
+          <a:xfrm>
+            <a:off x="205435" y="6383946"/>
+            <a:ext cx="1643259" cy="369332"/>
+          </a:xfrm>
+          <a:prstGeom prst="rect">
+            <a:avLst/>
+          </a:prstGeom>
+          <a:solidFill>
+            <a:schemeClr val="bg2"/>
+          </a:solidFill>
+          <a:ln>
+            <a:solidFill>
+              <a:srgbClr val="FF0000"/>
+            </a:solidFill>
+          </a:ln>
+        </p:spPr>
+        <p:txBody>
+          <a:bodyPr wrap="square" rtlCol="1">
+            <a:spAutoFit/>
+          </a:bodyPr>
+          <a:lstStyle/>
+          <a:p>
+            <a:r>
+              <a:rPr lang="en-US" dirty="0">
+                <a:solidFill>
+                  <a:srgbClr val="FF0000"/>
+                </a:solidFill>
+              </a:rPr>
+              <a:t>Dialogs control</a:t>
+            </a:r>
+            <a:endParaRPr lang="he-IL" dirty="0">
+              <a:solidFill>
+                <a:srgbClr val="FF0000"/>
+              </a:solidFill>
+            </a:endParaRPr>
+          </a:p>
+        </p:txBody>
+      </p:sp>
     </p:spTree>
     <p:extLst>
       <p:ext uri="{BB962C8B-B14F-4D97-AF65-F5344CB8AC3E}">
@@ -5582,9 +6237,9 @@
           <p:nvPr/>
         </p:nvCxnSpPr>
         <p:spPr>
-          <a:xfrm rot="18900000">
-            <a:off x="4450301" y="2236746"/>
-            <a:ext cx="0" cy="586409"/>
+          <a:xfrm>
+            <a:off x="4353339" y="2425148"/>
+            <a:ext cx="304289" cy="312130"/>
           </a:xfrm>
           <a:prstGeom prst="straightConnector1">
             <a:avLst/>
@@ -5627,9 +6282,9 @@
           <p:nvPr/>
         </p:nvCxnSpPr>
         <p:spPr>
-          <a:xfrm rot="2700000">
-            <a:off x="4057155" y="2229680"/>
-            <a:ext cx="0" cy="586409"/>
+          <a:xfrm flipH="1">
+            <a:off x="3849828" y="2425148"/>
+            <a:ext cx="284850" cy="305064"/>
           </a:xfrm>
           <a:prstGeom prst="straightConnector1">
             <a:avLst/>
@@ -5657,117 +6312,628 @@
           </a:fontRef>
         </p:style>
       </p:cxnSp>
-      <p:grpSp>
-        <p:nvGrpSpPr>
-          <p:cNvPr id="15" name="Group 14">
-            <a:extLst>
-              <a:ext uri="{FF2B5EF4-FFF2-40B4-BE49-F238E27FC236}">
-                <a16:creationId xmlns:a16="http://schemas.microsoft.com/office/drawing/2014/main" id="{96FEB143-6798-45B0-BB9E-2C31E7FECA03}"/>
-              </a:ext>
-            </a:extLst>
-          </p:cNvPr>
-          <p:cNvGrpSpPr/>
+      <p:cxnSp>
+        <p:nvCxnSpPr>
+          <p:cNvPr id="17" name="Straight Arrow Connector 16">
+            <a:extLst>
+              <a:ext uri="{FF2B5EF4-FFF2-40B4-BE49-F238E27FC236}">
+                <a16:creationId xmlns:a16="http://schemas.microsoft.com/office/drawing/2014/main" id="{8397E030-6FBA-FCAB-2243-7F873E5CA4AC}"/>
+              </a:ext>
+            </a:extLst>
+          </p:cNvPr>
+          <p:cNvCxnSpPr>
+            <a:cxnSpLocks/>
+          </p:cNvCxnSpPr>
           <p:nvPr/>
-        </p:nvGrpSpPr>
-        <p:grpSpPr>
-          <a:xfrm rot="10800000">
-            <a:off x="4058590" y="1840506"/>
-            <a:ext cx="686351" cy="586409"/>
-            <a:chOff x="2483790" y="2226586"/>
-            <a:chExt cx="686351" cy="586409"/>
-          </a:xfrm>
-        </p:grpSpPr>
-        <p:cxnSp>
-          <p:nvCxnSpPr>
-            <p:cNvPr id="17" name="Straight Arrow Connector 16">
-              <a:extLst>
-                <a:ext uri="{FF2B5EF4-FFF2-40B4-BE49-F238E27FC236}">
-                  <a16:creationId xmlns:a16="http://schemas.microsoft.com/office/drawing/2014/main" id="{8397E030-6FBA-FCAB-2243-7F873E5CA4AC}"/>
-                </a:ext>
-              </a:extLst>
-            </p:cNvPr>
-            <p:cNvCxnSpPr>
-              <a:cxnSpLocks/>
-            </p:cNvCxnSpPr>
-            <p:nvPr/>
-          </p:nvCxnSpPr>
-          <p:spPr>
-            <a:xfrm rot="-2700000">
-              <a:off x="3170141" y="2226586"/>
-              <a:ext cx="0" cy="586409"/>
-            </a:xfrm>
-            <a:prstGeom prst="straightConnector1">
-              <a:avLst/>
-            </a:prstGeom>
-            <a:ln w="76200">
+        </p:nvCxnSpPr>
+        <p:spPr>
+          <a:xfrm flipH="1" flipV="1">
+            <a:off x="3851263" y="1926384"/>
+            <a:ext cx="283415" cy="368853"/>
+          </a:xfrm>
+          <a:prstGeom prst="straightConnector1">
+            <a:avLst/>
+          </a:prstGeom>
+          <a:ln w="76200">
+            <a:solidFill>
+              <a:srgbClr val="FF0000"/>
+            </a:solidFill>
+            <a:headEnd type="triangle" w="med" len="med"/>
+            <a:tailEnd type="none" w="med" len="med"/>
+          </a:ln>
+        </p:spPr>
+        <p:style>
+          <a:lnRef idx="1">
+            <a:schemeClr val="accent1"/>
+          </a:lnRef>
+          <a:fillRef idx="0">
+            <a:schemeClr val="accent1"/>
+          </a:fillRef>
+          <a:effectRef idx="0">
+            <a:schemeClr val="accent1"/>
+          </a:effectRef>
+          <a:fontRef idx="minor">
+            <a:schemeClr val="tx1"/>
+          </a:fontRef>
+        </p:style>
+      </p:cxnSp>
+      <p:cxnSp>
+        <p:nvCxnSpPr>
+          <p:cNvPr id="18" name="Straight Arrow Connector 17">
+            <a:extLst>
+              <a:ext uri="{FF2B5EF4-FFF2-40B4-BE49-F238E27FC236}">
+                <a16:creationId xmlns:a16="http://schemas.microsoft.com/office/drawing/2014/main" id="{97020097-744A-DC7F-2493-CAB2FF21B3FF}"/>
+              </a:ext>
+            </a:extLst>
+          </p:cNvPr>
+          <p:cNvCxnSpPr>
+            <a:cxnSpLocks/>
+          </p:cNvCxnSpPr>
+          <p:nvPr/>
+        </p:nvCxnSpPr>
+        <p:spPr>
+          <a:xfrm flipV="1">
+            <a:off x="4353339" y="1933450"/>
+            <a:ext cx="305724" cy="361787"/>
+          </a:xfrm>
+          <a:prstGeom prst="straightConnector1">
+            <a:avLst/>
+          </a:prstGeom>
+          <a:ln w="76200">
+            <a:solidFill>
+              <a:srgbClr val="FF0000"/>
+            </a:solidFill>
+            <a:headEnd type="triangle" w="med" len="med"/>
+            <a:tailEnd type="none" w="med" len="med"/>
+          </a:ln>
+        </p:spPr>
+        <p:style>
+          <a:lnRef idx="1">
+            <a:schemeClr val="accent1"/>
+          </a:lnRef>
+          <a:fillRef idx="0">
+            <a:schemeClr val="accent1"/>
+          </a:fillRef>
+          <a:effectRef idx="0">
+            <a:schemeClr val="accent1"/>
+          </a:effectRef>
+          <a:fontRef idx="minor">
+            <a:schemeClr val="tx1"/>
+          </a:fontRef>
+        </p:style>
+      </p:cxnSp>
+      <p:cxnSp>
+        <p:nvCxnSpPr>
+          <p:cNvPr id="2" name="Straight Arrow Connector 1">
+            <a:extLst>
+              <a:ext uri="{FF2B5EF4-FFF2-40B4-BE49-F238E27FC236}">
+                <a16:creationId xmlns:a16="http://schemas.microsoft.com/office/drawing/2014/main" id="{204BF571-FF06-71EB-0BF0-250A05D319BB}"/>
+              </a:ext>
+            </a:extLst>
+          </p:cNvPr>
+          <p:cNvCxnSpPr>
+            <a:cxnSpLocks/>
+          </p:cNvCxnSpPr>
+          <p:nvPr/>
+        </p:nvCxnSpPr>
+        <p:spPr>
+          <a:xfrm rot="18900000">
+            <a:off x="3154020" y="3819939"/>
+            <a:ext cx="0" cy="586409"/>
+          </a:xfrm>
+          <a:prstGeom prst="straightConnector1">
+            <a:avLst/>
+          </a:prstGeom>
+          <a:ln w="76200">
+            <a:solidFill>
+              <a:srgbClr val="00B050"/>
+            </a:solidFill>
+            <a:tailEnd type="triangle"/>
+          </a:ln>
+        </p:spPr>
+        <p:style>
+          <a:lnRef idx="1">
+            <a:schemeClr val="accent1"/>
+          </a:lnRef>
+          <a:fillRef idx="0">
+            <a:schemeClr val="accent1"/>
+          </a:fillRef>
+          <a:effectRef idx="0">
+            <a:schemeClr val="accent1"/>
+          </a:effectRef>
+          <a:fontRef idx="minor">
+            <a:schemeClr val="tx1"/>
+          </a:fontRef>
+        </p:style>
+      </p:cxnSp>
+      <p:cxnSp>
+        <p:nvCxnSpPr>
+          <p:cNvPr id="4" name="Straight Arrow Connector 3">
+            <a:extLst>
+              <a:ext uri="{FF2B5EF4-FFF2-40B4-BE49-F238E27FC236}">
+                <a16:creationId xmlns:a16="http://schemas.microsoft.com/office/drawing/2014/main" id="{2D69E1C3-828B-2495-7CF7-1FEE1888FC39}"/>
+              </a:ext>
+            </a:extLst>
+          </p:cNvPr>
+          <p:cNvCxnSpPr>
+            <a:cxnSpLocks/>
+          </p:cNvCxnSpPr>
+          <p:nvPr/>
+        </p:nvCxnSpPr>
+        <p:spPr>
+          <a:xfrm rot="2700000">
+            <a:off x="2760874" y="3812873"/>
+            <a:ext cx="0" cy="586409"/>
+          </a:xfrm>
+          <a:prstGeom prst="straightConnector1">
+            <a:avLst/>
+          </a:prstGeom>
+          <a:ln w="76200">
+            <a:solidFill>
+              <a:srgbClr val="00B050"/>
+            </a:solidFill>
+            <a:tailEnd type="triangle"/>
+          </a:ln>
+        </p:spPr>
+        <p:style>
+          <a:lnRef idx="1">
+            <a:schemeClr val="accent1"/>
+          </a:lnRef>
+          <a:fillRef idx="0">
+            <a:schemeClr val="accent1"/>
+          </a:fillRef>
+          <a:effectRef idx="0">
+            <a:schemeClr val="accent1"/>
+          </a:effectRef>
+          <a:fontRef idx="minor">
+            <a:schemeClr val="tx1"/>
+          </a:fontRef>
+        </p:style>
+      </p:cxnSp>
+      <p:cxnSp>
+        <p:nvCxnSpPr>
+          <p:cNvPr id="8" name="Straight Arrow Connector 7">
+            <a:extLst>
+              <a:ext uri="{FF2B5EF4-FFF2-40B4-BE49-F238E27FC236}">
+                <a16:creationId xmlns:a16="http://schemas.microsoft.com/office/drawing/2014/main" id="{1DCE48AA-029C-3ADD-5A23-4818F00363ED}"/>
+              </a:ext>
+            </a:extLst>
+          </p:cNvPr>
+          <p:cNvCxnSpPr>
+            <a:cxnSpLocks/>
+          </p:cNvCxnSpPr>
+          <p:nvPr/>
+        </p:nvCxnSpPr>
+        <p:spPr>
+          <a:xfrm rot="8100000">
+            <a:off x="2762309" y="3423699"/>
+            <a:ext cx="0" cy="586409"/>
+          </a:xfrm>
+          <a:prstGeom prst="straightConnector1">
+            <a:avLst/>
+          </a:prstGeom>
+          <a:ln w="76200">
+            <a:solidFill>
+              <a:srgbClr val="00B050"/>
+            </a:solidFill>
+            <a:tailEnd type="triangle"/>
+          </a:ln>
+        </p:spPr>
+        <p:style>
+          <a:lnRef idx="1">
+            <a:schemeClr val="accent1"/>
+          </a:lnRef>
+          <a:fillRef idx="0">
+            <a:schemeClr val="accent1"/>
+          </a:fillRef>
+          <a:effectRef idx="0">
+            <a:schemeClr val="accent1"/>
+          </a:effectRef>
+          <a:fontRef idx="minor">
+            <a:schemeClr val="tx1"/>
+          </a:fontRef>
+        </p:style>
+      </p:cxnSp>
+      <p:cxnSp>
+        <p:nvCxnSpPr>
+          <p:cNvPr id="9" name="Straight Arrow Connector 8">
+            <a:extLst>
+              <a:ext uri="{FF2B5EF4-FFF2-40B4-BE49-F238E27FC236}">
+                <a16:creationId xmlns:a16="http://schemas.microsoft.com/office/drawing/2014/main" id="{0AB216F3-52A3-B900-AF53-0FCC36B998A9}"/>
+              </a:ext>
+            </a:extLst>
+          </p:cNvPr>
+          <p:cNvCxnSpPr>
+            <a:cxnSpLocks/>
+          </p:cNvCxnSpPr>
+          <p:nvPr/>
+        </p:nvCxnSpPr>
+        <p:spPr>
+          <a:xfrm rot="13500000">
+            <a:off x="3155455" y="3430765"/>
+            <a:ext cx="0" cy="586409"/>
+          </a:xfrm>
+          <a:prstGeom prst="straightConnector1">
+            <a:avLst/>
+          </a:prstGeom>
+          <a:ln w="76200">
+            <a:solidFill>
+              <a:srgbClr val="00B050"/>
+            </a:solidFill>
+            <a:tailEnd type="triangle"/>
+          </a:ln>
+        </p:spPr>
+        <p:style>
+          <a:lnRef idx="1">
+            <a:schemeClr val="accent1"/>
+          </a:lnRef>
+          <a:fillRef idx="0">
+            <a:schemeClr val="accent1"/>
+          </a:fillRef>
+          <a:effectRef idx="0">
+            <a:schemeClr val="accent1"/>
+          </a:effectRef>
+          <a:fontRef idx="minor">
+            <a:schemeClr val="tx1"/>
+          </a:fontRef>
+        </p:style>
+      </p:cxnSp>
+      <p:sp>
+        <p:nvSpPr>
+          <p:cNvPr id="11" name="Oval 10">
+            <a:extLst>
+              <a:ext uri="{FF2B5EF4-FFF2-40B4-BE49-F238E27FC236}">
+                <a16:creationId xmlns:a16="http://schemas.microsoft.com/office/drawing/2014/main" id="{D79CF7A8-A2FC-CEC4-5CE5-2B69FE1C6220}"/>
+              </a:ext>
+            </a:extLst>
+          </p:cNvPr>
+          <p:cNvSpPr/>
+          <p:nvPr/>
+        </p:nvSpPr>
+        <p:spPr>
+          <a:xfrm>
+            <a:off x="2747399" y="3733096"/>
+            <a:ext cx="414654" cy="389174"/>
+          </a:xfrm>
+          <a:prstGeom prst="ellipse">
+            <a:avLst/>
+          </a:prstGeom>
+          <a:solidFill>
+            <a:schemeClr val="bg1"/>
+          </a:solidFill>
+          <a:ln>
+            <a:noFill/>
+          </a:ln>
+        </p:spPr>
+        <p:style>
+          <a:lnRef idx="2">
+            <a:schemeClr val="accent1">
+              <a:shade val="15000"/>
+            </a:schemeClr>
+          </a:lnRef>
+          <a:fillRef idx="1">
+            <a:schemeClr val="accent1"/>
+          </a:fillRef>
+          <a:effectRef idx="0">
+            <a:schemeClr val="accent1"/>
+          </a:effectRef>
+          <a:fontRef idx="minor">
+            <a:schemeClr val="lt1"/>
+          </a:fontRef>
+        </p:style>
+        <p:txBody>
+          <a:bodyPr rtlCol="1" anchor="ctr"/>
+          <a:lstStyle/>
+          <a:p>
+            <a:pPr algn="ctr"/>
+            <a:endParaRPr lang="he-IL"/>
+          </a:p>
+        </p:txBody>
+      </p:sp>
+      <p:cxnSp>
+        <p:nvCxnSpPr>
+          <p:cNvPr id="12" name="Straight Arrow Connector 11">
+            <a:extLst>
+              <a:ext uri="{FF2B5EF4-FFF2-40B4-BE49-F238E27FC236}">
+                <a16:creationId xmlns:a16="http://schemas.microsoft.com/office/drawing/2014/main" id="{F96F3E6E-D504-D988-12BF-DAF82513AFA6}"/>
+              </a:ext>
+            </a:extLst>
+          </p:cNvPr>
+          <p:cNvCxnSpPr>
+            <a:cxnSpLocks/>
+          </p:cNvCxnSpPr>
+          <p:nvPr/>
+        </p:nvCxnSpPr>
+        <p:spPr>
+          <a:xfrm>
+            <a:off x="4316898" y="4028661"/>
+            <a:ext cx="304289" cy="312130"/>
+          </a:xfrm>
+          <a:prstGeom prst="straightConnector1">
+            <a:avLst/>
+          </a:prstGeom>
+          <a:ln w="76200">
+            <a:solidFill>
+              <a:srgbClr val="FF0000"/>
+            </a:solidFill>
+            <a:headEnd type="triangle" w="med" len="med"/>
+            <a:tailEnd type="none" w="med" len="med"/>
+          </a:ln>
+        </p:spPr>
+        <p:style>
+          <a:lnRef idx="1">
+            <a:schemeClr val="accent1"/>
+          </a:lnRef>
+          <a:fillRef idx="0">
+            <a:schemeClr val="accent1"/>
+          </a:fillRef>
+          <a:effectRef idx="0">
+            <a:schemeClr val="accent1"/>
+          </a:effectRef>
+          <a:fontRef idx="minor">
+            <a:schemeClr val="tx1"/>
+          </a:fontRef>
+        </p:style>
+      </p:cxnSp>
+      <p:cxnSp>
+        <p:nvCxnSpPr>
+          <p:cNvPr id="15" name="Straight Arrow Connector 14">
+            <a:extLst>
+              <a:ext uri="{FF2B5EF4-FFF2-40B4-BE49-F238E27FC236}">
+                <a16:creationId xmlns:a16="http://schemas.microsoft.com/office/drawing/2014/main" id="{43044D10-57EC-AD66-BEB3-6B7907486D54}"/>
+              </a:ext>
+            </a:extLst>
+          </p:cNvPr>
+          <p:cNvCxnSpPr>
+            <a:cxnSpLocks/>
+          </p:cNvCxnSpPr>
+          <p:nvPr/>
+        </p:nvCxnSpPr>
+        <p:spPr>
+          <a:xfrm flipH="1">
+            <a:off x="3813387" y="4028661"/>
+            <a:ext cx="284850" cy="305064"/>
+          </a:xfrm>
+          <a:prstGeom prst="straightConnector1">
+            <a:avLst/>
+          </a:prstGeom>
+          <a:ln w="76200">
+            <a:solidFill>
+              <a:srgbClr val="FF0000"/>
+            </a:solidFill>
+            <a:headEnd type="triangle" w="med" len="med"/>
+            <a:tailEnd type="none" w="med" len="med"/>
+          </a:ln>
+        </p:spPr>
+        <p:style>
+          <a:lnRef idx="1">
+            <a:schemeClr val="accent1"/>
+          </a:lnRef>
+          <a:fillRef idx="0">
+            <a:schemeClr val="accent1"/>
+          </a:fillRef>
+          <a:effectRef idx="0">
+            <a:schemeClr val="accent1"/>
+          </a:effectRef>
+          <a:fontRef idx="minor">
+            <a:schemeClr val="tx1"/>
+          </a:fontRef>
+        </p:style>
+      </p:cxnSp>
+      <p:cxnSp>
+        <p:nvCxnSpPr>
+          <p:cNvPr id="16" name="Straight Arrow Connector 15">
+            <a:extLst>
+              <a:ext uri="{FF2B5EF4-FFF2-40B4-BE49-F238E27FC236}">
+                <a16:creationId xmlns:a16="http://schemas.microsoft.com/office/drawing/2014/main" id="{AA5A7BC0-CD13-7BD4-E993-D8BF7D302F78}"/>
+              </a:ext>
+            </a:extLst>
+          </p:cNvPr>
+          <p:cNvCxnSpPr>
+            <a:cxnSpLocks/>
+          </p:cNvCxnSpPr>
+          <p:nvPr/>
+        </p:nvCxnSpPr>
+        <p:spPr>
+          <a:xfrm flipH="1" flipV="1">
+            <a:off x="3814822" y="3529897"/>
+            <a:ext cx="283415" cy="368853"/>
+          </a:xfrm>
+          <a:prstGeom prst="straightConnector1">
+            <a:avLst/>
+          </a:prstGeom>
+          <a:ln w="76200">
+            <a:solidFill>
+              <a:srgbClr val="FF0000"/>
+            </a:solidFill>
+            <a:headEnd type="triangle" w="med" len="med"/>
+            <a:tailEnd type="none" w="med" len="med"/>
+          </a:ln>
+        </p:spPr>
+        <p:style>
+          <a:lnRef idx="1">
+            <a:schemeClr val="accent1"/>
+          </a:lnRef>
+          <a:fillRef idx="0">
+            <a:schemeClr val="accent1"/>
+          </a:fillRef>
+          <a:effectRef idx="0">
+            <a:schemeClr val="accent1"/>
+          </a:effectRef>
+          <a:fontRef idx="minor">
+            <a:schemeClr val="tx1"/>
+          </a:fontRef>
+        </p:style>
+      </p:cxnSp>
+      <p:cxnSp>
+        <p:nvCxnSpPr>
+          <p:cNvPr id="19" name="Straight Arrow Connector 18">
+            <a:extLst>
+              <a:ext uri="{FF2B5EF4-FFF2-40B4-BE49-F238E27FC236}">
+                <a16:creationId xmlns:a16="http://schemas.microsoft.com/office/drawing/2014/main" id="{6D1FE226-126C-654E-A389-7618628B69E9}"/>
+              </a:ext>
+            </a:extLst>
+          </p:cNvPr>
+          <p:cNvCxnSpPr>
+            <a:cxnSpLocks/>
+          </p:cNvCxnSpPr>
+          <p:nvPr/>
+        </p:nvCxnSpPr>
+        <p:spPr>
+          <a:xfrm flipV="1">
+            <a:off x="4316898" y="3536963"/>
+            <a:ext cx="305724" cy="361787"/>
+          </a:xfrm>
+          <a:prstGeom prst="straightConnector1">
+            <a:avLst/>
+          </a:prstGeom>
+          <a:ln w="76200">
+            <a:solidFill>
+              <a:srgbClr val="FF0000"/>
+            </a:solidFill>
+            <a:headEnd type="triangle" w="med" len="med"/>
+            <a:tailEnd type="none" w="med" len="med"/>
+          </a:ln>
+        </p:spPr>
+        <p:style>
+          <a:lnRef idx="1">
+            <a:schemeClr val="accent1"/>
+          </a:lnRef>
+          <a:fillRef idx="0">
+            <a:schemeClr val="accent1"/>
+          </a:fillRef>
+          <a:effectRef idx="0">
+            <a:schemeClr val="accent1"/>
+          </a:effectRef>
+          <a:fontRef idx="minor">
+            <a:schemeClr val="tx1"/>
+          </a:fontRef>
+        </p:style>
+      </p:cxnSp>
+      <p:sp>
+        <p:nvSpPr>
+          <p:cNvPr id="20" name="TextBox 19">
+            <a:extLst>
+              <a:ext uri="{FF2B5EF4-FFF2-40B4-BE49-F238E27FC236}">
+                <a16:creationId xmlns:a16="http://schemas.microsoft.com/office/drawing/2014/main" id="{B83C7709-53C5-2EAE-6086-DBAE7BCDCEE0}"/>
+              </a:ext>
+            </a:extLst>
+          </p:cNvPr>
+          <p:cNvSpPr txBox="1"/>
+          <p:nvPr/>
+        </p:nvSpPr>
+        <p:spPr>
+          <a:xfrm>
+            <a:off x="3906083" y="3309731"/>
+            <a:ext cx="715617" cy="1200329"/>
+          </a:xfrm>
+          <a:prstGeom prst="rect">
+            <a:avLst/>
+          </a:prstGeom>
+          <a:noFill/>
+        </p:spPr>
+        <p:txBody>
+          <a:bodyPr wrap="square" rtlCol="1">
+            <a:spAutoFit/>
+          </a:bodyPr>
+          <a:lstStyle/>
+          <a:p>
+            <a:r>
+              <a:rPr lang="en-US" sz="7200" b="1" dirty="0">
+                <a:solidFill>
+                  <a:srgbClr val="0070C0"/>
+                </a:solidFill>
+              </a:rPr>
+              <a:t>Z</a:t>
+            </a:r>
+            <a:endParaRPr lang="he-IL" sz="7200" b="1" dirty="0">
               <a:solidFill>
-                <a:srgbClr val="FF0000"/>
+                <a:srgbClr val="0070C0"/>
               </a:solidFill>
-              <a:headEnd type="triangle" w="med" len="med"/>
-              <a:tailEnd type="none" w="med" len="med"/>
-            </a:ln>
-          </p:spPr>
-          <p:style>
-            <a:lnRef idx="1">
-              <a:schemeClr val="accent1"/>
-            </a:lnRef>
-            <a:fillRef idx="0">
-              <a:schemeClr val="accent1"/>
-            </a:fillRef>
-            <a:effectRef idx="0">
-              <a:schemeClr val="accent1"/>
-            </a:effectRef>
-            <a:fontRef idx="minor">
-              <a:schemeClr val="tx1"/>
-            </a:fontRef>
-          </p:style>
-        </p:cxnSp>
-        <p:cxnSp>
-          <p:nvCxnSpPr>
-            <p:cNvPr id="18" name="Straight Arrow Connector 17">
-              <a:extLst>
-                <a:ext uri="{FF2B5EF4-FFF2-40B4-BE49-F238E27FC236}">
-                  <a16:creationId xmlns:a16="http://schemas.microsoft.com/office/drawing/2014/main" id="{97020097-744A-DC7F-2493-CAB2FF21B3FF}"/>
-                </a:ext>
-              </a:extLst>
-            </p:cNvPr>
-            <p:cNvCxnSpPr>
-              <a:cxnSpLocks/>
-            </p:cNvCxnSpPr>
-            <p:nvPr/>
-          </p:nvCxnSpPr>
-          <p:spPr>
-            <a:xfrm rot="2700000">
-              <a:off x="2776995" y="2219520"/>
-              <a:ext cx="0" cy="586409"/>
-            </a:xfrm>
-            <a:prstGeom prst="straightConnector1">
-              <a:avLst/>
-            </a:prstGeom>
-            <a:ln w="76200">
+            </a:endParaRPr>
+          </a:p>
+        </p:txBody>
+      </p:sp>
+      <p:sp>
+        <p:nvSpPr>
+          <p:cNvPr id="21" name="TextBox 20">
+            <a:extLst>
+              <a:ext uri="{FF2B5EF4-FFF2-40B4-BE49-F238E27FC236}">
+                <a16:creationId xmlns:a16="http://schemas.microsoft.com/office/drawing/2014/main" id="{32C5443F-DEA8-4287-116A-B617D7B063BA}"/>
+              </a:ext>
+            </a:extLst>
+          </p:cNvPr>
+          <p:cNvSpPr txBox="1"/>
+          <p:nvPr/>
+        </p:nvSpPr>
+        <p:spPr>
+          <a:xfrm>
+            <a:off x="2657064" y="3273290"/>
+            <a:ext cx="715617" cy="1200329"/>
+          </a:xfrm>
+          <a:prstGeom prst="rect">
+            <a:avLst/>
+          </a:prstGeom>
+          <a:noFill/>
+        </p:spPr>
+        <p:txBody>
+          <a:bodyPr wrap="square" rtlCol="1">
+            <a:spAutoFit/>
+          </a:bodyPr>
+          <a:lstStyle/>
+          <a:p>
+            <a:r>
+              <a:rPr lang="en-US" sz="7200" b="1" dirty="0">
+                <a:solidFill>
+                  <a:srgbClr val="0070C0"/>
+                </a:solidFill>
+              </a:rPr>
+              <a:t>Z</a:t>
+            </a:r>
+            <a:endParaRPr lang="he-IL" sz="7200" b="1" dirty="0">
               <a:solidFill>
-                <a:srgbClr val="FF0000"/>
+                <a:srgbClr val="0070C0"/>
               </a:solidFill>
-              <a:headEnd type="triangle" w="med" len="med"/>
-              <a:tailEnd type="none" w="med" len="med"/>
-            </a:ln>
-          </p:spPr>
-          <p:style>
-            <a:lnRef idx="1">
-              <a:schemeClr val="accent1"/>
-            </a:lnRef>
-            <a:fillRef idx="0">
-              <a:schemeClr val="accent1"/>
-            </a:fillRef>
-            <a:effectRef idx="0">
-              <a:schemeClr val="accent1"/>
-            </a:effectRef>
-            <a:fontRef idx="minor">
-              <a:schemeClr val="tx1"/>
-            </a:fontRef>
-          </p:style>
-        </p:cxnSp>
-      </p:grpSp>
+            </a:endParaRPr>
+          </a:p>
+        </p:txBody>
+      </p:sp>
+      <p:sp>
+        <p:nvSpPr>
+          <p:cNvPr id="22" name="TextBox 21">
+            <a:extLst>
+              <a:ext uri="{FF2B5EF4-FFF2-40B4-BE49-F238E27FC236}">
+                <a16:creationId xmlns:a16="http://schemas.microsoft.com/office/drawing/2014/main" id="{C364B6AB-D5D0-D234-C93F-D2F76A8BDA92}"/>
+              </a:ext>
+            </a:extLst>
+          </p:cNvPr>
+          <p:cNvSpPr txBox="1"/>
+          <p:nvPr/>
+        </p:nvSpPr>
+        <p:spPr>
+          <a:xfrm>
+            <a:off x="6211957" y="3339548"/>
+            <a:ext cx="1152939" cy="830997"/>
+          </a:xfrm>
+          <a:prstGeom prst="rect">
+            <a:avLst/>
+          </a:prstGeom>
+          <a:noFill/>
+        </p:spPr>
+        <p:txBody>
+          <a:bodyPr wrap="square" rtlCol="1">
+            <a:spAutoFit/>
+          </a:bodyPr>
+          <a:lstStyle/>
+          <a:p>
+            <a:r>
+              <a:rPr lang="en-US" sz="4800" b="1" dirty="0"/>
+              <a:t>F11</a:t>
+            </a:r>
+            <a:endParaRPr lang="he-IL" sz="4800" b="1" dirty="0"/>
+          </a:p>
+        </p:txBody>
+      </p:sp>
     </p:spTree>
     <p:extLst>
       <p:ext uri="{BB962C8B-B14F-4D97-AF65-F5344CB8AC3E}">

</xml_diff>

<commit_message>
working on the tutorial 3 chapters work. no steps.
</commit_message>
<xml_diff>
--- a/keyboard guide for sailing.pptx
+++ b/keyboard guide for sailing.pptx
@@ -6,7 +6,8 @@
   </p:sldMasterIdLst>
   <p:sldIdLst>
     <p:sldId id="256" r:id="rId2"/>
-    <p:sldId id="257" r:id="rId3"/>
+    <p:sldId id="258" r:id="rId3"/>
+    <p:sldId id="257" r:id="rId4"/>
   </p:sldIdLst>
   <p:sldSz cx="12192000" cy="6858000"/>
   <p:notesSz cx="6858000" cy="9144000"/>
@@ -262,7 +263,7 @@
           <a:p>
             <a:fld id="{19A57770-1AB4-44E2-B380-CDAE3CF4CB38}" type="datetimeFigureOut">
               <a:rPr lang="he-IL" smtClean="0"/>
-              <a:t>ו'/כסלו/תשפ"ד</a:t>
+              <a:t>י'/כסלו/תשפ"ד</a:t>
             </a:fld>
             <a:endParaRPr lang="he-IL"/>
           </a:p>
@@ -462,7 +463,7 @@
           <a:p>
             <a:fld id="{19A57770-1AB4-44E2-B380-CDAE3CF4CB38}" type="datetimeFigureOut">
               <a:rPr lang="he-IL" smtClean="0"/>
-              <a:t>ו'/כסלו/תשפ"ד</a:t>
+              <a:t>י'/כסלו/תשפ"ד</a:t>
             </a:fld>
             <a:endParaRPr lang="he-IL"/>
           </a:p>
@@ -672,7 +673,7 @@
           <a:p>
             <a:fld id="{19A57770-1AB4-44E2-B380-CDAE3CF4CB38}" type="datetimeFigureOut">
               <a:rPr lang="he-IL" smtClean="0"/>
-              <a:t>ו'/כסלו/תשפ"ד</a:t>
+              <a:t>י'/כסלו/תשפ"ד</a:t>
             </a:fld>
             <a:endParaRPr lang="he-IL"/>
           </a:p>
@@ -872,7 +873,7 @@
           <a:p>
             <a:fld id="{19A57770-1AB4-44E2-B380-CDAE3CF4CB38}" type="datetimeFigureOut">
               <a:rPr lang="he-IL" smtClean="0"/>
-              <a:t>ו'/כסלו/תשפ"ד</a:t>
+              <a:t>י'/כסלו/תשפ"ד</a:t>
             </a:fld>
             <a:endParaRPr lang="he-IL"/>
           </a:p>
@@ -1148,7 +1149,7 @@
           <a:p>
             <a:fld id="{19A57770-1AB4-44E2-B380-CDAE3CF4CB38}" type="datetimeFigureOut">
               <a:rPr lang="he-IL" smtClean="0"/>
-              <a:t>ו'/כסלו/תשפ"ד</a:t>
+              <a:t>י'/כסלו/תשפ"ד</a:t>
             </a:fld>
             <a:endParaRPr lang="he-IL"/>
           </a:p>
@@ -1416,7 +1417,7 @@
           <a:p>
             <a:fld id="{19A57770-1AB4-44E2-B380-CDAE3CF4CB38}" type="datetimeFigureOut">
               <a:rPr lang="he-IL" smtClean="0"/>
-              <a:t>ו'/כסלו/תשפ"ד</a:t>
+              <a:t>י'/כסלו/תשפ"ד</a:t>
             </a:fld>
             <a:endParaRPr lang="he-IL"/>
           </a:p>
@@ -1831,7 +1832,7 @@
           <a:p>
             <a:fld id="{19A57770-1AB4-44E2-B380-CDAE3CF4CB38}" type="datetimeFigureOut">
               <a:rPr lang="he-IL" smtClean="0"/>
-              <a:t>ו'/כסלו/תשפ"ד</a:t>
+              <a:t>י'/כסלו/תשפ"ד</a:t>
             </a:fld>
             <a:endParaRPr lang="he-IL"/>
           </a:p>
@@ -1973,7 +1974,7 @@
           <a:p>
             <a:fld id="{19A57770-1AB4-44E2-B380-CDAE3CF4CB38}" type="datetimeFigureOut">
               <a:rPr lang="he-IL" smtClean="0"/>
-              <a:t>ו'/כסלו/תשפ"ד</a:t>
+              <a:t>י'/כסלו/תשפ"ד</a:t>
             </a:fld>
             <a:endParaRPr lang="he-IL"/>
           </a:p>
@@ -2086,7 +2087,7 @@
           <a:p>
             <a:fld id="{19A57770-1AB4-44E2-B380-CDAE3CF4CB38}" type="datetimeFigureOut">
               <a:rPr lang="he-IL" smtClean="0"/>
-              <a:t>ו'/כסלו/תשפ"ד</a:t>
+              <a:t>י'/כסלו/תשפ"ד</a:t>
             </a:fld>
             <a:endParaRPr lang="he-IL"/>
           </a:p>
@@ -2399,7 +2400,7 @@
           <a:p>
             <a:fld id="{19A57770-1AB4-44E2-B380-CDAE3CF4CB38}" type="datetimeFigureOut">
               <a:rPr lang="he-IL" smtClean="0"/>
-              <a:t>ו'/כסלו/תשפ"ד</a:t>
+              <a:t>י'/כסלו/תשפ"ד</a:t>
             </a:fld>
             <a:endParaRPr lang="he-IL"/>
           </a:p>
@@ -2688,7 +2689,7 @@
           <a:p>
             <a:fld id="{19A57770-1AB4-44E2-B380-CDAE3CF4CB38}" type="datetimeFigureOut">
               <a:rPr lang="he-IL" smtClean="0"/>
-              <a:t>ו'/כסלו/תשפ"ד</a:t>
+              <a:t>י'/כסלו/תשפ"ד</a:t>
             </a:fld>
             <a:endParaRPr lang="he-IL"/>
           </a:p>
@@ -2936,7 +2937,7 @@
           <a:p>
             <a:fld id="{19A57770-1AB4-44E2-B380-CDAE3CF4CB38}" type="datetimeFigureOut">
               <a:rPr lang="he-IL" smtClean="0"/>
-              <a:t>ו'/כסלו/תשפ"ד</a:t>
+              <a:t>י'/כסלו/תשפ"ד</a:t>
             </a:fld>
             <a:endParaRPr lang="he-IL"/>
           </a:p>
@@ -3380,7 +3381,7 @@
         </p:blipFill>
         <p:spPr>
           <a:xfrm>
-            <a:off x="1842085" y="1103243"/>
+            <a:off x="1842085" y="1091637"/>
             <a:ext cx="8507829" cy="4502426"/>
           </a:xfrm>
           <a:prstGeom prst="rect">
@@ -3890,60 +3891,6 @@
       </p:sp>
       <p:sp>
         <p:nvSpPr>
-          <p:cNvPr id="21" name="TextBox 20">
-            <a:extLst>
-              <a:ext uri="{FF2B5EF4-FFF2-40B4-BE49-F238E27FC236}">
-                <a16:creationId xmlns:a16="http://schemas.microsoft.com/office/drawing/2014/main" id="{116627BA-A8D8-170D-8040-9F972AE31CFC}"/>
-              </a:ext>
-            </a:extLst>
-          </p:cNvPr>
-          <p:cNvSpPr txBox="1"/>
-          <p:nvPr/>
-        </p:nvSpPr>
-        <p:spPr>
-          <a:xfrm>
-            <a:off x="152402" y="4356643"/>
-            <a:ext cx="1331844" cy="646331"/>
-          </a:xfrm>
-          <a:prstGeom prst="rect">
-            <a:avLst/>
-          </a:prstGeom>
-          <a:solidFill>
-            <a:schemeClr val="accent5">
-              <a:lumMod val="60000"/>
-              <a:lumOff val="40000"/>
-            </a:schemeClr>
-          </a:solidFill>
-          <a:ln>
-            <a:solidFill>
-              <a:srgbClr val="FF0000"/>
-            </a:solidFill>
-          </a:ln>
-        </p:spPr>
-        <p:txBody>
-          <a:bodyPr wrap="square" rtlCol="1">
-            <a:spAutoFit/>
-          </a:bodyPr>
-          <a:lstStyle/>
-          <a:p>
-            <a:r>
-              <a:rPr lang="en-US" dirty="0">
-                <a:solidFill>
-                  <a:srgbClr val="FF0000"/>
-                </a:solidFill>
-              </a:rPr>
-              <a:t>Z – zoom in/out</a:t>
-            </a:r>
-            <a:endParaRPr lang="he-IL" dirty="0">
-              <a:solidFill>
-                <a:srgbClr val="FF0000"/>
-              </a:solidFill>
-            </a:endParaRPr>
-          </a:p>
-        </p:txBody>
-      </p:sp>
-      <p:sp>
-        <p:nvSpPr>
           <p:cNvPr id="22" name="TextBox 21">
             <a:extLst>
               <a:ext uri="{FF2B5EF4-FFF2-40B4-BE49-F238E27FC236}">
@@ -4265,51 +4212,6 @@
       </p:cxnSp>
       <p:cxnSp>
         <p:nvCxnSpPr>
-          <p:cNvPr id="39" name="Straight Arrow Connector 38">
-            <a:extLst>
-              <a:ext uri="{FF2B5EF4-FFF2-40B4-BE49-F238E27FC236}">
-                <a16:creationId xmlns:a16="http://schemas.microsoft.com/office/drawing/2014/main" id="{0F0F233F-6914-563B-5E78-E87BECA0711F}"/>
-              </a:ext>
-            </a:extLst>
-          </p:cNvPr>
-          <p:cNvCxnSpPr>
-            <a:cxnSpLocks/>
-          </p:cNvCxnSpPr>
-          <p:nvPr/>
-        </p:nvCxnSpPr>
-        <p:spPr>
-          <a:xfrm flipV="1">
-            <a:off x="1263910" y="3699158"/>
-            <a:ext cx="2324134" cy="706766"/>
-          </a:xfrm>
-          <a:prstGeom prst="straightConnector1">
-            <a:avLst/>
-          </a:prstGeom>
-          <a:ln w="38100">
-            <a:solidFill>
-              <a:srgbClr val="FF0000"/>
-            </a:solidFill>
-            <a:headEnd type="none" w="med" len="med"/>
-            <a:tailEnd type="triangle" w="med" len="med"/>
-          </a:ln>
-        </p:spPr>
-        <p:style>
-          <a:lnRef idx="1">
-            <a:schemeClr val="accent1"/>
-          </a:lnRef>
-          <a:fillRef idx="0">
-            <a:schemeClr val="accent1"/>
-          </a:fillRef>
-          <a:effectRef idx="0">
-            <a:schemeClr val="accent1"/>
-          </a:effectRef>
-          <a:fontRef idx="minor">
-            <a:schemeClr val="tx1"/>
-          </a:fontRef>
-        </p:style>
-      </p:cxnSp>
-      <p:cxnSp>
-        <p:nvCxnSpPr>
           <p:cNvPr id="42" name="Straight Arrow Connector 41">
             <a:extLst>
               <a:ext uri="{FF2B5EF4-FFF2-40B4-BE49-F238E27FC236}">
@@ -5319,15 +5221,7 @@
                   <a:srgbClr val="FF0000"/>
                 </a:solidFill>
               </a:rPr>
-              <a:t>larger</a:t>
-            </a:r>
-            <a:r>
-              <a:rPr lang="en-US" dirty="0">
-                <a:solidFill>
-                  <a:srgbClr val="FF0000"/>
-                </a:solidFill>
-              </a:rPr>
-              <a:t> buttons</a:t>
+              <a:t>Zoom Out</a:t>
             </a:r>
             <a:endParaRPr lang="he-IL" dirty="0">
               <a:solidFill>
@@ -5389,15 +5283,7 @@
                   <a:srgbClr val="FF0000"/>
                 </a:solidFill>
               </a:rPr>
-              <a:t>smaller</a:t>
-            </a:r>
-            <a:r>
-              <a:rPr lang="en-US" dirty="0">
-                <a:solidFill>
-                  <a:srgbClr val="FF0000"/>
-                </a:solidFill>
-              </a:rPr>
-              <a:t> buttons</a:t>
+              <a:t>Zoom In</a:t>
             </a:r>
             <a:endParaRPr lang="he-IL" dirty="0">
               <a:solidFill>
@@ -5963,17 +5849,17 @@
                   <a:srgbClr val="FF0000"/>
                 </a:solidFill>
               </a:rPr>
-              <a:t>A – </a:t>
-            </a:r>
-            <a:r>
-              <a:rPr lang="en-US">
+              <a:t>A – toggle </a:t>
+            </a:r>
+            <a:r>
+              <a:rPr lang="en-US" b="1" dirty="0">
                 <a:solidFill>
                   <a:srgbClr val="FF0000"/>
                 </a:solidFill>
               </a:rPr>
-              <a:t>toggle ANCOR</a:t>
-            </a:r>
-            <a:endParaRPr lang="he-IL" dirty="0">
+              <a:t>ANCHOR</a:t>
+            </a:r>
+            <a:endParaRPr lang="he-IL" b="1" dirty="0">
               <a:solidFill>
                 <a:srgbClr val="FF0000"/>
               </a:solidFill>
@@ -6056,6 +5942,2699 @@
           <a:chExt cx="0" cy="0"/>
         </a:xfrm>
       </p:grpSpPr>
+      <p:pic>
+        <p:nvPicPr>
+          <p:cNvPr id="105" name="Picture 104" descr="A screenshot of a video game&#10;&#10;Description automatically generated">
+            <a:extLst>
+              <a:ext uri="{FF2B5EF4-FFF2-40B4-BE49-F238E27FC236}">
+                <a16:creationId xmlns:a16="http://schemas.microsoft.com/office/drawing/2014/main" id="{322E7521-B478-1322-DF9A-FC8862528D49}"/>
+              </a:ext>
+            </a:extLst>
+          </p:cNvPr>
+          <p:cNvPicPr>
+            <a:picLocks noChangeAspect="1"/>
+          </p:cNvPicPr>
+          <p:nvPr/>
+        </p:nvPicPr>
+        <p:blipFill>
+          <a:blip r:embed="rId2">
+            <a:extLst>
+              <a:ext uri="{28A0092B-C50C-407E-A947-70E740481C1C}">
+                <a14:useLocalDpi xmlns:a14="http://schemas.microsoft.com/office/drawing/2010/main" val="0"/>
+              </a:ext>
+            </a:extLst>
+          </a:blip>
+          <a:stretch>
+            <a:fillRect/>
+          </a:stretch>
+        </p:blipFill>
+        <p:spPr>
+          <a:xfrm>
+            <a:off x="2160886" y="1238980"/>
+            <a:ext cx="8143658" cy="4555253"/>
+          </a:xfrm>
+          <a:prstGeom prst="rect">
+            <a:avLst/>
+          </a:prstGeom>
+        </p:spPr>
+      </p:pic>
+      <p:sp>
+        <p:nvSpPr>
+          <p:cNvPr id="7" name="TextBox 6">
+            <a:extLst>
+              <a:ext uri="{FF2B5EF4-FFF2-40B4-BE49-F238E27FC236}">
+                <a16:creationId xmlns:a16="http://schemas.microsoft.com/office/drawing/2014/main" id="{703CA697-E90A-A3C6-BEFA-BE10C6796919}"/>
+              </a:ext>
+            </a:extLst>
+          </p:cNvPr>
+          <p:cNvSpPr txBox="1"/>
+          <p:nvPr/>
+        </p:nvSpPr>
+        <p:spPr>
+          <a:xfrm>
+            <a:off x="165674" y="2736579"/>
+            <a:ext cx="1334910" cy="646331"/>
+          </a:xfrm>
+          <a:prstGeom prst="rect">
+            <a:avLst/>
+          </a:prstGeom>
+          <a:solidFill>
+            <a:schemeClr val="accent5">
+              <a:lumMod val="60000"/>
+              <a:lumOff val="40000"/>
+            </a:schemeClr>
+          </a:solidFill>
+          <a:ln>
+            <a:solidFill>
+              <a:srgbClr val="FF0000"/>
+            </a:solidFill>
+          </a:ln>
+        </p:spPr>
+        <p:txBody>
+          <a:bodyPr wrap="square" rtlCol="1">
+            <a:spAutoFit/>
+          </a:bodyPr>
+          <a:lstStyle/>
+          <a:p>
+            <a:pPr algn="ctr"/>
+            <a:r>
+              <a:rPr lang="en-US" b="1" dirty="0">
+                <a:solidFill>
+                  <a:srgbClr val="FF0000"/>
+                </a:solidFill>
+              </a:rPr>
+              <a:t>Restart</a:t>
+            </a:r>
+            <a:r>
+              <a:rPr lang="en-US" dirty="0">
+                <a:solidFill>
+                  <a:srgbClr val="FF0000"/>
+                </a:solidFill>
+              </a:rPr>
+              <a:t> game</a:t>
+            </a:r>
+            <a:endParaRPr lang="he-IL" dirty="0">
+              <a:solidFill>
+                <a:srgbClr val="FF0000"/>
+              </a:solidFill>
+            </a:endParaRPr>
+          </a:p>
+        </p:txBody>
+      </p:sp>
+      <p:sp>
+        <p:nvSpPr>
+          <p:cNvPr id="6" name="TextBox 5">
+            <a:extLst>
+              <a:ext uri="{FF2B5EF4-FFF2-40B4-BE49-F238E27FC236}">
+                <a16:creationId xmlns:a16="http://schemas.microsoft.com/office/drawing/2014/main" id="{4B167204-AB71-DC8B-D38E-692AF76C5617}"/>
+              </a:ext>
+            </a:extLst>
+          </p:cNvPr>
+          <p:cNvSpPr txBox="1"/>
+          <p:nvPr/>
+        </p:nvSpPr>
+        <p:spPr>
+          <a:xfrm>
+            <a:off x="2026927" y="5925738"/>
+            <a:ext cx="692726" cy="646331"/>
+          </a:xfrm>
+          <a:prstGeom prst="rect">
+            <a:avLst/>
+          </a:prstGeom>
+          <a:solidFill>
+            <a:schemeClr val="accent5">
+              <a:lumMod val="60000"/>
+              <a:lumOff val="40000"/>
+            </a:schemeClr>
+          </a:solidFill>
+          <a:ln>
+            <a:solidFill>
+              <a:srgbClr val="FF0000"/>
+            </a:solidFill>
+          </a:ln>
+        </p:spPr>
+        <p:txBody>
+          <a:bodyPr wrap="square" rtlCol="1">
+            <a:spAutoFit/>
+          </a:bodyPr>
+          <a:lstStyle/>
+          <a:p>
+            <a:pPr algn="ctr"/>
+            <a:r>
+              <a:rPr lang="en-US" b="1" dirty="0">
+                <a:solidFill>
+                  <a:srgbClr val="FF0000"/>
+                </a:solidFill>
+              </a:rPr>
+              <a:t>Front</a:t>
+            </a:r>
+            <a:r>
+              <a:rPr lang="en-US" dirty="0">
+                <a:solidFill>
+                  <a:srgbClr val="FF0000"/>
+                </a:solidFill>
+              </a:rPr>
+              <a:t> sail</a:t>
+            </a:r>
+            <a:endParaRPr lang="he-IL" dirty="0">
+              <a:solidFill>
+                <a:srgbClr val="FF0000"/>
+              </a:solidFill>
+            </a:endParaRPr>
+          </a:p>
+        </p:txBody>
+      </p:sp>
+      <p:sp>
+        <p:nvSpPr>
+          <p:cNvPr id="11" name="TextBox 10">
+            <a:extLst>
+              <a:ext uri="{FF2B5EF4-FFF2-40B4-BE49-F238E27FC236}">
+                <a16:creationId xmlns:a16="http://schemas.microsoft.com/office/drawing/2014/main" id="{AE30E576-8C4B-1CBB-7ACC-41E502B5BDF9}"/>
+              </a:ext>
+            </a:extLst>
+          </p:cNvPr>
+          <p:cNvSpPr txBox="1"/>
+          <p:nvPr/>
+        </p:nvSpPr>
+        <p:spPr>
+          <a:xfrm>
+            <a:off x="2809034" y="5930714"/>
+            <a:ext cx="692726" cy="646331"/>
+          </a:xfrm>
+          <a:prstGeom prst="rect">
+            <a:avLst/>
+          </a:prstGeom>
+          <a:solidFill>
+            <a:schemeClr val="accent5">
+              <a:lumMod val="60000"/>
+              <a:lumOff val="40000"/>
+            </a:schemeClr>
+          </a:solidFill>
+          <a:ln>
+            <a:solidFill>
+              <a:srgbClr val="FF0000"/>
+            </a:solidFill>
+          </a:ln>
+        </p:spPr>
+        <p:txBody>
+          <a:bodyPr wrap="square" rtlCol="1">
+            <a:spAutoFit/>
+          </a:bodyPr>
+          <a:lstStyle/>
+          <a:p>
+            <a:pPr algn="ctr"/>
+            <a:r>
+              <a:rPr lang="en-US" b="1" dirty="0">
+                <a:solidFill>
+                  <a:srgbClr val="FF0000"/>
+                </a:solidFill>
+              </a:rPr>
+              <a:t>Main</a:t>
+            </a:r>
+            <a:r>
+              <a:rPr lang="en-US" dirty="0">
+                <a:solidFill>
+                  <a:srgbClr val="FF0000"/>
+                </a:solidFill>
+              </a:rPr>
+              <a:t> sail</a:t>
+            </a:r>
+            <a:endParaRPr lang="he-IL" dirty="0">
+              <a:solidFill>
+                <a:srgbClr val="FF0000"/>
+              </a:solidFill>
+            </a:endParaRPr>
+          </a:p>
+        </p:txBody>
+      </p:sp>
+      <p:sp>
+        <p:nvSpPr>
+          <p:cNvPr id="18" name="TextBox 17">
+            <a:extLst>
+              <a:ext uri="{FF2B5EF4-FFF2-40B4-BE49-F238E27FC236}">
+                <a16:creationId xmlns:a16="http://schemas.microsoft.com/office/drawing/2014/main" id="{33A83024-BFE3-1BF4-C7FB-F51930A95E0C}"/>
+              </a:ext>
+            </a:extLst>
+          </p:cNvPr>
+          <p:cNvSpPr txBox="1"/>
+          <p:nvPr/>
+        </p:nvSpPr>
+        <p:spPr>
+          <a:xfrm>
+            <a:off x="6868456" y="5889583"/>
+            <a:ext cx="1331844" cy="646331"/>
+          </a:xfrm>
+          <a:prstGeom prst="rect">
+            <a:avLst/>
+          </a:prstGeom>
+          <a:solidFill>
+            <a:srgbClr val="FFFF00"/>
+          </a:solidFill>
+          <a:ln>
+            <a:solidFill>
+              <a:srgbClr val="FF0000"/>
+            </a:solidFill>
+          </a:ln>
+        </p:spPr>
+        <p:txBody>
+          <a:bodyPr wrap="square" rtlCol="1">
+            <a:spAutoFit/>
+          </a:bodyPr>
+          <a:lstStyle/>
+          <a:p>
+            <a:pPr algn="ctr"/>
+            <a:r>
+              <a:rPr lang="en-US" dirty="0">
+                <a:solidFill>
+                  <a:srgbClr val="FF0000"/>
+                </a:solidFill>
+              </a:rPr>
+              <a:t>Pull/Release </a:t>
+            </a:r>
+            <a:r>
+              <a:rPr lang="en-US" b="1" dirty="0">
+                <a:solidFill>
+                  <a:srgbClr val="FF0000"/>
+                </a:solidFill>
+              </a:rPr>
+              <a:t>Sails</a:t>
+            </a:r>
+            <a:endParaRPr lang="he-IL" b="1" dirty="0">
+              <a:solidFill>
+                <a:srgbClr val="FF0000"/>
+              </a:solidFill>
+            </a:endParaRPr>
+          </a:p>
+        </p:txBody>
+      </p:sp>
+      <p:sp>
+        <p:nvSpPr>
+          <p:cNvPr id="19" name="TextBox 18">
+            <a:extLst>
+              <a:ext uri="{FF2B5EF4-FFF2-40B4-BE49-F238E27FC236}">
+                <a16:creationId xmlns:a16="http://schemas.microsoft.com/office/drawing/2014/main" id="{6436E814-89A7-728A-FF6E-F4CF57169937}"/>
+              </a:ext>
+            </a:extLst>
+          </p:cNvPr>
+          <p:cNvSpPr txBox="1"/>
+          <p:nvPr/>
+        </p:nvSpPr>
+        <p:spPr>
+          <a:xfrm>
+            <a:off x="8667504" y="5851981"/>
+            <a:ext cx="1159501" cy="646331"/>
+          </a:xfrm>
+          <a:prstGeom prst="rect">
+            <a:avLst/>
+          </a:prstGeom>
+          <a:solidFill>
+            <a:srgbClr val="FFFF00"/>
+          </a:solidFill>
+          <a:ln>
+            <a:solidFill>
+              <a:srgbClr val="FF0000"/>
+            </a:solidFill>
+          </a:ln>
+        </p:spPr>
+        <p:txBody>
+          <a:bodyPr wrap="square" rtlCol="1">
+            <a:spAutoFit/>
+          </a:bodyPr>
+          <a:lstStyle/>
+          <a:p>
+            <a:pPr algn="ctr"/>
+            <a:r>
+              <a:rPr lang="en-US" b="1" dirty="0">
+                <a:solidFill>
+                  <a:srgbClr val="FF0000"/>
+                </a:solidFill>
+              </a:rPr>
+              <a:t>Steer</a:t>
+            </a:r>
+            <a:r>
+              <a:rPr lang="en-US" dirty="0">
+                <a:solidFill>
+                  <a:srgbClr val="FF0000"/>
+                </a:solidFill>
+              </a:rPr>
+              <a:t> Left/Right</a:t>
+            </a:r>
+            <a:endParaRPr lang="he-IL" dirty="0">
+              <a:solidFill>
+                <a:srgbClr val="FF0000"/>
+              </a:solidFill>
+            </a:endParaRPr>
+          </a:p>
+        </p:txBody>
+      </p:sp>
+      <p:sp>
+        <p:nvSpPr>
+          <p:cNvPr id="20" name="TextBox 19">
+            <a:extLst>
+              <a:ext uri="{FF2B5EF4-FFF2-40B4-BE49-F238E27FC236}">
+                <a16:creationId xmlns:a16="http://schemas.microsoft.com/office/drawing/2014/main" id="{40350743-EC33-29B6-B87E-B10181AE882B}"/>
+              </a:ext>
+            </a:extLst>
+          </p:cNvPr>
+          <p:cNvSpPr txBox="1"/>
+          <p:nvPr/>
+        </p:nvSpPr>
+        <p:spPr>
+          <a:xfrm>
+            <a:off x="10646455" y="5851980"/>
+            <a:ext cx="1331844" cy="646331"/>
+          </a:xfrm>
+          <a:prstGeom prst="rect">
+            <a:avLst/>
+          </a:prstGeom>
+          <a:solidFill>
+            <a:srgbClr val="FFFF00"/>
+          </a:solidFill>
+          <a:ln>
+            <a:solidFill>
+              <a:srgbClr val="FF0000"/>
+            </a:solidFill>
+          </a:ln>
+        </p:spPr>
+        <p:txBody>
+          <a:bodyPr wrap="square" rtlCol="1">
+            <a:spAutoFit/>
+          </a:bodyPr>
+          <a:lstStyle/>
+          <a:p>
+            <a:r>
+              <a:rPr lang="en-US" b="1" dirty="0">
+                <a:solidFill>
+                  <a:srgbClr val="FF0000"/>
+                </a:solidFill>
+              </a:rPr>
+              <a:t>Hit</a:t>
+            </a:r>
+            <a:r>
+              <a:rPr lang="en-US" dirty="0">
+                <a:solidFill>
+                  <a:srgbClr val="FF0000"/>
+                </a:solidFill>
+              </a:rPr>
+              <a:t> rudder to right/left</a:t>
+            </a:r>
+            <a:endParaRPr lang="he-IL" dirty="0">
+              <a:solidFill>
+                <a:srgbClr val="FF0000"/>
+              </a:solidFill>
+            </a:endParaRPr>
+          </a:p>
+        </p:txBody>
+      </p:sp>
+      <p:sp>
+        <p:nvSpPr>
+          <p:cNvPr id="22" name="TextBox 21">
+            <a:extLst>
+              <a:ext uri="{FF2B5EF4-FFF2-40B4-BE49-F238E27FC236}">
+                <a16:creationId xmlns:a16="http://schemas.microsoft.com/office/drawing/2014/main" id="{3B37E663-0BD7-7C69-6846-971AC2466B48}"/>
+              </a:ext>
+            </a:extLst>
+          </p:cNvPr>
+          <p:cNvSpPr txBox="1"/>
+          <p:nvPr/>
+        </p:nvSpPr>
+        <p:spPr>
+          <a:xfrm>
+            <a:off x="3577165" y="5930344"/>
+            <a:ext cx="1331844" cy="646331"/>
+          </a:xfrm>
+          <a:prstGeom prst="rect">
+            <a:avLst/>
+          </a:prstGeom>
+          <a:solidFill>
+            <a:schemeClr val="accent5">
+              <a:lumMod val="60000"/>
+              <a:lumOff val="40000"/>
+            </a:schemeClr>
+          </a:solidFill>
+          <a:ln>
+            <a:solidFill>
+              <a:srgbClr val="FF0000"/>
+            </a:solidFill>
+          </a:ln>
+        </p:spPr>
+        <p:txBody>
+          <a:bodyPr wrap="square" rtlCol="1">
+            <a:spAutoFit/>
+          </a:bodyPr>
+          <a:lstStyle/>
+          <a:p>
+            <a:r>
+              <a:rPr lang="en-US" dirty="0">
+                <a:solidFill>
+                  <a:srgbClr val="FF0000"/>
+                </a:solidFill>
+              </a:rPr>
+              <a:t>Toggle track </a:t>
+            </a:r>
+            <a:r>
+              <a:rPr lang="en-US" b="1" dirty="0">
+                <a:solidFill>
+                  <a:srgbClr val="FF0000"/>
+                </a:solidFill>
+              </a:rPr>
+              <a:t>boat</a:t>
+            </a:r>
+            <a:r>
+              <a:rPr lang="en-US" dirty="0">
+                <a:solidFill>
+                  <a:srgbClr val="FF0000"/>
+                </a:solidFill>
+              </a:rPr>
+              <a:t>/</a:t>
+            </a:r>
+            <a:r>
+              <a:rPr lang="en-US" b="1" dirty="0">
+                <a:solidFill>
+                  <a:srgbClr val="FF0000"/>
+                </a:solidFill>
+              </a:rPr>
+              <a:t>world</a:t>
+            </a:r>
+            <a:endParaRPr lang="he-IL" b="1" dirty="0">
+              <a:solidFill>
+                <a:srgbClr val="FF0000"/>
+              </a:solidFill>
+            </a:endParaRPr>
+          </a:p>
+        </p:txBody>
+      </p:sp>
+      <p:sp>
+        <p:nvSpPr>
+          <p:cNvPr id="23" name="TextBox 22">
+            <a:extLst>
+              <a:ext uri="{FF2B5EF4-FFF2-40B4-BE49-F238E27FC236}">
+                <a16:creationId xmlns:a16="http://schemas.microsoft.com/office/drawing/2014/main" id="{B794AE67-CF3A-00A7-7AC3-3DAF41C8BE06}"/>
+              </a:ext>
+            </a:extLst>
+          </p:cNvPr>
+          <p:cNvSpPr txBox="1"/>
+          <p:nvPr/>
+        </p:nvSpPr>
+        <p:spPr>
+          <a:xfrm>
+            <a:off x="161414" y="1207118"/>
+            <a:ext cx="1339171" cy="646331"/>
+          </a:xfrm>
+          <a:prstGeom prst="rect">
+            <a:avLst/>
+          </a:prstGeom>
+          <a:solidFill>
+            <a:schemeClr val="accent5">
+              <a:lumMod val="60000"/>
+              <a:lumOff val="40000"/>
+            </a:schemeClr>
+          </a:solidFill>
+          <a:ln>
+            <a:solidFill>
+              <a:srgbClr val="FF0000"/>
+            </a:solidFill>
+          </a:ln>
+        </p:spPr>
+        <p:txBody>
+          <a:bodyPr wrap="square" rtlCol="1">
+            <a:spAutoFit/>
+          </a:bodyPr>
+          <a:lstStyle/>
+          <a:p>
+            <a:pPr algn="ctr"/>
+            <a:r>
+              <a:rPr lang="en-US" dirty="0">
+                <a:solidFill>
+                  <a:srgbClr val="FF0000"/>
+                </a:solidFill>
+              </a:rPr>
+              <a:t>Toggle </a:t>
+            </a:r>
+            <a:r>
+              <a:rPr lang="en-US" b="1" dirty="0">
+                <a:solidFill>
+                  <a:srgbClr val="FF0000"/>
+                </a:solidFill>
+              </a:rPr>
+              <a:t>Full</a:t>
+            </a:r>
+            <a:r>
+              <a:rPr lang="en-US" dirty="0">
+                <a:solidFill>
+                  <a:srgbClr val="FF0000"/>
+                </a:solidFill>
+              </a:rPr>
+              <a:t> </a:t>
+            </a:r>
+            <a:r>
+              <a:rPr lang="en-US" b="1" dirty="0">
+                <a:solidFill>
+                  <a:srgbClr val="FF0000"/>
+                </a:solidFill>
+              </a:rPr>
+              <a:t>screen</a:t>
+            </a:r>
+            <a:endParaRPr lang="he-IL" b="1" dirty="0">
+              <a:solidFill>
+                <a:srgbClr val="FF0000"/>
+              </a:solidFill>
+            </a:endParaRPr>
+          </a:p>
+        </p:txBody>
+      </p:sp>
+      <p:sp>
+        <p:nvSpPr>
+          <p:cNvPr id="24" name="TextBox 23">
+            <a:extLst>
+              <a:ext uri="{FF2B5EF4-FFF2-40B4-BE49-F238E27FC236}">
+                <a16:creationId xmlns:a16="http://schemas.microsoft.com/office/drawing/2014/main" id="{9558B887-EDAF-7006-4C6C-21458162E8AB}"/>
+              </a:ext>
+            </a:extLst>
+          </p:cNvPr>
+          <p:cNvSpPr txBox="1"/>
+          <p:nvPr/>
+        </p:nvSpPr>
+        <p:spPr>
+          <a:xfrm>
+            <a:off x="164238" y="3501309"/>
+            <a:ext cx="1334909" cy="646331"/>
+          </a:xfrm>
+          <a:prstGeom prst="rect">
+            <a:avLst/>
+          </a:prstGeom>
+          <a:solidFill>
+            <a:schemeClr val="accent5">
+              <a:lumMod val="60000"/>
+              <a:lumOff val="40000"/>
+            </a:schemeClr>
+          </a:solidFill>
+          <a:ln>
+            <a:solidFill>
+              <a:srgbClr val="FF0000"/>
+            </a:solidFill>
+          </a:ln>
+        </p:spPr>
+        <p:txBody>
+          <a:bodyPr wrap="square" rtlCol="1">
+            <a:spAutoFit/>
+          </a:bodyPr>
+          <a:lstStyle/>
+          <a:p>
+            <a:pPr algn="ctr"/>
+            <a:r>
+              <a:rPr lang="en-US" b="1" dirty="0">
+                <a:solidFill>
+                  <a:srgbClr val="FF0000"/>
+                </a:solidFill>
+              </a:rPr>
+              <a:t>Quit</a:t>
+            </a:r>
+            <a:r>
+              <a:rPr lang="en-US" dirty="0">
+                <a:solidFill>
+                  <a:srgbClr val="FF0000"/>
+                </a:solidFill>
+              </a:rPr>
+              <a:t> the game</a:t>
+            </a:r>
+            <a:endParaRPr lang="he-IL" dirty="0">
+              <a:solidFill>
+                <a:srgbClr val="FF0000"/>
+              </a:solidFill>
+            </a:endParaRPr>
+          </a:p>
+        </p:txBody>
+      </p:sp>
+      <p:cxnSp>
+        <p:nvCxnSpPr>
+          <p:cNvPr id="29" name="Straight Arrow Connector 28">
+            <a:extLst>
+              <a:ext uri="{FF2B5EF4-FFF2-40B4-BE49-F238E27FC236}">
+                <a16:creationId xmlns:a16="http://schemas.microsoft.com/office/drawing/2014/main" id="{8439867C-2C2E-540C-5D23-693DED3A9750}"/>
+              </a:ext>
+            </a:extLst>
+          </p:cNvPr>
+          <p:cNvCxnSpPr>
+            <a:cxnSpLocks/>
+          </p:cNvCxnSpPr>
+          <p:nvPr/>
+        </p:nvCxnSpPr>
+        <p:spPr>
+          <a:xfrm flipV="1">
+            <a:off x="2421546" y="5688612"/>
+            <a:ext cx="15743" cy="248356"/>
+          </a:xfrm>
+          <a:prstGeom prst="straightConnector1">
+            <a:avLst/>
+          </a:prstGeom>
+          <a:ln w="38100">
+            <a:solidFill>
+              <a:srgbClr val="FF0000"/>
+            </a:solidFill>
+            <a:headEnd type="none" w="med" len="med"/>
+            <a:tailEnd type="triangle" w="med" len="med"/>
+          </a:ln>
+        </p:spPr>
+        <p:style>
+          <a:lnRef idx="1">
+            <a:schemeClr val="accent1"/>
+          </a:lnRef>
+          <a:fillRef idx="0">
+            <a:schemeClr val="accent1"/>
+          </a:fillRef>
+          <a:effectRef idx="0">
+            <a:schemeClr val="accent1"/>
+          </a:effectRef>
+          <a:fontRef idx="minor">
+            <a:schemeClr val="tx1"/>
+          </a:fontRef>
+        </p:style>
+      </p:cxnSp>
+      <p:cxnSp>
+        <p:nvCxnSpPr>
+          <p:cNvPr id="30" name="Straight Arrow Connector 29">
+            <a:extLst>
+              <a:ext uri="{FF2B5EF4-FFF2-40B4-BE49-F238E27FC236}">
+                <a16:creationId xmlns:a16="http://schemas.microsoft.com/office/drawing/2014/main" id="{4CE1C509-7972-FB57-D99F-D1A048FAD40B}"/>
+              </a:ext>
+            </a:extLst>
+          </p:cNvPr>
+          <p:cNvCxnSpPr>
+            <a:cxnSpLocks/>
+          </p:cNvCxnSpPr>
+          <p:nvPr/>
+        </p:nvCxnSpPr>
+        <p:spPr>
+          <a:xfrm flipH="1" flipV="1">
+            <a:off x="3353086" y="5688612"/>
+            <a:ext cx="366148" cy="248356"/>
+          </a:xfrm>
+          <a:prstGeom prst="straightConnector1">
+            <a:avLst/>
+          </a:prstGeom>
+          <a:ln w="38100">
+            <a:solidFill>
+              <a:srgbClr val="FF0000"/>
+            </a:solidFill>
+            <a:headEnd type="none" w="med" len="med"/>
+            <a:tailEnd type="triangle" w="med" len="med"/>
+          </a:ln>
+        </p:spPr>
+        <p:style>
+          <a:lnRef idx="1">
+            <a:schemeClr val="accent1"/>
+          </a:lnRef>
+          <a:fillRef idx="0">
+            <a:schemeClr val="accent1"/>
+          </a:fillRef>
+          <a:effectRef idx="0">
+            <a:schemeClr val="accent1"/>
+          </a:effectRef>
+          <a:fontRef idx="minor">
+            <a:schemeClr val="tx1"/>
+          </a:fontRef>
+        </p:style>
+      </p:cxnSp>
+      <p:cxnSp>
+        <p:nvCxnSpPr>
+          <p:cNvPr id="33" name="Straight Arrow Connector 32">
+            <a:extLst>
+              <a:ext uri="{FF2B5EF4-FFF2-40B4-BE49-F238E27FC236}">
+                <a16:creationId xmlns:a16="http://schemas.microsoft.com/office/drawing/2014/main" id="{779F118B-7F52-E711-6F5C-D961D0F40BAA}"/>
+              </a:ext>
+            </a:extLst>
+          </p:cNvPr>
+          <p:cNvCxnSpPr>
+            <a:cxnSpLocks/>
+            <a:stCxn id="11" idx="0"/>
+          </p:cNvCxnSpPr>
+          <p:nvPr/>
+        </p:nvCxnSpPr>
+        <p:spPr>
+          <a:xfrm flipH="1" flipV="1">
+            <a:off x="2831908" y="5662356"/>
+            <a:ext cx="323489" cy="268358"/>
+          </a:xfrm>
+          <a:prstGeom prst="straightConnector1">
+            <a:avLst/>
+          </a:prstGeom>
+          <a:ln w="38100">
+            <a:solidFill>
+              <a:srgbClr val="FF0000"/>
+            </a:solidFill>
+            <a:headEnd type="none" w="med" len="med"/>
+            <a:tailEnd type="triangle" w="med" len="med"/>
+          </a:ln>
+        </p:spPr>
+        <p:style>
+          <a:lnRef idx="1">
+            <a:schemeClr val="accent1"/>
+          </a:lnRef>
+          <a:fillRef idx="0">
+            <a:schemeClr val="accent1"/>
+          </a:fillRef>
+          <a:effectRef idx="0">
+            <a:schemeClr val="accent1"/>
+          </a:effectRef>
+          <a:fontRef idx="minor">
+            <a:schemeClr val="tx1"/>
+          </a:fontRef>
+        </p:style>
+      </p:cxnSp>
+      <p:cxnSp>
+        <p:nvCxnSpPr>
+          <p:cNvPr id="42" name="Straight Arrow Connector 41">
+            <a:extLst>
+              <a:ext uri="{FF2B5EF4-FFF2-40B4-BE49-F238E27FC236}">
+                <a16:creationId xmlns:a16="http://schemas.microsoft.com/office/drawing/2014/main" id="{79998BEC-4D69-2EF8-7F51-85EBF8A01ACD}"/>
+              </a:ext>
+            </a:extLst>
+          </p:cNvPr>
+          <p:cNvCxnSpPr>
+            <a:cxnSpLocks/>
+          </p:cNvCxnSpPr>
+          <p:nvPr/>
+        </p:nvCxnSpPr>
+        <p:spPr>
+          <a:xfrm>
+            <a:off x="1499147" y="3188280"/>
+            <a:ext cx="762150" cy="394899"/>
+          </a:xfrm>
+          <a:prstGeom prst="straightConnector1">
+            <a:avLst/>
+          </a:prstGeom>
+          <a:ln w="38100">
+            <a:solidFill>
+              <a:srgbClr val="FF0000"/>
+            </a:solidFill>
+            <a:headEnd type="none" w="med" len="med"/>
+            <a:tailEnd type="triangle" w="med" len="med"/>
+          </a:ln>
+        </p:spPr>
+        <p:style>
+          <a:lnRef idx="1">
+            <a:schemeClr val="accent1"/>
+          </a:lnRef>
+          <a:fillRef idx="0">
+            <a:schemeClr val="accent1"/>
+          </a:fillRef>
+          <a:effectRef idx="0">
+            <a:schemeClr val="accent1"/>
+          </a:effectRef>
+          <a:fontRef idx="minor">
+            <a:schemeClr val="tx1"/>
+          </a:fontRef>
+        </p:style>
+      </p:cxnSp>
+      <p:cxnSp>
+        <p:nvCxnSpPr>
+          <p:cNvPr id="45" name="Straight Arrow Connector 44">
+            <a:extLst>
+              <a:ext uri="{FF2B5EF4-FFF2-40B4-BE49-F238E27FC236}">
+                <a16:creationId xmlns:a16="http://schemas.microsoft.com/office/drawing/2014/main" id="{4E394B72-7D9D-0564-BEBB-699BF93C5A71}"/>
+              </a:ext>
+            </a:extLst>
+          </p:cNvPr>
+          <p:cNvCxnSpPr>
+            <a:cxnSpLocks/>
+            <a:stCxn id="24" idx="3"/>
+          </p:cNvCxnSpPr>
+          <p:nvPr/>
+        </p:nvCxnSpPr>
+        <p:spPr>
+          <a:xfrm>
+            <a:off x="1499147" y="3824475"/>
+            <a:ext cx="778141" cy="88215"/>
+          </a:xfrm>
+          <a:prstGeom prst="straightConnector1">
+            <a:avLst/>
+          </a:prstGeom>
+          <a:ln w="38100">
+            <a:solidFill>
+              <a:srgbClr val="FF0000"/>
+            </a:solidFill>
+            <a:headEnd type="none" w="med" len="med"/>
+            <a:tailEnd type="triangle" w="med" len="med"/>
+          </a:ln>
+        </p:spPr>
+        <p:style>
+          <a:lnRef idx="1">
+            <a:schemeClr val="accent1"/>
+          </a:lnRef>
+          <a:fillRef idx="0">
+            <a:schemeClr val="accent1"/>
+          </a:fillRef>
+          <a:effectRef idx="0">
+            <a:schemeClr val="accent1"/>
+          </a:effectRef>
+          <a:fontRef idx="minor">
+            <a:schemeClr val="tx1"/>
+          </a:fontRef>
+        </p:style>
+      </p:cxnSp>
+      <p:cxnSp>
+        <p:nvCxnSpPr>
+          <p:cNvPr id="57" name="Straight Arrow Connector 56">
+            <a:extLst>
+              <a:ext uri="{FF2B5EF4-FFF2-40B4-BE49-F238E27FC236}">
+                <a16:creationId xmlns:a16="http://schemas.microsoft.com/office/drawing/2014/main" id="{9E095AC5-3D43-D290-4CAC-205E0A4DB7F9}"/>
+              </a:ext>
+            </a:extLst>
+          </p:cNvPr>
+          <p:cNvCxnSpPr>
+            <a:cxnSpLocks/>
+          </p:cNvCxnSpPr>
+          <p:nvPr/>
+        </p:nvCxnSpPr>
+        <p:spPr>
+          <a:xfrm flipH="1" flipV="1">
+            <a:off x="9770454" y="5402997"/>
+            <a:ext cx="876001" cy="547535"/>
+          </a:xfrm>
+          <a:prstGeom prst="straightConnector1">
+            <a:avLst/>
+          </a:prstGeom>
+          <a:ln w="38100">
+            <a:solidFill>
+              <a:srgbClr val="FF0000"/>
+            </a:solidFill>
+            <a:headEnd type="none" w="med" len="med"/>
+            <a:tailEnd type="triangle" w="med" len="med"/>
+          </a:ln>
+        </p:spPr>
+        <p:style>
+          <a:lnRef idx="1">
+            <a:schemeClr val="accent1"/>
+          </a:lnRef>
+          <a:fillRef idx="0">
+            <a:schemeClr val="accent1"/>
+          </a:fillRef>
+          <a:effectRef idx="0">
+            <a:schemeClr val="accent1"/>
+          </a:effectRef>
+          <a:fontRef idx="minor">
+            <a:schemeClr val="tx1"/>
+          </a:fontRef>
+        </p:style>
+      </p:cxnSp>
+      <p:cxnSp>
+        <p:nvCxnSpPr>
+          <p:cNvPr id="61" name="Straight Arrow Connector 60">
+            <a:extLst>
+              <a:ext uri="{FF2B5EF4-FFF2-40B4-BE49-F238E27FC236}">
+                <a16:creationId xmlns:a16="http://schemas.microsoft.com/office/drawing/2014/main" id="{F123BA0C-9D69-BA73-27CD-8C2C5C9089DC}"/>
+              </a:ext>
+            </a:extLst>
+          </p:cNvPr>
+          <p:cNvCxnSpPr>
+            <a:cxnSpLocks/>
+            <a:stCxn id="19" idx="0"/>
+          </p:cNvCxnSpPr>
+          <p:nvPr/>
+        </p:nvCxnSpPr>
+        <p:spPr>
+          <a:xfrm flipV="1">
+            <a:off x="9247255" y="5218331"/>
+            <a:ext cx="39227" cy="633650"/>
+          </a:xfrm>
+          <a:prstGeom prst="straightConnector1">
+            <a:avLst/>
+          </a:prstGeom>
+          <a:ln w="38100">
+            <a:solidFill>
+              <a:srgbClr val="FF0000"/>
+            </a:solidFill>
+            <a:headEnd type="none" w="med" len="med"/>
+            <a:tailEnd type="triangle" w="med" len="med"/>
+          </a:ln>
+        </p:spPr>
+        <p:style>
+          <a:lnRef idx="1">
+            <a:schemeClr val="accent1"/>
+          </a:lnRef>
+          <a:fillRef idx="0">
+            <a:schemeClr val="accent1"/>
+          </a:fillRef>
+          <a:effectRef idx="0">
+            <a:schemeClr val="accent1"/>
+          </a:effectRef>
+          <a:fontRef idx="minor">
+            <a:schemeClr val="tx1"/>
+          </a:fontRef>
+        </p:style>
+      </p:cxnSp>
+      <p:cxnSp>
+        <p:nvCxnSpPr>
+          <p:cNvPr id="64" name="Straight Arrow Connector 63">
+            <a:extLst>
+              <a:ext uri="{FF2B5EF4-FFF2-40B4-BE49-F238E27FC236}">
+                <a16:creationId xmlns:a16="http://schemas.microsoft.com/office/drawing/2014/main" id="{606C13BE-3303-5F1F-F333-6BFBA5186ADD}"/>
+              </a:ext>
+            </a:extLst>
+          </p:cNvPr>
+          <p:cNvCxnSpPr>
+            <a:cxnSpLocks/>
+          </p:cNvCxnSpPr>
+          <p:nvPr/>
+        </p:nvCxnSpPr>
+        <p:spPr>
+          <a:xfrm flipV="1">
+            <a:off x="8079107" y="5356893"/>
+            <a:ext cx="439802" cy="547095"/>
+          </a:xfrm>
+          <a:prstGeom prst="straightConnector1">
+            <a:avLst/>
+          </a:prstGeom>
+          <a:ln w="38100">
+            <a:solidFill>
+              <a:srgbClr val="FF0000"/>
+            </a:solidFill>
+            <a:headEnd type="none" w="med" len="med"/>
+            <a:tailEnd type="triangle" w="med" len="med"/>
+          </a:ln>
+        </p:spPr>
+        <p:style>
+          <a:lnRef idx="1">
+            <a:schemeClr val="accent1"/>
+          </a:lnRef>
+          <a:fillRef idx="0">
+            <a:schemeClr val="accent1"/>
+          </a:fillRef>
+          <a:effectRef idx="0">
+            <a:schemeClr val="accent1"/>
+          </a:effectRef>
+          <a:fontRef idx="minor">
+            <a:schemeClr val="tx1"/>
+          </a:fontRef>
+        </p:style>
+      </p:cxnSp>
+      <p:cxnSp>
+        <p:nvCxnSpPr>
+          <p:cNvPr id="70" name="Straight Arrow Connector 69">
+            <a:extLst>
+              <a:ext uri="{FF2B5EF4-FFF2-40B4-BE49-F238E27FC236}">
+                <a16:creationId xmlns:a16="http://schemas.microsoft.com/office/drawing/2014/main" id="{D34EE53A-3CC1-6BCD-09C2-49F36AEDF7B4}"/>
+              </a:ext>
+            </a:extLst>
+          </p:cNvPr>
+          <p:cNvCxnSpPr>
+            <a:cxnSpLocks/>
+          </p:cNvCxnSpPr>
+          <p:nvPr/>
+        </p:nvCxnSpPr>
+        <p:spPr>
+          <a:xfrm>
+            <a:off x="1496074" y="1527179"/>
+            <a:ext cx="781214" cy="1330209"/>
+          </a:xfrm>
+          <a:prstGeom prst="straightConnector1">
+            <a:avLst/>
+          </a:prstGeom>
+          <a:ln w="38100">
+            <a:solidFill>
+              <a:srgbClr val="FF0000"/>
+            </a:solidFill>
+            <a:headEnd type="none" w="med" len="med"/>
+            <a:tailEnd type="triangle" w="med" len="med"/>
+          </a:ln>
+        </p:spPr>
+        <p:style>
+          <a:lnRef idx="1">
+            <a:schemeClr val="accent1"/>
+          </a:lnRef>
+          <a:fillRef idx="0">
+            <a:schemeClr val="accent1"/>
+          </a:fillRef>
+          <a:effectRef idx="0">
+            <a:schemeClr val="accent1"/>
+          </a:effectRef>
+          <a:fontRef idx="minor">
+            <a:schemeClr val="tx1"/>
+          </a:fontRef>
+        </p:style>
+      </p:cxnSp>
+      <p:sp>
+        <p:nvSpPr>
+          <p:cNvPr id="2" name="TextBox 1">
+            <a:extLst>
+              <a:ext uri="{FF2B5EF4-FFF2-40B4-BE49-F238E27FC236}">
+                <a16:creationId xmlns:a16="http://schemas.microsoft.com/office/drawing/2014/main" id="{0D569327-1EFA-67E5-0981-E6F65926268A}"/>
+              </a:ext>
+            </a:extLst>
+          </p:cNvPr>
+          <p:cNvSpPr txBox="1"/>
+          <p:nvPr/>
+        </p:nvSpPr>
+        <p:spPr>
+          <a:xfrm>
+            <a:off x="161414" y="1971848"/>
+            <a:ext cx="1331844" cy="646331"/>
+          </a:xfrm>
+          <a:prstGeom prst="rect">
+            <a:avLst/>
+          </a:prstGeom>
+          <a:solidFill>
+            <a:schemeClr val="accent5">
+              <a:lumMod val="60000"/>
+              <a:lumOff val="40000"/>
+            </a:schemeClr>
+          </a:solidFill>
+          <a:ln>
+            <a:solidFill>
+              <a:srgbClr val="FF0000"/>
+            </a:solidFill>
+          </a:ln>
+        </p:spPr>
+        <p:txBody>
+          <a:bodyPr wrap="square" rtlCol="1">
+            <a:spAutoFit/>
+          </a:bodyPr>
+          <a:lstStyle/>
+          <a:p>
+            <a:pPr algn="ctr"/>
+            <a:r>
+              <a:rPr lang="en-US" b="1" dirty="0">
+                <a:solidFill>
+                  <a:srgbClr val="FF0000"/>
+                </a:solidFill>
+              </a:rPr>
+              <a:t>Pause </a:t>
+            </a:r>
+            <a:r>
+              <a:rPr lang="en-US" dirty="0">
+                <a:solidFill>
+                  <a:srgbClr val="FF0000"/>
+                </a:solidFill>
+              </a:rPr>
+              <a:t>/ </a:t>
+            </a:r>
+            <a:r>
+              <a:rPr lang="en-US" b="1" dirty="0">
+                <a:solidFill>
+                  <a:srgbClr val="FF0000"/>
+                </a:solidFill>
+              </a:rPr>
+              <a:t>Play </a:t>
+            </a:r>
+            <a:r>
+              <a:rPr lang="en-US" dirty="0">
+                <a:solidFill>
+                  <a:srgbClr val="FF0000"/>
+                </a:solidFill>
+              </a:rPr>
+              <a:t>toggle</a:t>
+            </a:r>
+            <a:endParaRPr lang="he-IL" dirty="0">
+              <a:solidFill>
+                <a:srgbClr val="FF0000"/>
+              </a:solidFill>
+            </a:endParaRPr>
+          </a:p>
+        </p:txBody>
+      </p:sp>
+      <p:cxnSp>
+        <p:nvCxnSpPr>
+          <p:cNvPr id="3" name="Straight Arrow Connector 2">
+            <a:extLst>
+              <a:ext uri="{FF2B5EF4-FFF2-40B4-BE49-F238E27FC236}">
+                <a16:creationId xmlns:a16="http://schemas.microsoft.com/office/drawing/2014/main" id="{EF736206-6838-03F5-E760-FE9CD20B1C6D}"/>
+              </a:ext>
+            </a:extLst>
+          </p:cNvPr>
+          <p:cNvCxnSpPr>
+            <a:cxnSpLocks/>
+            <a:stCxn id="46" idx="2"/>
+          </p:cNvCxnSpPr>
+          <p:nvPr/>
+        </p:nvCxnSpPr>
+        <p:spPr>
+          <a:xfrm flipH="1">
+            <a:off x="8939928" y="3557612"/>
+            <a:ext cx="280726" cy="953306"/>
+          </a:xfrm>
+          <a:prstGeom prst="straightConnector1">
+            <a:avLst/>
+          </a:prstGeom>
+          <a:ln w="38100">
+            <a:solidFill>
+              <a:srgbClr val="FF0000"/>
+            </a:solidFill>
+            <a:headEnd type="none" w="med" len="med"/>
+            <a:tailEnd type="triangle" w="med" len="med"/>
+          </a:ln>
+        </p:spPr>
+        <p:style>
+          <a:lnRef idx="1">
+            <a:schemeClr val="accent1"/>
+          </a:lnRef>
+          <a:fillRef idx="0">
+            <a:schemeClr val="accent1"/>
+          </a:fillRef>
+          <a:effectRef idx="0">
+            <a:schemeClr val="accent1"/>
+          </a:effectRef>
+          <a:fontRef idx="minor">
+            <a:schemeClr val="tx1"/>
+          </a:fontRef>
+        </p:style>
+      </p:cxnSp>
+      <p:cxnSp>
+        <p:nvCxnSpPr>
+          <p:cNvPr id="8" name="Straight Arrow Connector 7">
+            <a:extLst>
+              <a:ext uri="{FF2B5EF4-FFF2-40B4-BE49-F238E27FC236}">
+                <a16:creationId xmlns:a16="http://schemas.microsoft.com/office/drawing/2014/main" id="{4D24BBF0-1F0A-750B-5ADD-808F3AD45A45}"/>
+              </a:ext>
+            </a:extLst>
+          </p:cNvPr>
+          <p:cNvCxnSpPr>
+            <a:cxnSpLocks/>
+            <a:stCxn id="2" idx="3"/>
+          </p:cNvCxnSpPr>
+          <p:nvPr/>
+        </p:nvCxnSpPr>
+        <p:spPr>
+          <a:xfrm>
+            <a:off x="1493258" y="2295014"/>
+            <a:ext cx="757754" cy="893266"/>
+          </a:xfrm>
+          <a:prstGeom prst="straightConnector1">
+            <a:avLst/>
+          </a:prstGeom>
+          <a:ln w="38100">
+            <a:solidFill>
+              <a:srgbClr val="FF0000"/>
+            </a:solidFill>
+            <a:headEnd type="none" w="med" len="med"/>
+            <a:tailEnd type="triangle" w="med" len="med"/>
+          </a:ln>
+        </p:spPr>
+        <p:style>
+          <a:lnRef idx="1">
+            <a:schemeClr val="accent1"/>
+          </a:lnRef>
+          <a:fillRef idx="0">
+            <a:schemeClr val="accent1"/>
+          </a:fillRef>
+          <a:effectRef idx="0">
+            <a:schemeClr val="accent1"/>
+          </a:effectRef>
+          <a:fontRef idx="minor">
+            <a:schemeClr val="tx1"/>
+          </a:fontRef>
+        </p:style>
+      </p:cxnSp>
+      <p:sp>
+        <p:nvSpPr>
+          <p:cNvPr id="10" name="TextBox 9">
+            <a:extLst>
+              <a:ext uri="{FF2B5EF4-FFF2-40B4-BE49-F238E27FC236}">
+                <a16:creationId xmlns:a16="http://schemas.microsoft.com/office/drawing/2014/main" id="{C07C1C7E-9131-E696-D981-F30672D4A3A1}"/>
+              </a:ext>
+            </a:extLst>
+          </p:cNvPr>
+          <p:cNvSpPr txBox="1"/>
+          <p:nvPr/>
+        </p:nvSpPr>
+        <p:spPr>
+          <a:xfrm>
+            <a:off x="152110" y="4266040"/>
+            <a:ext cx="1347038" cy="646331"/>
+          </a:xfrm>
+          <a:prstGeom prst="rect">
+            <a:avLst/>
+          </a:prstGeom>
+          <a:solidFill>
+            <a:schemeClr val="accent5">
+              <a:lumMod val="60000"/>
+              <a:lumOff val="40000"/>
+            </a:schemeClr>
+          </a:solidFill>
+          <a:ln>
+            <a:solidFill>
+              <a:srgbClr val="FF0000"/>
+            </a:solidFill>
+          </a:ln>
+        </p:spPr>
+        <p:txBody>
+          <a:bodyPr wrap="square" rtlCol="1">
+            <a:spAutoFit/>
+          </a:bodyPr>
+          <a:lstStyle/>
+          <a:p>
+            <a:pPr algn="ctr"/>
+            <a:r>
+              <a:rPr lang="en-US" dirty="0">
+                <a:solidFill>
+                  <a:srgbClr val="FF0000"/>
+                </a:solidFill>
+              </a:rPr>
+              <a:t>Show </a:t>
+            </a:r>
+            <a:r>
+              <a:rPr lang="en-US" b="1" dirty="0">
+                <a:solidFill>
+                  <a:srgbClr val="FF0000"/>
+                </a:solidFill>
+              </a:rPr>
+              <a:t>help </a:t>
+            </a:r>
+            <a:r>
+              <a:rPr lang="en-US" dirty="0">
+                <a:solidFill>
+                  <a:srgbClr val="FF0000"/>
+                </a:solidFill>
+              </a:rPr>
+              <a:t>info/tutorial</a:t>
+            </a:r>
+            <a:endParaRPr lang="he-IL" b="1" dirty="0">
+              <a:solidFill>
+                <a:srgbClr val="FF0000"/>
+              </a:solidFill>
+            </a:endParaRPr>
+          </a:p>
+        </p:txBody>
+      </p:sp>
+      <p:cxnSp>
+        <p:nvCxnSpPr>
+          <p:cNvPr id="13" name="Straight Arrow Connector 12">
+            <a:extLst>
+              <a:ext uri="{FF2B5EF4-FFF2-40B4-BE49-F238E27FC236}">
+                <a16:creationId xmlns:a16="http://schemas.microsoft.com/office/drawing/2014/main" id="{DC9C4151-15A1-A3C2-DA49-EAA00FA2DD4F}"/>
+              </a:ext>
+            </a:extLst>
+          </p:cNvPr>
+          <p:cNvCxnSpPr>
+            <a:cxnSpLocks/>
+            <a:stCxn id="10" idx="3"/>
+          </p:cNvCxnSpPr>
+          <p:nvPr/>
+        </p:nvCxnSpPr>
+        <p:spPr>
+          <a:xfrm flipV="1">
+            <a:off x="1499148" y="4163647"/>
+            <a:ext cx="808926" cy="425559"/>
+          </a:xfrm>
+          <a:prstGeom prst="straightConnector1">
+            <a:avLst/>
+          </a:prstGeom>
+          <a:ln w="38100">
+            <a:solidFill>
+              <a:srgbClr val="FF0000"/>
+            </a:solidFill>
+            <a:headEnd type="none" w="med" len="med"/>
+            <a:tailEnd type="triangle" w="med" len="med"/>
+          </a:ln>
+        </p:spPr>
+        <p:style>
+          <a:lnRef idx="1">
+            <a:schemeClr val="accent1"/>
+          </a:lnRef>
+          <a:fillRef idx="0">
+            <a:schemeClr val="accent1"/>
+          </a:fillRef>
+          <a:effectRef idx="0">
+            <a:schemeClr val="accent1"/>
+          </a:effectRef>
+          <a:fontRef idx="minor">
+            <a:schemeClr val="tx1"/>
+          </a:fontRef>
+        </p:style>
+      </p:cxnSp>
+      <p:sp>
+        <p:nvSpPr>
+          <p:cNvPr id="4" name="TextBox 3">
+            <a:extLst>
+              <a:ext uri="{FF2B5EF4-FFF2-40B4-BE49-F238E27FC236}">
+                <a16:creationId xmlns:a16="http://schemas.microsoft.com/office/drawing/2014/main" id="{F51D74B0-FBDA-B294-EF7A-84AF0399BFF2}"/>
+              </a:ext>
+            </a:extLst>
+          </p:cNvPr>
+          <p:cNvSpPr txBox="1"/>
+          <p:nvPr/>
+        </p:nvSpPr>
+        <p:spPr>
+          <a:xfrm>
+            <a:off x="1767268" y="412549"/>
+            <a:ext cx="1331844" cy="646331"/>
+          </a:xfrm>
+          <a:prstGeom prst="rect">
+            <a:avLst/>
+          </a:prstGeom>
+          <a:solidFill>
+            <a:schemeClr val="bg2"/>
+          </a:solidFill>
+          <a:ln>
+            <a:solidFill>
+              <a:srgbClr val="FF0000"/>
+            </a:solidFill>
+          </a:ln>
+        </p:spPr>
+        <p:txBody>
+          <a:bodyPr wrap="square" rtlCol="1">
+            <a:spAutoFit/>
+          </a:bodyPr>
+          <a:lstStyle/>
+          <a:p>
+            <a:pPr algn="ctr"/>
+            <a:r>
+              <a:rPr lang="en-US" dirty="0">
+                <a:solidFill>
+                  <a:srgbClr val="FF0000"/>
+                </a:solidFill>
+              </a:rPr>
+              <a:t>Info about boat </a:t>
+            </a:r>
+            <a:r>
+              <a:rPr lang="en-US" b="1" dirty="0">
+                <a:solidFill>
+                  <a:srgbClr val="FF0000"/>
+                </a:solidFill>
+              </a:rPr>
+              <a:t>Drag</a:t>
+            </a:r>
+            <a:endParaRPr lang="he-IL" b="1" dirty="0">
+              <a:solidFill>
+                <a:srgbClr val="FF0000"/>
+              </a:solidFill>
+            </a:endParaRPr>
+          </a:p>
+        </p:txBody>
+      </p:sp>
+      <p:cxnSp>
+        <p:nvCxnSpPr>
+          <p:cNvPr id="9" name="Straight Arrow Connector 8">
+            <a:extLst>
+              <a:ext uri="{FF2B5EF4-FFF2-40B4-BE49-F238E27FC236}">
+                <a16:creationId xmlns:a16="http://schemas.microsoft.com/office/drawing/2014/main" id="{1C03BA06-A82A-84C7-8FD4-6C616B45FD74}"/>
+              </a:ext>
+            </a:extLst>
+          </p:cNvPr>
+          <p:cNvCxnSpPr>
+            <a:cxnSpLocks/>
+            <a:stCxn id="4" idx="2"/>
+          </p:cNvCxnSpPr>
+          <p:nvPr/>
+        </p:nvCxnSpPr>
+        <p:spPr>
+          <a:xfrm>
+            <a:off x="2433190" y="1058880"/>
+            <a:ext cx="98089" cy="183356"/>
+          </a:xfrm>
+          <a:prstGeom prst="straightConnector1">
+            <a:avLst/>
+          </a:prstGeom>
+          <a:ln w="38100">
+            <a:solidFill>
+              <a:srgbClr val="FF0000"/>
+            </a:solidFill>
+            <a:headEnd type="none" w="med" len="med"/>
+            <a:tailEnd type="triangle" w="med" len="med"/>
+          </a:ln>
+        </p:spPr>
+        <p:style>
+          <a:lnRef idx="1">
+            <a:schemeClr val="accent1"/>
+          </a:lnRef>
+          <a:fillRef idx="0">
+            <a:schemeClr val="accent1"/>
+          </a:fillRef>
+          <a:effectRef idx="0">
+            <a:schemeClr val="accent1"/>
+          </a:effectRef>
+          <a:fontRef idx="minor">
+            <a:schemeClr val="tx1"/>
+          </a:fontRef>
+        </p:style>
+      </p:cxnSp>
+      <p:sp>
+        <p:nvSpPr>
+          <p:cNvPr id="34" name="TextBox 33">
+            <a:extLst>
+              <a:ext uri="{FF2B5EF4-FFF2-40B4-BE49-F238E27FC236}">
+                <a16:creationId xmlns:a16="http://schemas.microsoft.com/office/drawing/2014/main" id="{FFA4DE85-443A-AFF3-7FE4-F010E6FE420C}"/>
+              </a:ext>
+            </a:extLst>
+          </p:cNvPr>
+          <p:cNvSpPr txBox="1"/>
+          <p:nvPr/>
+        </p:nvSpPr>
+        <p:spPr>
+          <a:xfrm>
+            <a:off x="3277107" y="416261"/>
+            <a:ext cx="1331844" cy="646331"/>
+          </a:xfrm>
+          <a:prstGeom prst="rect">
+            <a:avLst/>
+          </a:prstGeom>
+          <a:solidFill>
+            <a:schemeClr val="bg2"/>
+          </a:solidFill>
+          <a:ln>
+            <a:solidFill>
+              <a:srgbClr val="FF0000"/>
+            </a:solidFill>
+          </a:ln>
+        </p:spPr>
+        <p:txBody>
+          <a:bodyPr wrap="square" rtlCol="1">
+            <a:spAutoFit/>
+          </a:bodyPr>
+          <a:lstStyle/>
+          <a:p>
+            <a:pPr algn="ctr"/>
+            <a:r>
+              <a:rPr lang="en-US" dirty="0">
+                <a:solidFill>
+                  <a:srgbClr val="FF0000"/>
+                </a:solidFill>
+              </a:rPr>
+              <a:t>Info about wind </a:t>
+            </a:r>
+            <a:r>
+              <a:rPr lang="en-US" b="1" dirty="0">
+                <a:solidFill>
+                  <a:srgbClr val="FF0000"/>
+                </a:solidFill>
+              </a:rPr>
+              <a:t>Force</a:t>
+            </a:r>
+            <a:endParaRPr lang="he-IL" b="1" dirty="0">
+              <a:solidFill>
+                <a:srgbClr val="FF0000"/>
+              </a:solidFill>
+            </a:endParaRPr>
+          </a:p>
+        </p:txBody>
+      </p:sp>
+      <p:cxnSp>
+        <p:nvCxnSpPr>
+          <p:cNvPr id="35" name="Straight Arrow Connector 34">
+            <a:extLst>
+              <a:ext uri="{FF2B5EF4-FFF2-40B4-BE49-F238E27FC236}">
+                <a16:creationId xmlns:a16="http://schemas.microsoft.com/office/drawing/2014/main" id="{27A10725-9BAF-4112-5F99-81EFD7781E61}"/>
+              </a:ext>
+            </a:extLst>
+          </p:cNvPr>
+          <p:cNvCxnSpPr>
+            <a:cxnSpLocks/>
+          </p:cNvCxnSpPr>
+          <p:nvPr/>
+        </p:nvCxnSpPr>
+        <p:spPr>
+          <a:xfrm flipH="1" flipV="1">
+            <a:off x="9019750" y="5402997"/>
+            <a:ext cx="1611155" cy="522741"/>
+          </a:xfrm>
+          <a:prstGeom prst="straightConnector1">
+            <a:avLst/>
+          </a:prstGeom>
+          <a:ln w="38100">
+            <a:solidFill>
+              <a:srgbClr val="FF0000"/>
+            </a:solidFill>
+            <a:headEnd type="none" w="med" len="med"/>
+            <a:tailEnd type="triangle" w="med" len="med"/>
+          </a:ln>
+        </p:spPr>
+        <p:style>
+          <a:lnRef idx="1">
+            <a:schemeClr val="accent1"/>
+          </a:lnRef>
+          <a:fillRef idx="0">
+            <a:schemeClr val="accent1"/>
+          </a:fillRef>
+          <a:effectRef idx="0">
+            <a:schemeClr val="accent1"/>
+          </a:effectRef>
+          <a:fontRef idx="minor">
+            <a:schemeClr val="tx1"/>
+          </a:fontRef>
+        </p:style>
+      </p:cxnSp>
+      <p:sp>
+        <p:nvSpPr>
+          <p:cNvPr id="44" name="TextBox 43">
+            <a:extLst>
+              <a:ext uri="{FF2B5EF4-FFF2-40B4-BE49-F238E27FC236}">
+                <a16:creationId xmlns:a16="http://schemas.microsoft.com/office/drawing/2014/main" id="{E28114D9-F165-1C18-7E8A-C8F24E552EFD}"/>
+              </a:ext>
+            </a:extLst>
+          </p:cNvPr>
+          <p:cNvSpPr txBox="1"/>
+          <p:nvPr/>
+        </p:nvSpPr>
+        <p:spPr>
+          <a:xfrm>
+            <a:off x="10532974" y="3387934"/>
+            <a:ext cx="1558806" cy="646331"/>
+          </a:xfrm>
+          <a:prstGeom prst="rect">
+            <a:avLst/>
+          </a:prstGeom>
+          <a:solidFill>
+            <a:schemeClr val="accent5">
+              <a:lumMod val="60000"/>
+              <a:lumOff val="40000"/>
+            </a:schemeClr>
+          </a:solidFill>
+          <a:ln>
+            <a:solidFill>
+              <a:srgbClr val="FF0000"/>
+            </a:solidFill>
+          </a:ln>
+        </p:spPr>
+        <p:txBody>
+          <a:bodyPr wrap="square" rtlCol="1">
+            <a:spAutoFit/>
+          </a:bodyPr>
+          <a:lstStyle/>
+          <a:p>
+            <a:pPr algn="ctr"/>
+            <a:r>
+              <a:rPr lang="en-US" dirty="0">
+                <a:solidFill>
+                  <a:srgbClr val="FF0000"/>
+                </a:solidFill>
+              </a:rPr>
+              <a:t>Man in water drill</a:t>
+            </a:r>
+            <a:endParaRPr lang="he-IL" dirty="0">
+              <a:solidFill>
+                <a:srgbClr val="FF0000"/>
+              </a:solidFill>
+            </a:endParaRPr>
+          </a:p>
+        </p:txBody>
+      </p:sp>
+      <p:sp>
+        <p:nvSpPr>
+          <p:cNvPr id="46" name="TextBox 45">
+            <a:extLst>
+              <a:ext uri="{FF2B5EF4-FFF2-40B4-BE49-F238E27FC236}">
+                <a16:creationId xmlns:a16="http://schemas.microsoft.com/office/drawing/2014/main" id="{1C012FE4-3506-5119-179F-553A51A7CCD0}"/>
+              </a:ext>
+            </a:extLst>
+          </p:cNvPr>
+          <p:cNvSpPr txBox="1"/>
+          <p:nvPr/>
+        </p:nvSpPr>
+        <p:spPr>
+          <a:xfrm>
+            <a:off x="8372660" y="3188280"/>
+            <a:ext cx="1695987" cy="369332"/>
+          </a:xfrm>
+          <a:prstGeom prst="rect">
+            <a:avLst/>
+          </a:prstGeom>
+          <a:solidFill>
+            <a:schemeClr val="accent5">
+              <a:lumMod val="60000"/>
+              <a:lumOff val="40000"/>
+            </a:schemeClr>
+          </a:solidFill>
+          <a:ln>
+            <a:solidFill>
+              <a:srgbClr val="FF0000"/>
+            </a:solidFill>
+          </a:ln>
+        </p:spPr>
+        <p:txBody>
+          <a:bodyPr wrap="square" rtlCol="1">
+            <a:spAutoFit/>
+          </a:bodyPr>
+          <a:lstStyle/>
+          <a:p>
+            <a:pPr algn="ctr"/>
+            <a:r>
+              <a:rPr lang="en-US" b="1" dirty="0">
+                <a:solidFill>
+                  <a:srgbClr val="FF0000"/>
+                </a:solidFill>
+              </a:rPr>
+              <a:t>Zoom</a:t>
+            </a:r>
+            <a:r>
+              <a:rPr lang="en-US" dirty="0">
+                <a:solidFill>
+                  <a:srgbClr val="FF0000"/>
+                </a:solidFill>
+              </a:rPr>
+              <a:t> in/out</a:t>
+            </a:r>
+            <a:endParaRPr lang="he-IL" dirty="0">
+              <a:solidFill>
+                <a:srgbClr val="FF0000"/>
+              </a:solidFill>
+            </a:endParaRPr>
+          </a:p>
+        </p:txBody>
+      </p:sp>
+      <p:cxnSp>
+        <p:nvCxnSpPr>
+          <p:cNvPr id="52" name="Straight Arrow Connector 51">
+            <a:extLst>
+              <a:ext uri="{FF2B5EF4-FFF2-40B4-BE49-F238E27FC236}">
+                <a16:creationId xmlns:a16="http://schemas.microsoft.com/office/drawing/2014/main" id="{325A7A7A-2152-D326-0E73-6B05D484DD14}"/>
+              </a:ext>
+            </a:extLst>
+          </p:cNvPr>
+          <p:cNvCxnSpPr>
+            <a:cxnSpLocks/>
+          </p:cNvCxnSpPr>
+          <p:nvPr/>
+        </p:nvCxnSpPr>
+        <p:spPr>
+          <a:xfrm>
+            <a:off x="9225424" y="3583179"/>
+            <a:ext cx="475850" cy="927739"/>
+          </a:xfrm>
+          <a:prstGeom prst="straightConnector1">
+            <a:avLst/>
+          </a:prstGeom>
+          <a:ln w="38100">
+            <a:solidFill>
+              <a:srgbClr val="FF0000"/>
+            </a:solidFill>
+            <a:headEnd type="none" w="med" len="med"/>
+            <a:tailEnd type="triangle" w="med" len="med"/>
+          </a:ln>
+        </p:spPr>
+        <p:style>
+          <a:lnRef idx="1">
+            <a:schemeClr val="accent1"/>
+          </a:lnRef>
+          <a:fillRef idx="0">
+            <a:schemeClr val="accent1"/>
+          </a:fillRef>
+          <a:effectRef idx="0">
+            <a:schemeClr val="accent1"/>
+          </a:effectRef>
+          <a:fontRef idx="minor">
+            <a:schemeClr val="tx1"/>
+          </a:fontRef>
+        </p:style>
+      </p:cxnSp>
+      <p:sp>
+        <p:nvSpPr>
+          <p:cNvPr id="71" name="TextBox 70">
+            <a:extLst>
+              <a:ext uri="{FF2B5EF4-FFF2-40B4-BE49-F238E27FC236}">
+                <a16:creationId xmlns:a16="http://schemas.microsoft.com/office/drawing/2014/main" id="{7326055C-9722-C25E-9430-D4B21DD31389}"/>
+              </a:ext>
+            </a:extLst>
+          </p:cNvPr>
+          <p:cNvSpPr txBox="1"/>
+          <p:nvPr/>
+        </p:nvSpPr>
+        <p:spPr>
+          <a:xfrm>
+            <a:off x="10646455" y="4627225"/>
+            <a:ext cx="1331844" cy="646331"/>
+          </a:xfrm>
+          <a:prstGeom prst="rect">
+            <a:avLst/>
+          </a:prstGeom>
+          <a:solidFill>
+            <a:srgbClr val="FFFF00"/>
+          </a:solidFill>
+          <a:ln>
+            <a:solidFill>
+              <a:srgbClr val="FF0000"/>
+            </a:solidFill>
+          </a:ln>
+        </p:spPr>
+        <p:txBody>
+          <a:bodyPr wrap="square" rtlCol="1">
+            <a:spAutoFit/>
+          </a:bodyPr>
+          <a:lstStyle>
+            <a:defPPr>
+              <a:defRPr lang="he-IL"/>
+            </a:defPPr>
+            <a:lvl1pPr>
+              <a:defRPr>
+                <a:solidFill>
+                  <a:srgbClr val="FF0000"/>
+                </a:solidFill>
+              </a:defRPr>
+            </a:lvl1pPr>
+          </a:lstStyle>
+          <a:p>
+            <a:pPr algn="ctr"/>
+            <a:r>
+              <a:rPr lang="en-US" dirty="0">
+                <a:solidFill>
+                  <a:srgbClr val="FF0000"/>
+                </a:solidFill>
+              </a:rPr>
+              <a:t>Lower/raise </a:t>
+            </a:r>
+            <a:r>
+              <a:rPr lang="en-US" b="1" dirty="0">
+                <a:solidFill>
+                  <a:srgbClr val="FF0000"/>
+                </a:solidFill>
+              </a:rPr>
+              <a:t>Keel</a:t>
+            </a:r>
+            <a:endParaRPr lang="he-IL" b="1" dirty="0">
+              <a:solidFill>
+                <a:srgbClr val="FF0000"/>
+              </a:solidFill>
+            </a:endParaRPr>
+          </a:p>
+        </p:txBody>
+      </p:sp>
+      <p:cxnSp>
+        <p:nvCxnSpPr>
+          <p:cNvPr id="54" name="Straight Arrow Connector 53">
+            <a:extLst>
+              <a:ext uri="{FF2B5EF4-FFF2-40B4-BE49-F238E27FC236}">
+                <a16:creationId xmlns:a16="http://schemas.microsoft.com/office/drawing/2014/main" id="{54BC26C7-7F1C-53E0-9098-C923B6105505}"/>
+              </a:ext>
+            </a:extLst>
+          </p:cNvPr>
+          <p:cNvCxnSpPr>
+            <a:cxnSpLocks/>
+            <a:stCxn id="71" idx="1"/>
+          </p:cNvCxnSpPr>
+          <p:nvPr/>
+        </p:nvCxnSpPr>
+        <p:spPr>
+          <a:xfrm flipH="1">
+            <a:off x="10109736" y="4950391"/>
+            <a:ext cx="536719" cy="66708"/>
+          </a:xfrm>
+          <a:prstGeom prst="straightConnector1">
+            <a:avLst/>
+          </a:prstGeom>
+          <a:ln w="38100">
+            <a:solidFill>
+              <a:srgbClr val="FF0000"/>
+            </a:solidFill>
+            <a:headEnd type="none" w="med" len="med"/>
+            <a:tailEnd type="triangle" w="med" len="med"/>
+          </a:ln>
+        </p:spPr>
+        <p:style>
+          <a:lnRef idx="1">
+            <a:schemeClr val="accent1"/>
+          </a:lnRef>
+          <a:fillRef idx="0">
+            <a:schemeClr val="accent1"/>
+          </a:fillRef>
+          <a:effectRef idx="0">
+            <a:schemeClr val="accent1"/>
+          </a:effectRef>
+          <a:fontRef idx="minor">
+            <a:schemeClr val="tx1"/>
+          </a:fontRef>
+        </p:style>
+      </p:cxnSp>
+      <p:sp>
+        <p:nvSpPr>
+          <p:cNvPr id="72" name="TextBox 71">
+            <a:extLst>
+              <a:ext uri="{FF2B5EF4-FFF2-40B4-BE49-F238E27FC236}">
+                <a16:creationId xmlns:a16="http://schemas.microsoft.com/office/drawing/2014/main" id="{3CAAD990-E1CE-D529-3711-89C2A73DD54D}"/>
+              </a:ext>
+            </a:extLst>
+          </p:cNvPr>
+          <p:cNvSpPr txBox="1"/>
+          <p:nvPr/>
+        </p:nvSpPr>
+        <p:spPr>
+          <a:xfrm>
+            <a:off x="537883" y="4963238"/>
+            <a:ext cx="962701" cy="369332"/>
+          </a:xfrm>
+          <a:prstGeom prst="rect">
+            <a:avLst/>
+          </a:prstGeom>
+          <a:noFill/>
+        </p:spPr>
+        <p:txBody>
+          <a:bodyPr wrap="square" rtlCol="1">
+            <a:spAutoFit/>
+          </a:bodyPr>
+          <a:lstStyle/>
+          <a:p>
+            <a:r>
+              <a:rPr lang="en-US" b="1" dirty="0"/>
+              <a:t>Legend</a:t>
+            </a:r>
+            <a:r>
+              <a:rPr lang="en-US" dirty="0"/>
+              <a:t>:</a:t>
+            </a:r>
+            <a:endParaRPr lang="he-IL" dirty="0"/>
+          </a:p>
+        </p:txBody>
+      </p:sp>
+      <p:sp>
+        <p:nvSpPr>
+          <p:cNvPr id="73" name="TextBox 72">
+            <a:extLst>
+              <a:ext uri="{FF2B5EF4-FFF2-40B4-BE49-F238E27FC236}">
+                <a16:creationId xmlns:a16="http://schemas.microsoft.com/office/drawing/2014/main" id="{9DDF3613-7975-98AB-9599-99561CB43CAA}"/>
+              </a:ext>
+            </a:extLst>
+          </p:cNvPr>
+          <p:cNvSpPr txBox="1"/>
+          <p:nvPr/>
+        </p:nvSpPr>
+        <p:spPr>
+          <a:xfrm>
+            <a:off x="662488" y="5279563"/>
+            <a:ext cx="820829" cy="276999"/>
+          </a:xfrm>
+          <a:prstGeom prst="rect">
+            <a:avLst/>
+          </a:prstGeom>
+          <a:solidFill>
+            <a:srgbClr val="FFFF00"/>
+          </a:solidFill>
+          <a:ln>
+            <a:solidFill>
+              <a:srgbClr val="FF0000"/>
+            </a:solidFill>
+          </a:ln>
+        </p:spPr>
+        <p:txBody>
+          <a:bodyPr wrap="square" rtlCol="1">
+            <a:spAutoFit/>
+          </a:bodyPr>
+          <a:lstStyle>
+            <a:defPPr>
+              <a:defRPr lang="he-IL"/>
+            </a:defPPr>
+            <a:lvl1pPr>
+              <a:defRPr>
+                <a:solidFill>
+                  <a:srgbClr val="FF0000"/>
+                </a:solidFill>
+              </a:defRPr>
+            </a:lvl1pPr>
+          </a:lstStyle>
+          <a:p>
+            <a:r>
+              <a:rPr lang="en-US" sz="1200" dirty="0"/>
+              <a:t>Navigate</a:t>
+            </a:r>
+            <a:endParaRPr lang="he-IL" sz="1200" dirty="0"/>
+          </a:p>
+        </p:txBody>
+      </p:sp>
+      <p:sp>
+        <p:nvSpPr>
+          <p:cNvPr id="74" name="TextBox 73">
+            <a:extLst>
+              <a:ext uri="{FF2B5EF4-FFF2-40B4-BE49-F238E27FC236}">
+                <a16:creationId xmlns:a16="http://schemas.microsoft.com/office/drawing/2014/main" id="{DC6A9CC8-3CC1-DBE2-CE90-E7E91554B456}"/>
+              </a:ext>
+            </a:extLst>
+          </p:cNvPr>
+          <p:cNvSpPr txBox="1"/>
+          <p:nvPr/>
+        </p:nvSpPr>
+        <p:spPr>
+          <a:xfrm>
+            <a:off x="672429" y="5654993"/>
+            <a:ext cx="814702" cy="276999"/>
+          </a:xfrm>
+          <a:prstGeom prst="rect">
+            <a:avLst/>
+          </a:prstGeom>
+          <a:solidFill>
+            <a:schemeClr val="accent5">
+              <a:lumMod val="60000"/>
+              <a:lumOff val="40000"/>
+            </a:schemeClr>
+          </a:solidFill>
+          <a:ln>
+            <a:solidFill>
+              <a:srgbClr val="FF0000"/>
+            </a:solidFill>
+          </a:ln>
+        </p:spPr>
+        <p:txBody>
+          <a:bodyPr wrap="square" rtlCol="1">
+            <a:spAutoFit/>
+          </a:bodyPr>
+          <a:lstStyle/>
+          <a:p>
+            <a:r>
+              <a:rPr lang="en-US" sz="1200" dirty="0">
+                <a:solidFill>
+                  <a:srgbClr val="FF0000"/>
+                </a:solidFill>
+              </a:rPr>
+              <a:t>Controls</a:t>
+            </a:r>
+            <a:endParaRPr lang="he-IL" sz="1200" dirty="0">
+              <a:solidFill>
+                <a:srgbClr val="FF0000"/>
+              </a:solidFill>
+            </a:endParaRPr>
+          </a:p>
+        </p:txBody>
+      </p:sp>
+      <p:sp>
+        <p:nvSpPr>
+          <p:cNvPr id="75" name="TextBox 74">
+            <a:extLst>
+              <a:ext uri="{FF2B5EF4-FFF2-40B4-BE49-F238E27FC236}">
+                <a16:creationId xmlns:a16="http://schemas.microsoft.com/office/drawing/2014/main" id="{D359E823-E307-63CC-A74E-D1BA515E2419}"/>
+              </a:ext>
+            </a:extLst>
+          </p:cNvPr>
+          <p:cNvSpPr txBox="1"/>
+          <p:nvPr/>
+        </p:nvSpPr>
+        <p:spPr>
+          <a:xfrm>
+            <a:off x="672443" y="6030423"/>
+            <a:ext cx="820829" cy="276999"/>
+          </a:xfrm>
+          <a:prstGeom prst="rect">
+            <a:avLst/>
+          </a:prstGeom>
+          <a:solidFill>
+            <a:schemeClr val="bg2"/>
+          </a:solidFill>
+          <a:ln>
+            <a:solidFill>
+              <a:srgbClr val="FF0000"/>
+            </a:solidFill>
+          </a:ln>
+        </p:spPr>
+        <p:txBody>
+          <a:bodyPr wrap="square" rtlCol="1">
+            <a:spAutoFit/>
+          </a:bodyPr>
+          <a:lstStyle/>
+          <a:p>
+            <a:r>
+              <a:rPr lang="en-US" sz="1200" dirty="0">
+                <a:solidFill>
+                  <a:srgbClr val="FF0000"/>
+                </a:solidFill>
+              </a:rPr>
+              <a:t>Info</a:t>
+            </a:r>
+            <a:endParaRPr lang="he-IL" sz="1200" dirty="0">
+              <a:solidFill>
+                <a:srgbClr val="FF0000"/>
+              </a:solidFill>
+            </a:endParaRPr>
+          </a:p>
+        </p:txBody>
+      </p:sp>
+      <p:sp>
+        <p:nvSpPr>
+          <p:cNvPr id="14" name="TextBox 13">
+            <a:extLst>
+              <a:ext uri="{FF2B5EF4-FFF2-40B4-BE49-F238E27FC236}">
+                <a16:creationId xmlns:a16="http://schemas.microsoft.com/office/drawing/2014/main" id="{5BB22B65-062E-3F5D-81C9-D166F0327A1B}"/>
+              </a:ext>
+            </a:extLst>
+          </p:cNvPr>
+          <p:cNvSpPr txBox="1"/>
+          <p:nvPr/>
+        </p:nvSpPr>
+        <p:spPr>
+          <a:xfrm>
+            <a:off x="227382" y="420573"/>
+            <a:ext cx="1265876" cy="646331"/>
+          </a:xfrm>
+          <a:prstGeom prst="rect">
+            <a:avLst/>
+          </a:prstGeom>
+          <a:solidFill>
+            <a:schemeClr val="accent5">
+              <a:lumMod val="60000"/>
+              <a:lumOff val="40000"/>
+            </a:schemeClr>
+          </a:solidFill>
+          <a:ln>
+            <a:solidFill>
+              <a:srgbClr val="FF0000"/>
+            </a:solidFill>
+          </a:ln>
+        </p:spPr>
+        <p:txBody>
+          <a:bodyPr wrap="square" rtlCol="1">
+            <a:spAutoFit/>
+          </a:bodyPr>
+          <a:lstStyle/>
+          <a:p>
+            <a:pPr algn="ctr"/>
+            <a:r>
+              <a:rPr lang="en-US" dirty="0">
+                <a:solidFill>
+                  <a:srgbClr val="FF0000"/>
+                </a:solidFill>
+              </a:rPr>
+              <a:t>Toggle </a:t>
+            </a:r>
+            <a:r>
+              <a:rPr lang="en-US" b="1" dirty="0">
+                <a:solidFill>
+                  <a:srgbClr val="FF0000"/>
+                </a:solidFill>
+              </a:rPr>
+              <a:t>ANCHOR</a:t>
+            </a:r>
+            <a:endParaRPr lang="he-IL" b="1" dirty="0">
+              <a:solidFill>
+                <a:srgbClr val="FF0000"/>
+              </a:solidFill>
+            </a:endParaRPr>
+          </a:p>
+        </p:txBody>
+      </p:sp>
+      <p:cxnSp>
+        <p:nvCxnSpPr>
+          <p:cNvPr id="66" name="Straight Arrow Connector 65">
+            <a:extLst>
+              <a:ext uri="{FF2B5EF4-FFF2-40B4-BE49-F238E27FC236}">
+                <a16:creationId xmlns:a16="http://schemas.microsoft.com/office/drawing/2014/main" id="{4BE0823D-3C13-E11E-F72D-7E1DA5822162}"/>
+              </a:ext>
+            </a:extLst>
+          </p:cNvPr>
+          <p:cNvCxnSpPr>
+            <a:cxnSpLocks/>
+          </p:cNvCxnSpPr>
+          <p:nvPr/>
+        </p:nvCxnSpPr>
+        <p:spPr>
+          <a:xfrm>
+            <a:off x="1393185" y="1058880"/>
+            <a:ext cx="868112" cy="608484"/>
+          </a:xfrm>
+          <a:prstGeom prst="straightConnector1">
+            <a:avLst/>
+          </a:prstGeom>
+          <a:ln w="38100">
+            <a:solidFill>
+              <a:srgbClr val="FF0000"/>
+            </a:solidFill>
+            <a:headEnd type="none" w="med" len="med"/>
+            <a:tailEnd type="triangle" w="med" len="med"/>
+          </a:ln>
+        </p:spPr>
+        <p:style>
+          <a:lnRef idx="1">
+            <a:schemeClr val="accent1"/>
+          </a:lnRef>
+          <a:fillRef idx="0">
+            <a:schemeClr val="accent1"/>
+          </a:fillRef>
+          <a:effectRef idx="0">
+            <a:schemeClr val="accent1"/>
+          </a:effectRef>
+          <a:fontRef idx="minor">
+            <a:schemeClr val="tx1"/>
+          </a:fontRef>
+        </p:style>
+      </p:cxnSp>
+      <p:cxnSp>
+        <p:nvCxnSpPr>
+          <p:cNvPr id="69" name="Straight Arrow Connector 68">
+            <a:extLst>
+              <a:ext uri="{FF2B5EF4-FFF2-40B4-BE49-F238E27FC236}">
+                <a16:creationId xmlns:a16="http://schemas.microsoft.com/office/drawing/2014/main" id="{FBB244F3-3DE4-8C5A-117E-33F0C5294E5D}"/>
+              </a:ext>
+            </a:extLst>
+          </p:cNvPr>
+          <p:cNvCxnSpPr>
+            <a:cxnSpLocks/>
+            <a:stCxn id="34" idx="2"/>
+          </p:cNvCxnSpPr>
+          <p:nvPr/>
+        </p:nvCxnSpPr>
+        <p:spPr>
+          <a:xfrm flipH="1">
+            <a:off x="3714153" y="1062592"/>
+            <a:ext cx="228876" cy="175797"/>
+          </a:xfrm>
+          <a:prstGeom prst="straightConnector1">
+            <a:avLst/>
+          </a:prstGeom>
+          <a:ln w="38100">
+            <a:solidFill>
+              <a:srgbClr val="FF0000"/>
+            </a:solidFill>
+            <a:headEnd type="none" w="med" len="med"/>
+            <a:tailEnd type="triangle" w="med" len="med"/>
+          </a:ln>
+        </p:spPr>
+        <p:style>
+          <a:lnRef idx="1">
+            <a:schemeClr val="accent1"/>
+          </a:lnRef>
+          <a:fillRef idx="0">
+            <a:schemeClr val="accent1"/>
+          </a:fillRef>
+          <a:effectRef idx="0">
+            <a:schemeClr val="accent1"/>
+          </a:effectRef>
+          <a:fontRef idx="minor">
+            <a:schemeClr val="tx1"/>
+          </a:fontRef>
+        </p:style>
+      </p:cxnSp>
+      <p:cxnSp>
+        <p:nvCxnSpPr>
+          <p:cNvPr id="101" name="Straight Arrow Connector 100">
+            <a:extLst>
+              <a:ext uri="{FF2B5EF4-FFF2-40B4-BE49-F238E27FC236}">
+                <a16:creationId xmlns:a16="http://schemas.microsoft.com/office/drawing/2014/main" id="{30CB798D-485A-2080-BD3D-B08B4A33FE6E}"/>
+              </a:ext>
+            </a:extLst>
+          </p:cNvPr>
+          <p:cNvCxnSpPr>
+            <a:cxnSpLocks/>
+            <a:stCxn id="44" idx="1"/>
+          </p:cNvCxnSpPr>
+          <p:nvPr/>
+        </p:nvCxnSpPr>
+        <p:spPr>
+          <a:xfrm flipH="1">
+            <a:off x="9344148" y="3711100"/>
+            <a:ext cx="1188826" cy="842287"/>
+          </a:xfrm>
+          <a:prstGeom prst="straightConnector1">
+            <a:avLst/>
+          </a:prstGeom>
+          <a:ln w="38100">
+            <a:solidFill>
+              <a:srgbClr val="FF0000"/>
+            </a:solidFill>
+            <a:headEnd type="none" w="med" len="med"/>
+            <a:tailEnd type="triangle" w="med" len="med"/>
+          </a:ln>
+        </p:spPr>
+        <p:style>
+          <a:lnRef idx="1">
+            <a:schemeClr val="accent1"/>
+          </a:lnRef>
+          <a:fillRef idx="0">
+            <a:schemeClr val="accent1"/>
+          </a:fillRef>
+          <a:effectRef idx="0">
+            <a:schemeClr val="accent1"/>
+          </a:effectRef>
+          <a:fontRef idx="minor">
+            <a:schemeClr val="tx1"/>
+          </a:fontRef>
+        </p:style>
+      </p:cxnSp>
+      <p:sp>
+        <p:nvSpPr>
+          <p:cNvPr id="106" name="TextBox 105">
+            <a:extLst>
+              <a:ext uri="{FF2B5EF4-FFF2-40B4-BE49-F238E27FC236}">
+                <a16:creationId xmlns:a16="http://schemas.microsoft.com/office/drawing/2014/main" id="{4AD3AF5D-B899-26AB-713F-BE687168CB12}"/>
+              </a:ext>
+            </a:extLst>
+          </p:cNvPr>
+          <p:cNvSpPr txBox="1"/>
+          <p:nvPr/>
+        </p:nvSpPr>
+        <p:spPr>
+          <a:xfrm>
+            <a:off x="8358497" y="563410"/>
+            <a:ext cx="1558806" cy="369332"/>
+          </a:xfrm>
+          <a:prstGeom prst="rect">
+            <a:avLst/>
+          </a:prstGeom>
+          <a:solidFill>
+            <a:schemeClr val="accent5">
+              <a:lumMod val="75000"/>
+            </a:schemeClr>
+          </a:solidFill>
+          <a:ln>
+            <a:solidFill>
+              <a:srgbClr val="FF0000"/>
+            </a:solidFill>
+          </a:ln>
+        </p:spPr>
+        <p:txBody>
+          <a:bodyPr wrap="square" rtlCol="1">
+            <a:spAutoFit/>
+          </a:bodyPr>
+          <a:lstStyle/>
+          <a:p>
+            <a:pPr algn="ctr"/>
+            <a:r>
+              <a:rPr lang="en-US" dirty="0">
+                <a:solidFill>
+                  <a:srgbClr val="FF0000"/>
+                </a:solidFill>
+              </a:rPr>
+              <a:t>Waves breaker</a:t>
+            </a:r>
+            <a:endParaRPr lang="he-IL" dirty="0">
+              <a:solidFill>
+                <a:srgbClr val="FF0000"/>
+              </a:solidFill>
+            </a:endParaRPr>
+          </a:p>
+        </p:txBody>
+      </p:sp>
+      <p:sp>
+        <p:nvSpPr>
+          <p:cNvPr id="107" name="TextBox 106">
+            <a:extLst>
+              <a:ext uri="{FF2B5EF4-FFF2-40B4-BE49-F238E27FC236}">
+                <a16:creationId xmlns:a16="http://schemas.microsoft.com/office/drawing/2014/main" id="{82775C8C-7BCA-3EF9-0B53-4C1013171478}"/>
+              </a:ext>
+            </a:extLst>
+          </p:cNvPr>
+          <p:cNvSpPr txBox="1"/>
+          <p:nvPr/>
+        </p:nvSpPr>
+        <p:spPr>
+          <a:xfrm>
+            <a:off x="5920772" y="551048"/>
+            <a:ext cx="708311" cy="369332"/>
+          </a:xfrm>
+          <a:prstGeom prst="rect">
+            <a:avLst/>
+          </a:prstGeom>
+          <a:solidFill>
+            <a:schemeClr val="accent5">
+              <a:lumMod val="75000"/>
+            </a:schemeClr>
+          </a:solidFill>
+          <a:ln>
+            <a:solidFill>
+              <a:srgbClr val="FF0000"/>
+            </a:solidFill>
+          </a:ln>
+        </p:spPr>
+        <p:txBody>
+          <a:bodyPr wrap="square" rtlCol="1">
+            <a:spAutoFit/>
+          </a:bodyPr>
+          <a:lstStyle/>
+          <a:p>
+            <a:pPr algn="ctr"/>
+            <a:r>
+              <a:rPr lang="en-US" dirty="0">
+                <a:solidFill>
+                  <a:srgbClr val="FF0000"/>
+                </a:solidFill>
+              </a:rPr>
+              <a:t>Rock</a:t>
+            </a:r>
+            <a:endParaRPr lang="he-IL" dirty="0">
+              <a:solidFill>
+                <a:srgbClr val="FF0000"/>
+              </a:solidFill>
+            </a:endParaRPr>
+          </a:p>
+        </p:txBody>
+      </p:sp>
+      <p:sp>
+        <p:nvSpPr>
+          <p:cNvPr id="108" name="TextBox 107">
+            <a:extLst>
+              <a:ext uri="{FF2B5EF4-FFF2-40B4-BE49-F238E27FC236}">
+                <a16:creationId xmlns:a16="http://schemas.microsoft.com/office/drawing/2014/main" id="{1F314DF5-F8DF-3D8A-815E-77C066A992EB}"/>
+              </a:ext>
+            </a:extLst>
+          </p:cNvPr>
+          <p:cNvSpPr txBox="1"/>
+          <p:nvPr/>
+        </p:nvSpPr>
+        <p:spPr>
+          <a:xfrm>
+            <a:off x="6862821" y="412549"/>
+            <a:ext cx="1153823" cy="646331"/>
+          </a:xfrm>
+          <a:prstGeom prst="rect">
+            <a:avLst/>
+          </a:prstGeom>
+          <a:solidFill>
+            <a:schemeClr val="accent5">
+              <a:lumMod val="75000"/>
+            </a:schemeClr>
+          </a:solidFill>
+          <a:ln>
+            <a:solidFill>
+              <a:srgbClr val="FF0000"/>
+            </a:solidFill>
+          </a:ln>
+        </p:spPr>
+        <p:txBody>
+          <a:bodyPr wrap="square" rtlCol="1">
+            <a:spAutoFit/>
+          </a:bodyPr>
+          <a:lstStyle/>
+          <a:p>
+            <a:pPr algn="ctr"/>
+            <a:r>
+              <a:rPr lang="en-US" dirty="0">
+                <a:solidFill>
+                  <a:srgbClr val="FF0000"/>
+                </a:solidFill>
+              </a:rPr>
+              <a:t>Anchored buoy</a:t>
+            </a:r>
+            <a:endParaRPr lang="he-IL" dirty="0">
+              <a:solidFill>
+                <a:srgbClr val="FF0000"/>
+              </a:solidFill>
+            </a:endParaRPr>
+          </a:p>
+        </p:txBody>
+      </p:sp>
+      <p:cxnSp>
+        <p:nvCxnSpPr>
+          <p:cNvPr id="109" name="Straight Arrow Connector 108">
+            <a:extLst>
+              <a:ext uri="{FF2B5EF4-FFF2-40B4-BE49-F238E27FC236}">
+                <a16:creationId xmlns:a16="http://schemas.microsoft.com/office/drawing/2014/main" id="{CAF53B7E-6F96-1502-4013-0E70BFD9399D}"/>
+              </a:ext>
+            </a:extLst>
+          </p:cNvPr>
+          <p:cNvCxnSpPr>
+            <a:cxnSpLocks/>
+            <a:stCxn id="107" idx="2"/>
+          </p:cNvCxnSpPr>
+          <p:nvPr/>
+        </p:nvCxnSpPr>
+        <p:spPr>
+          <a:xfrm flipH="1">
+            <a:off x="5807779" y="920380"/>
+            <a:ext cx="467149" cy="1285168"/>
+          </a:xfrm>
+          <a:prstGeom prst="straightConnector1">
+            <a:avLst/>
+          </a:prstGeom>
+          <a:ln w="38100">
+            <a:solidFill>
+              <a:srgbClr val="FF0000"/>
+            </a:solidFill>
+            <a:headEnd type="none" w="med" len="med"/>
+            <a:tailEnd type="triangle" w="med" len="med"/>
+          </a:ln>
+        </p:spPr>
+        <p:style>
+          <a:lnRef idx="1">
+            <a:schemeClr val="accent1"/>
+          </a:lnRef>
+          <a:fillRef idx="0">
+            <a:schemeClr val="accent1"/>
+          </a:fillRef>
+          <a:effectRef idx="0">
+            <a:schemeClr val="accent1"/>
+          </a:effectRef>
+          <a:fontRef idx="minor">
+            <a:schemeClr val="tx1"/>
+          </a:fontRef>
+        </p:style>
+      </p:cxnSp>
+      <p:cxnSp>
+        <p:nvCxnSpPr>
+          <p:cNvPr id="112" name="Straight Arrow Connector 111">
+            <a:extLst>
+              <a:ext uri="{FF2B5EF4-FFF2-40B4-BE49-F238E27FC236}">
+                <a16:creationId xmlns:a16="http://schemas.microsoft.com/office/drawing/2014/main" id="{C089A4F1-1C27-22C3-BF3E-565D69243EA1}"/>
+              </a:ext>
+            </a:extLst>
+          </p:cNvPr>
+          <p:cNvCxnSpPr>
+            <a:cxnSpLocks/>
+            <a:stCxn id="108" idx="2"/>
+          </p:cNvCxnSpPr>
+          <p:nvPr/>
+        </p:nvCxnSpPr>
+        <p:spPr>
+          <a:xfrm flipH="1">
+            <a:off x="5878559" y="1058880"/>
+            <a:ext cx="1561174" cy="2064993"/>
+          </a:xfrm>
+          <a:prstGeom prst="straightConnector1">
+            <a:avLst/>
+          </a:prstGeom>
+          <a:ln w="38100">
+            <a:solidFill>
+              <a:srgbClr val="FF0000"/>
+            </a:solidFill>
+            <a:headEnd type="none" w="med" len="med"/>
+            <a:tailEnd type="triangle" w="med" len="med"/>
+          </a:ln>
+        </p:spPr>
+        <p:style>
+          <a:lnRef idx="1">
+            <a:schemeClr val="accent1"/>
+          </a:lnRef>
+          <a:fillRef idx="0">
+            <a:schemeClr val="accent1"/>
+          </a:fillRef>
+          <a:effectRef idx="0">
+            <a:schemeClr val="accent1"/>
+          </a:effectRef>
+          <a:fontRef idx="minor">
+            <a:schemeClr val="tx1"/>
+          </a:fontRef>
+        </p:style>
+      </p:cxnSp>
+      <p:cxnSp>
+        <p:nvCxnSpPr>
+          <p:cNvPr id="115" name="Straight Arrow Connector 114">
+            <a:extLst>
+              <a:ext uri="{FF2B5EF4-FFF2-40B4-BE49-F238E27FC236}">
+                <a16:creationId xmlns:a16="http://schemas.microsoft.com/office/drawing/2014/main" id="{F188DD86-B499-17E3-8A31-320A9662F818}"/>
+              </a:ext>
+            </a:extLst>
+          </p:cNvPr>
+          <p:cNvCxnSpPr>
+            <a:cxnSpLocks/>
+            <a:stCxn id="106" idx="2"/>
+          </p:cNvCxnSpPr>
+          <p:nvPr/>
+        </p:nvCxnSpPr>
+        <p:spPr>
+          <a:xfrm flipH="1">
+            <a:off x="8534788" y="932742"/>
+            <a:ext cx="603112" cy="1302232"/>
+          </a:xfrm>
+          <a:prstGeom prst="straightConnector1">
+            <a:avLst/>
+          </a:prstGeom>
+          <a:ln w="38100">
+            <a:solidFill>
+              <a:srgbClr val="FF0000"/>
+            </a:solidFill>
+            <a:headEnd type="none" w="med" len="med"/>
+            <a:tailEnd type="triangle" w="med" len="med"/>
+          </a:ln>
+        </p:spPr>
+        <p:style>
+          <a:lnRef idx="1">
+            <a:schemeClr val="accent1"/>
+          </a:lnRef>
+          <a:fillRef idx="0">
+            <a:schemeClr val="accent1"/>
+          </a:fillRef>
+          <a:effectRef idx="0">
+            <a:schemeClr val="accent1"/>
+          </a:effectRef>
+          <a:fontRef idx="minor">
+            <a:schemeClr val="tx1"/>
+          </a:fontRef>
+        </p:style>
+      </p:cxnSp>
+      <p:sp>
+        <p:nvSpPr>
+          <p:cNvPr id="118" name="TextBox 117">
+            <a:extLst>
+              <a:ext uri="{FF2B5EF4-FFF2-40B4-BE49-F238E27FC236}">
+                <a16:creationId xmlns:a16="http://schemas.microsoft.com/office/drawing/2014/main" id="{06273C57-E317-92B8-42D5-E3744B840976}"/>
+              </a:ext>
+            </a:extLst>
+          </p:cNvPr>
+          <p:cNvSpPr txBox="1"/>
+          <p:nvPr/>
+        </p:nvSpPr>
+        <p:spPr>
+          <a:xfrm>
+            <a:off x="4712522" y="563410"/>
+            <a:ext cx="1095257" cy="369332"/>
+          </a:xfrm>
+          <a:prstGeom prst="rect">
+            <a:avLst/>
+          </a:prstGeom>
+          <a:solidFill>
+            <a:schemeClr val="accent5">
+              <a:lumMod val="75000"/>
+            </a:schemeClr>
+          </a:solidFill>
+          <a:ln>
+            <a:solidFill>
+              <a:srgbClr val="FF0000"/>
+            </a:solidFill>
+          </a:ln>
+        </p:spPr>
+        <p:txBody>
+          <a:bodyPr wrap="square" rtlCol="1">
+            <a:spAutoFit/>
+          </a:bodyPr>
+          <a:lstStyle/>
+          <a:p>
+            <a:pPr algn="ctr"/>
+            <a:r>
+              <a:rPr lang="en-US" dirty="0">
+                <a:solidFill>
+                  <a:srgbClr val="FF0000"/>
+                </a:solidFill>
+              </a:rPr>
+              <a:t>“waives”</a:t>
+            </a:r>
+            <a:endParaRPr lang="he-IL" dirty="0">
+              <a:solidFill>
+                <a:srgbClr val="FF0000"/>
+              </a:solidFill>
+            </a:endParaRPr>
+          </a:p>
+        </p:txBody>
+      </p:sp>
+      <p:cxnSp>
+        <p:nvCxnSpPr>
+          <p:cNvPr id="120" name="Straight Arrow Connector 119">
+            <a:extLst>
+              <a:ext uri="{FF2B5EF4-FFF2-40B4-BE49-F238E27FC236}">
+                <a16:creationId xmlns:a16="http://schemas.microsoft.com/office/drawing/2014/main" id="{E85F76AD-94FF-8A3A-DD8D-A95A36588B3F}"/>
+              </a:ext>
+            </a:extLst>
+          </p:cNvPr>
+          <p:cNvCxnSpPr>
+            <a:cxnSpLocks/>
+            <a:stCxn id="118" idx="2"/>
+          </p:cNvCxnSpPr>
+          <p:nvPr/>
+        </p:nvCxnSpPr>
+        <p:spPr>
+          <a:xfrm flipH="1">
+            <a:off x="4950804" y="932742"/>
+            <a:ext cx="309347" cy="608484"/>
+          </a:xfrm>
+          <a:prstGeom prst="straightConnector1">
+            <a:avLst/>
+          </a:prstGeom>
+          <a:ln w="38100">
+            <a:solidFill>
+              <a:srgbClr val="FF0000"/>
+            </a:solidFill>
+            <a:headEnd type="none" w="med" len="med"/>
+            <a:tailEnd type="triangle" w="med" len="med"/>
+          </a:ln>
+        </p:spPr>
+        <p:style>
+          <a:lnRef idx="1">
+            <a:schemeClr val="accent1"/>
+          </a:lnRef>
+          <a:fillRef idx="0">
+            <a:schemeClr val="accent1"/>
+          </a:fillRef>
+          <a:effectRef idx="0">
+            <a:schemeClr val="accent1"/>
+          </a:effectRef>
+          <a:fontRef idx="minor">
+            <a:schemeClr val="tx1"/>
+          </a:fontRef>
+        </p:style>
+      </p:cxnSp>
+      <p:sp>
+        <p:nvSpPr>
+          <p:cNvPr id="123" name="TextBox 122">
+            <a:extLst>
+              <a:ext uri="{FF2B5EF4-FFF2-40B4-BE49-F238E27FC236}">
+                <a16:creationId xmlns:a16="http://schemas.microsoft.com/office/drawing/2014/main" id="{C11D4368-F856-79A9-2D15-79A0814CF5F7}"/>
+              </a:ext>
+            </a:extLst>
+          </p:cNvPr>
+          <p:cNvSpPr txBox="1"/>
+          <p:nvPr/>
+        </p:nvSpPr>
+        <p:spPr>
+          <a:xfrm>
+            <a:off x="672428" y="6405852"/>
+            <a:ext cx="820829" cy="276999"/>
+          </a:xfrm>
+          <a:prstGeom prst="rect">
+            <a:avLst/>
+          </a:prstGeom>
+          <a:solidFill>
+            <a:schemeClr val="accent5">
+              <a:lumMod val="75000"/>
+            </a:schemeClr>
+          </a:solidFill>
+          <a:ln>
+            <a:solidFill>
+              <a:srgbClr val="FF0000"/>
+            </a:solidFill>
+          </a:ln>
+        </p:spPr>
+        <p:txBody>
+          <a:bodyPr wrap="square" rtlCol="1">
+            <a:spAutoFit/>
+          </a:bodyPr>
+          <a:lstStyle/>
+          <a:p>
+            <a:r>
+              <a:rPr lang="en-US" sz="1200" dirty="0">
+                <a:solidFill>
+                  <a:srgbClr val="FF0000"/>
+                </a:solidFill>
+              </a:rPr>
+              <a:t>Obstacles</a:t>
+            </a:r>
+            <a:endParaRPr lang="he-IL" sz="1200" dirty="0">
+              <a:solidFill>
+                <a:srgbClr val="FF0000"/>
+              </a:solidFill>
+            </a:endParaRPr>
+          </a:p>
+        </p:txBody>
+      </p:sp>
+    </p:spTree>
+    <p:extLst>
+      <p:ext uri="{BB962C8B-B14F-4D97-AF65-F5344CB8AC3E}">
+        <p14:creationId xmlns:p14="http://schemas.microsoft.com/office/powerpoint/2010/main" val="1260547753"/>
+      </p:ext>
+    </p:extLst>
+  </p:cSld>
+  <p:clrMapOvr>
+    <a:masterClrMapping/>
+  </p:clrMapOvr>
+</p:sld>
+</file>
+
+<file path=ppt/slides/slide3.xml><?xml version="1.0" encoding="utf-8"?>
+<p:sld xmlns:a="http://schemas.openxmlformats.org/drawingml/2006/main" xmlns:r="http://schemas.openxmlformats.org/officeDocument/2006/relationships" xmlns:p="http://schemas.openxmlformats.org/presentationml/2006/main" showMasterSp="0">
+  <p:cSld>
+    <p:spTree>
+      <p:nvGrpSpPr>
+        <p:cNvPr id="1" name=""/>
+        <p:cNvGrpSpPr/>
+        <p:nvPr/>
+      </p:nvGrpSpPr>
+      <p:grpSpPr>
+        <a:xfrm>
+          <a:off x="0" y="0"/>
+          <a:ext cx="0" cy="0"/>
+          <a:chOff x="0" y="0"/>
+          <a:chExt cx="0" cy="0"/>
+        </a:xfrm>
+      </p:grpSpPr>
       <p:cxnSp>
         <p:nvCxnSpPr>
           <p:cNvPr id="3" name="Straight Arrow Connector 2">
@@ -6993,6 +9572,60 @@
               <a:t>F11</a:t>
             </a:r>
             <a:endParaRPr lang="he-IL" sz="4800" b="1" dirty="0"/>
+          </a:p>
+        </p:txBody>
+      </p:sp>
+      <p:sp>
+        <p:nvSpPr>
+          <p:cNvPr id="23" name="Oval 22">
+            <a:extLst>
+              <a:ext uri="{FF2B5EF4-FFF2-40B4-BE49-F238E27FC236}">
+                <a16:creationId xmlns:a16="http://schemas.microsoft.com/office/drawing/2014/main" id="{1627DAB7-4457-4C8D-E6BD-846400076267}"/>
+              </a:ext>
+            </a:extLst>
+          </p:cNvPr>
+          <p:cNvSpPr/>
+          <p:nvPr/>
+        </p:nvSpPr>
+        <p:spPr>
+          <a:xfrm>
+            <a:off x="7026965" y="1906063"/>
+            <a:ext cx="954157" cy="830997"/>
+          </a:xfrm>
+          <a:prstGeom prst="ellipse">
+            <a:avLst/>
+          </a:prstGeom>
+          <a:solidFill>
+            <a:schemeClr val="bg1"/>
+          </a:solidFill>
+          <a:ln w="57150">
+            <a:solidFill>
+              <a:srgbClr val="FF0000"/>
+            </a:solidFill>
+          </a:ln>
+        </p:spPr>
+        <p:style>
+          <a:lnRef idx="2">
+            <a:schemeClr val="accent1">
+              <a:shade val="15000"/>
+            </a:schemeClr>
+          </a:lnRef>
+          <a:fillRef idx="1">
+            <a:schemeClr val="accent1"/>
+          </a:fillRef>
+          <a:effectRef idx="0">
+            <a:schemeClr val="accent1"/>
+          </a:effectRef>
+          <a:fontRef idx="minor">
+            <a:schemeClr val="lt1"/>
+          </a:fontRef>
+        </p:style>
+        <p:txBody>
+          <a:bodyPr rtlCol="1" anchor="ctr"/>
+          <a:lstStyle/>
+          <a:p>
+            <a:pPr algn="ctr"/>
+            <a:endParaRPr lang="he-IL"/>
           </a:p>
         </p:txBody>
       </p:sp>

</xml_diff>

<commit_message>
tutorial is working with demo animations. One chapter only now.
</commit_message>
<xml_diff>
--- a/keyboard guide for sailing.pptx
+++ b/keyboard guide for sailing.pptx
@@ -263,7 +263,7 @@
           <a:p>
             <a:fld id="{19A57770-1AB4-44E2-B380-CDAE3CF4CB38}" type="datetimeFigureOut">
               <a:rPr lang="he-IL" smtClean="0"/>
-              <a:t>י'/כסלו/תשפ"ד</a:t>
+              <a:t>ט"ז/כסלו/תשפ"ד</a:t>
             </a:fld>
             <a:endParaRPr lang="he-IL"/>
           </a:p>
@@ -463,7 +463,7 @@
           <a:p>
             <a:fld id="{19A57770-1AB4-44E2-B380-CDAE3CF4CB38}" type="datetimeFigureOut">
               <a:rPr lang="he-IL" smtClean="0"/>
-              <a:t>י'/כסלו/תשפ"ד</a:t>
+              <a:t>ט"ז/כסלו/תשפ"ד</a:t>
             </a:fld>
             <a:endParaRPr lang="he-IL"/>
           </a:p>
@@ -673,7 +673,7 @@
           <a:p>
             <a:fld id="{19A57770-1AB4-44E2-B380-CDAE3CF4CB38}" type="datetimeFigureOut">
               <a:rPr lang="he-IL" smtClean="0"/>
-              <a:t>י'/כסלו/תשפ"ד</a:t>
+              <a:t>ט"ז/כסלו/תשפ"ד</a:t>
             </a:fld>
             <a:endParaRPr lang="he-IL"/>
           </a:p>
@@ -873,7 +873,7 @@
           <a:p>
             <a:fld id="{19A57770-1AB4-44E2-B380-CDAE3CF4CB38}" type="datetimeFigureOut">
               <a:rPr lang="he-IL" smtClean="0"/>
-              <a:t>י'/כסלו/תשפ"ד</a:t>
+              <a:t>ט"ז/כסלו/תשפ"ד</a:t>
             </a:fld>
             <a:endParaRPr lang="he-IL"/>
           </a:p>
@@ -1149,7 +1149,7 @@
           <a:p>
             <a:fld id="{19A57770-1AB4-44E2-B380-CDAE3CF4CB38}" type="datetimeFigureOut">
               <a:rPr lang="he-IL" smtClean="0"/>
-              <a:t>י'/כסלו/תשפ"ד</a:t>
+              <a:t>ט"ז/כסלו/תשפ"ד</a:t>
             </a:fld>
             <a:endParaRPr lang="he-IL"/>
           </a:p>
@@ -1417,7 +1417,7 @@
           <a:p>
             <a:fld id="{19A57770-1AB4-44E2-B380-CDAE3CF4CB38}" type="datetimeFigureOut">
               <a:rPr lang="he-IL" smtClean="0"/>
-              <a:t>י'/כסלו/תשפ"ד</a:t>
+              <a:t>ט"ז/כסלו/תשפ"ד</a:t>
             </a:fld>
             <a:endParaRPr lang="he-IL"/>
           </a:p>
@@ -1832,7 +1832,7 @@
           <a:p>
             <a:fld id="{19A57770-1AB4-44E2-B380-CDAE3CF4CB38}" type="datetimeFigureOut">
               <a:rPr lang="he-IL" smtClean="0"/>
-              <a:t>י'/כסלו/תשפ"ד</a:t>
+              <a:t>ט"ז/כסלו/תשפ"ד</a:t>
             </a:fld>
             <a:endParaRPr lang="he-IL"/>
           </a:p>
@@ -1974,7 +1974,7 @@
           <a:p>
             <a:fld id="{19A57770-1AB4-44E2-B380-CDAE3CF4CB38}" type="datetimeFigureOut">
               <a:rPr lang="he-IL" smtClean="0"/>
-              <a:t>י'/כסלו/תשפ"ד</a:t>
+              <a:t>ט"ז/כסלו/תשפ"ד</a:t>
             </a:fld>
             <a:endParaRPr lang="he-IL"/>
           </a:p>
@@ -2087,7 +2087,7 @@
           <a:p>
             <a:fld id="{19A57770-1AB4-44E2-B380-CDAE3CF4CB38}" type="datetimeFigureOut">
               <a:rPr lang="he-IL" smtClean="0"/>
-              <a:t>י'/כסלו/תשפ"ד</a:t>
+              <a:t>ט"ז/כסלו/תשפ"ד</a:t>
             </a:fld>
             <a:endParaRPr lang="he-IL"/>
           </a:p>
@@ -2400,7 +2400,7 @@
           <a:p>
             <a:fld id="{19A57770-1AB4-44E2-B380-CDAE3CF4CB38}" type="datetimeFigureOut">
               <a:rPr lang="he-IL" smtClean="0"/>
-              <a:t>י'/כסלו/תשפ"ד</a:t>
+              <a:t>ט"ז/כסלו/תשפ"ד</a:t>
             </a:fld>
             <a:endParaRPr lang="he-IL"/>
           </a:p>
@@ -2689,7 +2689,7 @@
           <a:p>
             <a:fld id="{19A57770-1AB4-44E2-B380-CDAE3CF4CB38}" type="datetimeFigureOut">
               <a:rPr lang="he-IL" smtClean="0"/>
-              <a:t>י'/כסלו/תשפ"ד</a:t>
+              <a:t>ט"ז/כסלו/תשפ"ד</a:t>
             </a:fld>
             <a:endParaRPr lang="he-IL"/>
           </a:p>
@@ -2937,7 +2937,7 @@
           <a:p>
             <a:fld id="{19A57770-1AB4-44E2-B380-CDAE3CF4CB38}" type="datetimeFigureOut">
               <a:rPr lang="he-IL" smtClean="0"/>
-              <a:t>י'/כסלו/תשפ"ד</a:t>
+              <a:t>ט"ז/כסלו/תשפ"ד</a:t>
             </a:fld>
             <a:endParaRPr lang="he-IL"/>
           </a:p>
@@ -4876,7 +4876,7 @@
         </p:nvSpPr>
         <p:spPr>
           <a:xfrm>
-            <a:off x="5734879" y="2562500"/>
+            <a:off x="5374797" y="3464752"/>
             <a:ext cx="1474303" cy="646331"/>
           </a:xfrm>
           <a:prstGeom prst="rect">
@@ -4943,13 +4943,14 @@
           </p:cNvPr>
           <p:cNvCxnSpPr>
             <a:cxnSpLocks/>
+            <a:stCxn id="10" idx="3"/>
           </p:cNvCxnSpPr>
           <p:nvPr/>
         </p:nvCxnSpPr>
         <p:spPr>
-          <a:xfrm>
-            <a:off x="6472030" y="3160067"/>
-            <a:ext cx="1696279" cy="489103"/>
+          <a:xfrm flipV="1">
+            <a:off x="6849100" y="3649170"/>
+            <a:ext cx="1319209" cy="138748"/>
           </a:xfrm>
           <a:prstGeom prst="straightConnector1">
             <a:avLst/>
@@ -5885,6 +5886,121 @@
           <a:xfrm>
             <a:off x="1382617" y="2076118"/>
             <a:ext cx="1850915" cy="972103"/>
+          </a:xfrm>
+          <a:prstGeom prst="straightConnector1">
+            <a:avLst/>
+          </a:prstGeom>
+          <a:ln w="38100">
+            <a:solidFill>
+              <a:srgbClr val="FF0000"/>
+            </a:solidFill>
+            <a:headEnd type="none" w="med" len="med"/>
+            <a:tailEnd type="triangle" w="med" len="med"/>
+          </a:ln>
+        </p:spPr>
+        <p:style>
+          <a:lnRef idx="1">
+            <a:schemeClr val="accent1"/>
+          </a:lnRef>
+          <a:fillRef idx="0">
+            <a:schemeClr val="accent1"/>
+          </a:fillRef>
+          <a:effectRef idx="0">
+            <a:schemeClr val="accent1"/>
+          </a:effectRef>
+          <a:fontRef idx="minor">
+            <a:schemeClr val="tx1"/>
+          </a:fontRef>
+        </p:style>
+      </p:cxnSp>
+      <p:sp>
+        <p:nvSpPr>
+          <p:cNvPr id="21" name="TextBox 20">
+            <a:extLst>
+              <a:ext uri="{FF2B5EF4-FFF2-40B4-BE49-F238E27FC236}">
+                <a16:creationId xmlns:a16="http://schemas.microsoft.com/office/drawing/2014/main" id="{A918B862-11C5-1C69-ED88-13E2C93F9064}"/>
+              </a:ext>
+            </a:extLst>
+          </p:cNvPr>
+          <p:cNvSpPr txBox="1"/>
+          <p:nvPr/>
+        </p:nvSpPr>
+        <p:spPr>
+          <a:xfrm>
+            <a:off x="4715695" y="2746917"/>
+            <a:ext cx="1704867" cy="646331"/>
+          </a:xfrm>
+          <a:prstGeom prst="rect">
+            <a:avLst/>
+          </a:prstGeom>
+          <a:solidFill>
+            <a:schemeClr val="accent5">
+              <a:lumMod val="60000"/>
+              <a:lumOff val="40000"/>
+            </a:schemeClr>
+          </a:solidFill>
+          <a:ln>
+            <a:solidFill>
+              <a:srgbClr val="FF0000"/>
+            </a:solidFill>
+          </a:ln>
+        </p:spPr>
+        <p:txBody>
+          <a:bodyPr wrap="square" rtlCol="1">
+            <a:spAutoFit/>
+          </a:bodyPr>
+          <a:lstStyle/>
+          <a:p>
+            <a:r>
+              <a:rPr lang="en-US" dirty="0">
+                <a:solidFill>
+                  <a:srgbClr val="FF0000"/>
+                </a:solidFill>
+              </a:rPr>
+              <a:t>K – show/hide</a:t>
+            </a:r>
+            <a:r>
+              <a:rPr lang="en-US" b="1" dirty="0">
+                <a:solidFill>
+                  <a:srgbClr val="FF0000"/>
+                </a:solidFill>
+              </a:rPr>
+              <a:t> GUI</a:t>
+            </a:r>
+            <a:r>
+              <a:rPr lang="en-US" dirty="0">
+                <a:solidFill>
+                  <a:srgbClr val="FF0000"/>
+                </a:solidFill>
+              </a:rPr>
+              <a:t> widgets</a:t>
+            </a:r>
+            <a:endParaRPr lang="he-IL" b="1" dirty="0">
+              <a:solidFill>
+                <a:srgbClr val="FF0000"/>
+              </a:solidFill>
+            </a:endParaRPr>
+          </a:p>
+        </p:txBody>
+      </p:sp>
+      <p:cxnSp>
+        <p:nvCxnSpPr>
+          <p:cNvPr id="25" name="Straight Arrow Connector 24">
+            <a:extLst>
+              <a:ext uri="{FF2B5EF4-FFF2-40B4-BE49-F238E27FC236}">
+                <a16:creationId xmlns:a16="http://schemas.microsoft.com/office/drawing/2014/main" id="{ADEBFA50-3808-1DE0-ED2E-24A45E5E58EF}"/>
+              </a:ext>
+            </a:extLst>
+          </p:cNvPr>
+          <p:cNvCxnSpPr>
+            <a:cxnSpLocks/>
+          </p:cNvCxnSpPr>
+          <p:nvPr/>
+        </p:nvCxnSpPr>
+        <p:spPr>
+          <a:xfrm>
+            <a:off x="6420562" y="3084444"/>
+            <a:ext cx="428538" cy="112665"/>
           </a:xfrm>
           <a:prstGeom prst="straightConnector1">
             <a:avLst/>

</xml_diff>